<commit_message>
add first part of T2
</commit_message>
<xml_diff>
--- a/img/TX.pptx
+++ b/img/TX.pptx
@@ -7,6 +7,7 @@
   <p:sldIdLst>
     <p:sldId id="258" r:id="rId2"/>
     <p:sldId id="259" r:id="rId3"/>
+    <p:sldId id="260" r:id="rId4"/>
   </p:sldIdLst>
   <p:sldSz cx="12192000" cy="6858000"/>
   <p:notesSz cx="6858000" cy="9144000"/>
@@ -260,7 +261,7 @@
           <a:p>
             <a:fld id="{6BD44EFA-B01F-4EEC-BDEE-1E8697900FDD}" type="datetimeFigureOut">
               <a:rPr lang="en-US" smtClean="0"/>
-              <a:t>9/21/2024</a:t>
+              <a:t>10/2/2024</a:t>
             </a:fld>
             <a:endParaRPr lang="en-US"/>
           </a:p>
@@ -458,7 +459,7 @@
           <a:p>
             <a:fld id="{6BD44EFA-B01F-4EEC-BDEE-1E8697900FDD}" type="datetimeFigureOut">
               <a:rPr lang="en-US" smtClean="0"/>
-              <a:t>9/21/2024</a:t>
+              <a:t>10/2/2024</a:t>
             </a:fld>
             <a:endParaRPr lang="en-US"/>
           </a:p>
@@ -666,7 +667,7 @@
           <a:p>
             <a:fld id="{6BD44EFA-B01F-4EEC-BDEE-1E8697900FDD}" type="datetimeFigureOut">
               <a:rPr lang="en-US" smtClean="0"/>
-              <a:t>9/21/2024</a:t>
+              <a:t>10/2/2024</a:t>
             </a:fld>
             <a:endParaRPr lang="en-US"/>
           </a:p>
@@ -864,7 +865,7 @@
           <a:p>
             <a:fld id="{6BD44EFA-B01F-4EEC-BDEE-1E8697900FDD}" type="datetimeFigureOut">
               <a:rPr lang="en-US" smtClean="0"/>
-              <a:t>9/21/2024</a:t>
+              <a:t>10/2/2024</a:t>
             </a:fld>
             <a:endParaRPr lang="en-US"/>
           </a:p>
@@ -1139,7 +1140,7 @@
           <a:p>
             <a:fld id="{6BD44EFA-B01F-4EEC-BDEE-1E8697900FDD}" type="datetimeFigureOut">
               <a:rPr lang="en-US" smtClean="0"/>
-              <a:t>9/21/2024</a:t>
+              <a:t>10/2/2024</a:t>
             </a:fld>
             <a:endParaRPr lang="en-US"/>
           </a:p>
@@ -1404,7 +1405,7 @@
           <a:p>
             <a:fld id="{6BD44EFA-B01F-4EEC-BDEE-1E8697900FDD}" type="datetimeFigureOut">
               <a:rPr lang="en-US" smtClean="0"/>
-              <a:t>9/21/2024</a:t>
+              <a:t>10/2/2024</a:t>
             </a:fld>
             <a:endParaRPr lang="en-US"/>
           </a:p>
@@ -1816,7 +1817,7 @@
           <a:p>
             <a:fld id="{6BD44EFA-B01F-4EEC-BDEE-1E8697900FDD}" type="datetimeFigureOut">
               <a:rPr lang="en-US" smtClean="0"/>
-              <a:t>9/21/2024</a:t>
+              <a:t>10/2/2024</a:t>
             </a:fld>
             <a:endParaRPr lang="en-US"/>
           </a:p>
@@ -1957,7 +1958,7 @@
           <a:p>
             <a:fld id="{6BD44EFA-B01F-4EEC-BDEE-1E8697900FDD}" type="datetimeFigureOut">
               <a:rPr lang="en-US" smtClean="0"/>
-              <a:t>9/21/2024</a:t>
+              <a:t>10/2/2024</a:t>
             </a:fld>
             <a:endParaRPr lang="en-US"/>
           </a:p>
@@ -2070,7 +2071,7 @@
           <a:p>
             <a:fld id="{6BD44EFA-B01F-4EEC-BDEE-1E8697900FDD}" type="datetimeFigureOut">
               <a:rPr lang="en-US" smtClean="0"/>
-              <a:t>9/21/2024</a:t>
+              <a:t>10/2/2024</a:t>
             </a:fld>
             <a:endParaRPr lang="en-US"/>
           </a:p>
@@ -2381,7 +2382,7 @@
           <a:p>
             <a:fld id="{6BD44EFA-B01F-4EEC-BDEE-1E8697900FDD}" type="datetimeFigureOut">
               <a:rPr lang="en-US" smtClean="0"/>
-              <a:t>9/21/2024</a:t>
+              <a:t>10/2/2024</a:t>
             </a:fld>
             <a:endParaRPr lang="en-US"/>
           </a:p>
@@ -2669,7 +2670,7 @@
           <a:p>
             <a:fld id="{6BD44EFA-B01F-4EEC-BDEE-1E8697900FDD}" type="datetimeFigureOut">
               <a:rPr lang="en-US" smtClean="0"/>
-              <a:t>9/21/2024</a:t>
+              <a:t>10/2/2024</a:t>
             </a:fld>
             <a:endParaRPr lang="en-US"/>
           </a:p>
@@ -2910,7 +2911,7 @@
           <a:p>
             <a:fld id="{6BD44EFA-B01F-4EEC-BDEE-1E8697900FDD}" type="datetimeFigureOut">
               <a:rPr lang="en-US" smtClean="0"/>
-              <a:t>9/21/2024</a:t>
+              <a:t>10/2/2024</a:t>
             </a:fld>
             <a:endParaRPr lang="en-US"/>
           </a:p>
@@ -7728,6 +7729,988 @@
 </p:sld>
 </file>
 
+<file path=ppt/slides/slide3.xml><?xml version="1.0" encoding="utf-8"?>
+<p:sld xmlns:a="http://schemas.openxmlformats.org/drawingml/2006/main" xmlns:r="http://schemas.openxmlformats.org/officeDocument/2006/relationships" xmlns:p="http://schemas.openxmlformats.org/presentationml/2006/main">
+  <p:cSld>
+    <p:spTree>
+      <p:nvGrpSpPr>
+        <p:cNvPr id="1" name=""/>
+        <p:cNvGrpSpPr/>
+        <p:nvPr/>
+      </p:nvGrpSpPr>
+      <p:grpSpPr>
+        <a:xfrm>
+          <a:off x="0" y="0"/>
+          <a:ext cx="0" cy="0"/>
+          <a:chOff x="0" y="0"/>
+          <a:chExt cx="0" cy="0"/>
+        </a:xfrm>
+      </p:grpSpPr>
+      <p:sp>
+        <p:nvSpPr>
+          <p:cNvPr id="7" name="Rectangle: Rounded Corners 6">
+            <a:extLst>
+              <a:ext uri="{FF2B5EF4-FFF2-40B4-BE49-F238E27FC236}">
+                <a16:creationId xmlns:a16="http://schemas.microsoft.com/office/drawing/2014/main" id="{FE2A4A76-680A-8834-12D4-4675B4D148E9}"/>
+              </a:ext>
+            </a:extLst>
+          </p:cNvPr>
+          <p:cNvSpPr/>
+          <p:nvPr/>
+        </p:nvSpPr>
+        <p:spPr>
+          <a:xfrm>
+            <a:off x="10078671" y="427141"/>
+            <a:ext cx="1585519" cy="771787"/>
+          </a:xfrm>
+          <a:prstGeom prst="roundRect">
+            <a:avLst/>
+          </a:prstGeom>
+        </p:spPr>
+        <p:style>
+          <a:lnRef idx="2">
+            <a:schemeClr val="accent1">
+              <a:shade val="15000"/>
+            </a:schemeClr>
+          </a:lnRef>
+          <a:fillRef idx="1">
+            <a:schemeClr val="accent1"/>
+          </a:fillRef>
+          <a:effectRef idx="0">
+            <a:schemeClr val="accent1"/>
+          </a:effectRef>
+          <a:fontRef idx="minor">
+            <a:schemeClr val="lt1"/>
+          </a:fontRef>
+        </p:style>
+        <p:txBody>
+          <a:bodyPr rtlCol="0" anchor="ctr"/>
+          <a:lstStyle/>
+          <a:p>
+            <a:pPr algn="ctr"/>
+            <a:r>
+              <a:rPr lang="es-CL" dirty="0" err="1"/>
+              <a:t>Display</a:t>
+            </a:r>
+            <a:endParaRPr lang="en-US" dirty="0"/>
+          </a:p>
+        </p:txBody>
+      </p:sp>
+      <p:sp>
+        <p:nvSpPr>
+          <p:cNvPr id="8" name="Rectangle: Rounded Corners 7">
+            <a:extLst>
+              <a:ext uri="{FF2B5EF4-FFF2-40B4-BE49-F238E27FC236}">
+                <a16:creationId xmlns:a16="http://schemas.microsoft.com/office/drawing/2014/main" id="{A460541C-D051-9D2E-96C9-F067330E8238}"/>
+              </a:ext>
+            </a:extLst>
+          </p:cNvPr>
+          <p:cNvSpPr/>
+          <p:nvPr/>
+        </p:nvSpPr>
+        <p:spPr>
+          <a:xfrm>
+            <a:off x="10303072" y="1476463"/>
+            <a:ext cx="1585519" cy="771787"/>
+          </a:xfrm>
+          <a:prstGeom prst="roundRect">
+            <a:avLst/>
+          </a:prstGeom>
+        </p:spPr>
+        <p:style>
+          <a:lnRef idx="2">
+            <a:schemeClr val="accent1">
+              <a:shade val="15000"/>
+            </a:schemeClr>
+          </a:lnRef>
+          <a:fillRef idx="1">
+            <a:schemeClr val="accent1"/>
+          </a:fillRef>
+          <a:effectRef idx="0">
+            <a:schemeClr val="accent1"/>
+          </a:effectRef>
+          <a:fontRef idx="minor">
+            <a:schemeClr val="lt1"/>
+          </a:fontRef>
+        </p:style>
+        <p:txBody>
+          <a:bodyPr rtlCol="0" anchor="ctr"/>
+          <a:lstStyle/>
+          <a:p>
+            <a:pPr algn="ctr"/>
+            <a:r>
+              <a:rPr lang="es-CL" dirty="0"/>
+              <a:t>Luz OK/NOK</a:t>
+            </a:r>
+            <a:endParaRPr lang="en-US" dirty="0"/>
+          </a:p>
+        </p:txBody>
+      </p:sp>
+      <p:sp>
+        <p:nvSpPr>
+          <p:cNvPr id="12" name="Rectangle: Rounded Corners 11">
+            <a:extLst>
+              <a:ext uri="{FF2B5EF4-FFF2-40B4-BE49-F238E27FC236}">
+                <a16:creationId xmlns:a16="http://schemas.microsoft.com/office/drawing/2014/main" id="{15F1F435-1FFD-7DEB-C62C-2DE911DF500E}"/>
+              </a:ext>
+            </a:extLst>
+          </p:cNvPr>
+          <p:cNvSpPr/>
+          <p:nvPr/>
+        </p:nvSpPr>
+        <p:spPr>
+          <a:xfrm>
+            <a:off x="8096774" y="1578524"/>
+            <a:ext cx="1585519" cy="771787"/>
+          </a:xfrm>
+          <a:prstGeom prst="roundRect">
+            <a:avLst/>
+          </a:prstGeom>
+        </p:spPr>
+        <p:style>
+          <a:lnRef idx="2">
+            <a:schemeClr val="accent1">
+              <a:shade val="15000"/>
+            </a:schemeClr>
+          </a:lnRef>
+          <a:fillRef idx="1">
+            <a:schemeClr val="accent1"/>
+          </a:fillRef>
+          <a:effectRef idx="0">
+            <a:schemeClr val="accent1"/>
+          </a:effectRef>
+          <a:fontRef idx="minor">
+            <a:schemeClr val="lt1"/>
+          </a:fontRef>
+        </p:style>
+        <p:txBody>
+          <a:bodyPr rtlCol="0" anchor="ctr"/>
+          <a:lstStyle/>
+          <a:p>
+            <a:pPr algn="ctr"/>
+            <a:r>
+              <a:rPr lang="es-CL" dirty="0"/>
+              <a:t>Ajuste frio/caliente</a:t>
+            </a:r>
+            <a:endParaRPr lang="en-US" dirty="0"/>
+          </a:p>
+        </p:txBody>
+      </p:sp>
+      <p:sp>
+        <p:nvSpPr>
+          <p:cNvPr id="84" name="Rectangle: Rounded Corners 83">
+            <a:extLst>
+              <a:ext uri="{FF2B5EF4-FFF2-40B4-BE49-F238E27FC236}">
+                <a16:creationId xmlns:a16="http://schemas.microsoft.com/office/drawing/2014/main" id="{5C91AC8B-1E1A-8FBD-3D77-7D4B96B6431D}"/>
+              </a:ext>
+            </a:extLst>
+          </p:cNvPr>
+          <p:cNvSpPr/>
+          <p:nvPr/>
+        </p:nvSpPr>
+        <p:spPr>
+          <a:xfrm>
+            <a:off x="6369162" y="3320253"/>
+            <a:ext cx="1585519" cy="771787"/>
+          </a:xfrm>
+          <a:prstGeom prst="roundRect">
+            <a:avLst/>
+          </a:prstGeom>
+        </p:spPr>
+        <p:style>
+          <a:lnRef idx="2">
+            <a:schemeClr val="accent1">
+              <a:shade val="15000"/>
+            </a:schemeClr>
+          </a:lnRef>
+          <a:fillRef idx="1">
+            <a:schemeClr val="accent1"/>
+          </a:fillRef>
+          <a:effectRef idx="0">
+            <a:schemeClr val="accent1"/>
+          </a:effectRef>
+          <a:fontRef idx="minor">
+            <a:schemeClr val="lt1"/>
+          </a:fontRef>
+        </p:style>
+        <p:txBody>
+          <a:bodyPr rtlCol="0" anchor="ctr"/>
+          <a:lstStyle/>
+          <a:p>
+            <a:pPr algn="ctr"/>
+            <a:r>
+              <a:rPr lang="es-CL" dirty="0"/>
+              <a:t>Ajuste </a:t>
+            </a:r>
+            <a:r>
+              <a:rPr lang="es-CL" dirty="0" err="1"/>
+              <a:t>auto-off</a:t>
+            </a:r>
+            <a:endParaRPr lang="en-US" dirty="0"/>
+          </a:p>
+        </p:txBody>
+      </p:sp>
+      <p:sp>
+        <p:nvSpPr>
+          <p:cNvPr id="115" name="Rectangle: Rounded Corners 114">
+            <a:extLst>
+              <a:ext uri="{FF2B5EF4-FFF2-40B4-BE49-F238E27FC236}">
+                <a16:creationId xmlns:a16="http://schemas.microsoft.com/office/drawing/2014/main" id="{FE765827-B0D7-87E6-F1A4-DB11DEC2E3C6}"/>
+              </a:ext>
+            </a:extLst>
+          </p:cNvPr>
+          <p:cNvSpPr/>
+          <p:nvPr/>
+        </p:nvSpPr>
+        <p:spPr>
+          <a:xfrm>
+            <a:off x="4547535" y="1991841"/>
+            <a:ext cx="1585519" cy="771787"/>
+          </a:xfrm>
+          <a:prstGeom prst="roundRect">
+            <a:avLst/>
+          </a:prstGeom>
+        </p:spPr>
+        <p:style>
+          <a:lnRef idx="2">
+            <a:schemeClr val="accent1">
+              <a:shade val="15000"/>
+            </a:schemeClr>
+          </a:lnRef>
+          <a:fillRef idx="1">
+            <a:schemeClr val="accent1"/>
+          </a:fillRef>
+          <a:effectRef idx="0">
+            <a:schemeClr val="accent1"/>
+          </a:effectRef>
+          <a:fontRef idx="minor">
+            <a:schemeClr val="lt1"/>
+          </a:fontRef>
+        </p:style>
+        <p:txBody>
+          <a:bodyPr rtlCol="0" anchor="ctr"/>
+          <a:lstStyle/>
+          <a:p>
+            <a:pPr algn="ctr"/>
+            <a:r>
+              <a:rPr lang="es-CL" dirty="0"/>
+              <a:t>Ajuste equilibrio</a:t>
+            </a:r>
+            <a:endParaRPr lang="en-US" dirty="0"/>
+          </a:p>
+        </p:txBody>
+      </p:sp>
+      <p:sp>
+        <p:nvSpPr>
+          <p:cNvPr id="2" name="Rectangle: Rounded Corners 1">
+            <a:extLst>
+              <a:ext uri="{FF2B5EF4-FFF2-40B4-BE49-F238E27FC236}">
+                <a16:creationId xmlns:a16="http://schemas.microsoft.com/office/drawing/2014/main" id="{4E8E3070-2E16-EA4A-DB86-191A97BBD6CE}"/>
+              </a:ext>
+            </a:extLst>
+          </p:cNvPr>
+          <p:cNvSpPr/>
+          <p:nvPr/>
+        </p:nvSpPr>
+        <p:spPr>
+          <a:xfrm>
+            <a:off x="546204" y="5563976"/>
+            <a:ext cx="907408" cy="580237"/>
+          </a:xfrm>
+          <a:prstGeom prst="roundRect">
+            <a:avLst/>
+          </a:prstGeom>
+        </p:spPr>
+        <p:style>
+          <a:lnRef idx="2">
+            <a:schemeClr val="accent1">
+              <a:shade val="15000"/>
+            </a:schemeClr>
+          </a:lnRef>
+          <a:fillRef idx="1">
+            <a:schemeClr val="accent1"/>
+          </a:fillRef>
+          <a:effectRef idx="0">
+            <a:schemeClr val="accent1"/>
+          </a:effectRef>
+          <a:fontRef idx="minor">
+            <a:schemeClr val="lt1"/>
+          </a:fontRef>
+        </p:style>
+        <p:txBody>
+          <a:bodyPr rtlCol="0" anchor="ctr"/>
+          <a:lstStyle/>
+          <a:p>
+            <a:pPr algn="ctr"/>
+            <a:r>
+              <a:rPr lang="es-CL" dirty="0" err="1"/>
+              <a:t>Buzzer</a:t>
+            </a:r>
+            <a:endParaRPr lang="en-US" dirty="0"/>
+          </a:p>
+        </p:txBody>
+      </p:sp>
+      <p:sp>
+        <p:nvSpPr>
+          <p:cNvPr id="3" name="Rectangle: Rounded Corners 2">
+            <a:extLst>
+              <a:ext uri="{FF2B5EF4-FFF2-40B4-BE49-F238E27FC236}">
+                <a16:creationId xmlns:a16="http://schemas.microsoft.com/office/drawing/2014/main" id="{3E14F7B0-EFDC-8DBE-4869-8975EA3B11D8}"/>
+              </a:ext>
+            </a:extLst>
+          </p:cNvPr>
+          <p:cNvSpPr/>
+          <p:nvPr/>
+        </p:nvSpPr>
+        <p:spPr>
+          <a:xfrm>
+            <a:off x="207149" y="4476565"/>
+            <a:ext cx="1585519" cy="771787"/>
+          </a:xfrm>
+          <a:prstGeom prst="roundRect">
+            <a:avLst/>
+          </a:prstGeom>
+        </p:spPr>
+        <p:style>
+          <a:lnRef idx="2">
+            <a:schemeClr val="accent1">
+              <a:shade val="15000"/>
+            </a:schemeClr>
+          </a:lnRef>
+          <a:fillRef idx="1">
+            <a:schemeClr val="accent1"/>
+          </a:fillRef>
+          <a:effectRef idx="0">
+            <a:schemeClr val="accent1"/>
+          </a:effectRef>
+          <a:fontRef idx="minor">
+            <a:schemeClr val="lt1"/>
+          </a:fontRef>
+        </p:style>
+        <p:txBody>
+          <a:bodyPr rtlCol="0" anchor="ctr"/>
+          <a:lstStyle/>
+          <a:p>
+            <a:pPr algn="ctr"/>
+            <a:r>
+              <a:rPr lang="es-CL" dirty="0"/>
+              <a:t>Driver </a:t>
+            </a:r>
+            <a:r>
+              <a:rPr lang="es-CL" dirty="0" err="1"/>
+              <a:t>buzzer</a:t>
+            </a:r>
+            <a:endParaRPr lang="en-US" dirty="0"/>
+          </a:p>
+        </p:txBody>
+      </p:sp>
+      <p:cxnSp>
+        <p:nvCxnSpPr>
+          <p:cNvPr id="4" name="Connector: Elbow 3">
+            <a:extLst>
+              <a:ext uri="{FF2B5EF4-FFF2-40B4-BE49-F238E27FC236}">
+                <a16:creationId xmlns:a16="http://schemas.microsoft.com/office/drawing/2014/main" id="{1097D4A1-E3C0-221F-C520-B91E2841E9A0}"/>
+              </a:ext>
+            </a:extLst>
+          </p:cNvPr>
+          <p:cNvCxnSpPr>
+            <a:cxnSpLocks/>
+            <a:stCxn id="3" idx="2"/>
+            <a:endCxn id="2" idx="0"/>
+          </p:cNvCxnSpPr>
+          <p:nvPr/>
+        </p:nvCxnSpPr>
+        <p:spPr>
+          <a:xfrm rot="5400000">
+            <a:off x="842097" y="5406164"/>
+            <a:ext cx="315624" cy="1"/>
+          </a:xfrm>
+          <a:prstGeom prst="bentConnector3">
+            <a:avLst>
+              <a:gd name="adj1" fmla="val 50000"/>
+            </a:avLst>
+          </a:prstGeom>
+          <a:ln>
+            <a:tailEnd type="triangle"/>
+          </a:ln>
+        </p:spPr>
+        <p:style>
+          <a:lnRef idx="1">
+            <a:schemeClr val="accent1"/>
+          </a:lnRef>
+          <a:fillRef idx="0">
+            <a:schemeClr val="accent1"/>
+          </a:fillRef>
+          <a:effectRef idx="0">
+            <a:schemeClr val="accent1"/>
+          </a:effectRef>
+          <a:fontRef idx="minor">
+            <a:schemeClr val="tx1"/>
+          </a:fontRef>
+        </p:style>
+      </p:cxnSp>
+      <p:sp>
+        <p:nvSpPr>
+          <p:cNvPr id="5" name="Rectangle: Rounded Corners 4">
+            <a:extLst>
+              <a:ext uri="{FF2B5EF4-FFF2-40B4-BE49-F238E27FC236}">
+                <a16:creationId xmlns:a16="http://schemas.microsoft.com/office/drawing/2014/main" id="{81644366-2F25-F2F7-5FEF-68E7918678AF}"/>
+              </a:ext>
+            </a:extLst>
+          </p:cNvPr>
+          <p:cNvSpPr/>
+          <p:nvPr/>
+        </p:nvSpPr>
+        <p:spPr>
+          <a:xfrm>
+            <a:off x="2160361" y="4522888"/>
+            <a:ext cx="1585519" cy="771787"/>
+          </a:xfrm>
+          <a:prstGeom prst="roundRect">
+            <a:avLst/>
+          </a:prstGeom>
+        </p:spPr>
+        <p:style>
+          <a:lnRef idx="2">
+            <a:schemeClr val="accent1">
+              <a:shade val="15000"/>
+            </a:schemeClr>
+          </a:lnRef>
+          <a:fillRef idx="1">
+            <a:schemeClr val="accent1"/>
+          </a:fillRef>
+          <a:effectRef idx="0">
+            <a:schemeClr val="accent1"/>
+          </a:effectRef>
+          <a:fontRef idx="minor">
+            <a:schemeClr val="lt1"/>
+          </a:fontRef>
+        </p:style>
+        <p:txBody>
+          <a:bodyPr rtlCol="0" anchor="ctr"/>
+          <a:lstStyle/>
+          <a:p>
+            <a:pPr algn="ctr"/>
+            <a:r>
+              <a:rPr lang="es-CL" dirty="0"/>
+              <a:t>Botón</a:t>
+            </a:r>
+            <a:endParaRPr lang="en-US" dirty="0"/>
+          </a:p>
+        </p:txBody>
+      </p:sp>
+      <p:sp>
+        <p:nvSpPr>
+          <p:cNvPr id="6" name="Rectangle: Rounded Corners 5">
+            <a:extLst>
+              <a:ext uri="{FF2B5EF4-FFF2-40B4-BE49-F238E27FC236}">
+                <a16:creationId xmlns:a16="http://schemas.microsoft.com/office/drawing/2014/main" id="{C923CFE0-E567-CF16-0606-2862B4A90103}"/>
+              </a:ext>
+            </a:extLst>
+          </p:cNvPr>
+          <p:cNvSpPr/>
+          <p:nvPr/>
+        </p:nvSpPr>
+        <p:spPr>
+          <a:xfrm>
+            <a:off x="10303072" y="2569119"/>
+            <a:ext cx="1585519" cy="771787"/>
+          </a:xfrm>
+          <a:prstGeom prst="roundRect">
+            <a:avLst/>
+          </a:prstGeom>
+        </p:spPr>
+        <p:style>
+          <a:lnRef idx="2">
+            <a:schemeClr val="accent1">
+              <a:shade val="15000"/>
+            </a:schemeClr>
+          </a:lnRef>
+          <a:fillRef idx="1">
+            <a:schemeClr val="accent1"/>
+          </a:fillRef>
+          <a:effectRef idx="0">
+            <a:schemeClr val="accent1"/>
+          </a:effectRef>
+          <a:fontRef idx="minor">
+            <a:schemeClr val="lt1"/>
+          </a:fontRef>
+        </p:style>
+        <p:txBody>
+          <a:bodyPr rtlCol="0" anchor="ctr"/>
+          <a:lstStyle/>
+          <a:p>
+            <a:pPr algn="ctr"/>
+            <a:r>
+              <a:rPr lang="es-CL" dirty="0"/>
+              <a:t>Driver luz</a:t>
+            </a:r>
+            <a:endParaRPr lang="en-US" dirty="0"/>
+          </a:p>
+        </p:txBody>
+      </p:sp>
+      <p:cxnSp>
+        <p:nvCxnSpPr>
+          <p:cNvPr id="9" name="Straight Arrow Connector 8">
+            <a:extLst>
+              <a:ext uri="{FF2B5EF4-FFF2-40B4-BE49-F238E27FC236}">
+                <a16:creationId xmlns:a16="http://schemas.microsoft.com/office/drawing/2014/main" id="{A20AA6C5-849F-8953-9555-287A77555963}"/>
+              </a:ext>
+            </a:extLst>
+          </p:cNvPr>
+          <p:cNvCxnSpPr>
+            <a:stCxn id="6" idx="0"/>
+          </p:cNvCxnSpPr>
+          <p:nvPr/>
+        </p:nvCxnSpPr>
+        <p:spPr>
+          <a:xfrm flipV="1">
+            <a:off x="11095832" y="2248250"/>
+            <a:ext cx="0" cy="320869"/>
+          </a:xfrm>
+          <a:prstGeom prst="straightConnector1">
+            <a:avLst/>
+          </a:prstGeom>
+          <a:ln>
+            <a:tailEnd type="triangle"/>
+          </a:ln>
+        </p:spPr>
+        <p:style>
+          <a:lnRef idx="1">
+            <a:schemeClr val="accent1"/>
+          </a:lnRef>
+          <a:fillRef idx="0">
+            <a:schemeClr val="accent1"/>
+          </a:fillRef>
+          <a:effectRef idx="0">
+            <a:schemeClr val="accent1"/>
+          </a:effectRef>
+          <a:fontRef idx="minor">
+            <a:schemeClr val="tx1"/>
+          </a:fontRef>
+        </p:style>
+      </p:cxnSp>
+      <p:sp>
+        <p:nvSpPr>
+          <p:cNvPr id="10" name="Rectangle: Rounded Corners 9">
+            <a:extLst>
+              <a:ext uri="{FF2B5EF4-FFF2-40B4-BE49-F238E27FC236}">
+                <a16:creationId xmlns:a16="http://schemas.microsoft.com/office/drawing/2014/main" id="{4F30E946-E8F8-F396-3FD1-27441F8F8710}"/>
+              </a:ext>
+            </a:extLst>
+          </p:cNvPr>
+          <p:cNvSpPr/>
+          <p:nvPr/>
+        </p:nvSpPr>
+        <p:spPr>
+          <a:xfrm>
+            <a:off x="11597769" y="2482442"/>
+            <a:ext cx="401275" cy="283833"/>
+          </a:xfrm>
+          <a:prstGeom prst="roundRect">
+            <a:avLst/>
+          </a:prstGeom>
+        </p:spPr>
+        <p:style>
+          <a:lnRef idx="2">
+            <a:schemeClr val="accent6">
+              <a:shade val="15000"/>
+            </a:schemeClr>
+          </a:lnRef>
+          <a:fillRef idx="1">
+            <a:schemeClr val="accent6"/>
+          </a:fillRef>
+          <a:effectRef idx="0">
+            <a:schemeClr val="accent6"/>
+          </a:effectRef>
+          <a:fontRef idx="minor">
+            <a:schemeClr val="lt1"/>
+          </a:fontRef>
+        </p:style>
+        <p:txBody>
+          <a:bodyPr rtlCol="0" anchor="ctr"/>
+          <a:lstStyle/>
+          <a:p>
+            <a:pPr algn="ctr"/>
+            <a:r>
+              <a:rPr lang="es-CL" sz="1400" dirty="0"/>
+              <a:t>T2</a:t>
+            </a:r>
+            <a:endParaRPr lang="en-US" sz="1400" dirty="0"/>
+          </a:p>
+        </p:txBody>
+      </p:sp>
+      <p:sp>
+        <p:nvSpPr>
+          <p:cNvPr id="11" name="Rectangle: Rounded Corners 10">
+            <a:extLst>
+              <a:ext uri="{FF2B5EF4-FFF2-40B4-BE49-F238E27FC236}">
+                <a16:creationId xmlns:a16="http://schemas.microsoft.com/office/drawing/2014/main" id="{4B491064-803F-12F3-D6A1-B6106FBBFE12}"/>
+              </a:ext>
+            </a:extLst>
+          </p:cNvPr>
+          <p:cNvSpPr/>
+          <p:nvPr/>
+        </p:nvSpPr>
+        <p:spPr>
+          <a:xfrm>
+            <a:off x="1404664" y="4346162"/>
+            <a:ext cx="401275" cy="283833"/>
+          </a:xfrm>
+          <a:prstGeom prst="roundRect">
+            <a:avLst/>
+          </a:prstGeom>
+        </p:spPr>
+        <p:style>
+          <a:lnRef idx="2">
+            <a:schemeClr val="accent6">
+              <a:shade val="15000"/>
+            </a:schemeClr>
+          </a:lnRef>
+          <a:fillRef idx="1">
+            <a:schemeClr val="accent6"/>
+          </a:fillRef>
+          <a:effectRef idx="0">
+            <a:schemeClr val="accent6"/>
+          </a:effectRef>
+          <a:fontRef idx="minor">
+            <a:schemeClr val="lt1"/>
+          </a:fontRef>
+        </p:style>
+        <p:txBody>
+          <a:bodyPr rtlCol="0" anchor="ctr"/>
+          <a:lstStyle/>
+          <a:p>
+            <a:pPr algn="ctr"/>
+            <a:r>
+              <a:rPr lang="es-CL" sz="1400" dirty="0"/>
+              <a:t>T2</a:t>
+            </a:r>
+            <a:endParaRPr lang="en-US" sz="1400" dirty="0"/>
+          </a:p>
+        </p:txBody>
+      </p:sp>
+      <p:sp>
+        <p:nvSpPr>
+          <p:cNvPr id="13" name="Rectangle: Rounded Corners 12">
+            <a:extLst>
+              <a:ext uri="{FF2B5EF4-FFF2-40B4-BE49-F238E27FC236}">
+                <a16:creationId xmlns:a16="http://schemas.microsoft.com/office/drawing/2014/main" id="{865E1A09-0C6B-C3A0-2483-6ED4E27FFDE3}"/>
+              </a:ext>
+            </a:extLst>
+          </p:cNvPr>
+          <p:cNvSpPr/>
+          <p:nvPr/>
+        </p:nvSpPr>
+        <p:spPr>
+          <a:xfrm>
+            <a:off x="1252974" y="5478854"/>
+            <a:ext cx="401275" cy="283833"/>
+          </a:xfrm>
+          <a:prstGeom prst="roundRect">
+            <a:avLst/>
+          </a:prstGeom>
+        </p:spPr>
+        <p:style>
+          <a:lnRef idx="2">
+            <a:schemeClr val="accent6">
+              <a:shade val="15000"/>
+            </a:schemeClr>
+          </a:lnRef>
+          <a:fillRef idx="1">
+            <a:schemeClr val="accent6"/>
+          </a:fillRef>
+          <a:effectRef idx="0">
+            <a:schemeClr val="accent6"/>
+          </a:effectRef>
+          <a:fontRef idx="minor">
+            <a:schemeClr val="lt1"/>
+          </a:fontRef>
+        </p:style>
+        <p:txBody>
+          <a:bodyPr rtlCol="0" anchor="ctr"/>
+          <a:lstStyle/>
+          <a:p>
+            <a:pPr algn="ctr"/>
+            <a:r>
+              <a:rPr lang="es-CL" sz="1400" dirty="0"/>
+              <a:t>T2</a:t>
+            </a:r>
+            <a:endParaRPr lang="en-US" sz="1400" dirty="0"/>
+          </a:p>
+        </p:txBody>
+      </p:sp>
+      <p:sp>
+        <p:nvSpPr>
+          <p:cNvPr id="14" name="Rectangle: Rounded Corners 13">
+            <a:extLst>
+              <a:ext uri="{FF2B5EF4-FFF2-40B4-BE49-F238E27FC236}">
+                <a16:creationId xmlns:a16="http://schemas.microsoft.com/office/drawing/2014/main" id="{3164661E-C580-759D-47B3-31A97B92AEF7}"/>
+              </a:ext>
+            </a:extLst>
+          </p:cNvPr>
+          <p:cNvSpPr/>
+          <p:nvPr/>
+        </p:nvSpPr>
+        <p:spPr>
+          <a:xfrm>
+            <a:off x="2152125" y="5620770"/>
+            <a:ext cx="1585519" cy="771787"/>
+          </a:xfrm>
+          <a:prstGeom prst="roundRect">
+            <a:avLst/>
+          </a:prstGeom>
+        </p:spPr>
+        <p:style>
+          <a:lnRef idx="2">
+            <a:schemeClr val="accent1">
+              <a:shade val="15000"/>
+            </a:schemeClr>
+          </a:lnRef>
+          <a:fillRef idx="1">
+            <a:schemeClr val="accent1"/>
+          </a:fillRef>
+          <a:effectRef idx="0">
+            <a:schemeClr val="accent1"/>
+          </a:effectRef>
+          <a:fontRef idx="minor">
+            <a:schemeClr val="lt1"/>
+          </a:fontRef>
+        </p:style>
+        <p:txBody>
+          <a:bodyPr rtlCol="0" anchor="ctr"/>
+          <a:lstStyle/>
+          <a:p>
+            <a:pPr algn="ctr"/>
+            <a:r>
+              <a:rPr lang="es-CL" dirty="0"/>
+              <a:t>T-</a:t>
+            </a:r>
+            <a:r>
+              <a:rPr lang="es-CL" dirty="0" err="1"/>
+              <a:t>flip</a:t>
+            </a:r>
+            <a:r>
+              <a:rPr lang="es-CL" dirty="0"/>
+              <a:t> </a:t>
+            </a:r>
+            <a:r>
+              <a:rPr lang="es-CL" dirty="0" err="1"/>
+              <a:t>flop</a:t>
+            </a:r>
+            <a:r>
+              <a:rPr lang="es-CL" dirty="0"/>
+              <a:t> (ON/OFF)</a:t>
+            </a:r>
+            <a:endParaRPr lang="en-US" dirty="0"/>
+          </a:p>
+        </p:txBody>
+      </p:sp>
+      <p:sp>
+        <p:nvSpPr>
+          <p:cNvPr id="15" name="Rectangle: Rounded Corners 14">
+            <a:extLst>
+              <a:ext uri="{FF2B5EF4-FFF2-40B4-BE49-F238E27FC236}">
+                <a16:creationId xmlns:a16="http://schemas.microsoft.com/office/drawing/2014/main" id="{B7C52F25-CDD7-4F73-DD33-750E969AD784}"/>
+              </a:ext>
+            </a:extLst>
+          </p:cNvPr>
+          <p:cNvSpPr/>
+          <p:nvPr/>
+        </p:nvSpPr>
+        <p:spPr>
+          <a:xfrm>
+            <a:off x="3554135" y="6155542"/>
+            <a:ext cx="401275" cy="283833"/>
+          </a:xfrm>
+          <a:prstGeom prst="roundRect">
+            <a:avLst/>
+          </a:prstGeom>
+        </p:spPr>
+        <p:style>
+          <a:lnRef idx="2">
+            <a:schemeClr val="accent6">
+              <a:shade val="15000"/>
+            </a:schemeClr>
+          </a:lnRef>
+          <a:fillRef idx="1">
+            <a:schemeClr val="accent6"/>
+          </a:fillRef>
+          <a:effectRef idx="0">
+            <a:schemeClr val="accent6"/>
+          </a:effectRef>
+          <a:fontRef idx="minor">
+            <a:schemeClr val="lt1"/>
+          </a:fontRef>
+        </p:style>
+        <p:txBody>
+          <a:bodyPr rtlCol="0" anchor="ctr"/>
+          <a:lstStyle/>
+          <a:p>
+            <a:pPr algn="ctr"/>
+            <a:r>
+              <a:rPr lang="es-CL" sz="1400" dirty="0"/>
+              <a:t>T2</a:t>
+            </a:r>
+            <a:endParaRPr lang="en-US" sz="1400" dirty="0"/>
+          </a:p>
+        </p:txBody>
+      </p:sp>
+      <p:sp>
+        <p:nvSpPr>
+          <p:cNvPr id="16" name="Rectangle: Rounded Corners 15">
+            <a:extLst>
+              <a:ext uri="{FF2B5EF4-FFF2-40B4-BE49-F238E27FC236}">
+                <a16:creationId xmlns:a16="http://schemas.microsoft.com/office/drawing/2014/main" id="{B4ADA694-90D3-2A41-9E60-3D78A4CBE3FC}"/>
+              </a:ext>
+            </a:extLst>
+          </p:cNvPr>
+          <p:cNvSpPr/>
+          <p:nvPr/>
+        </p:nvSpPr>
+        <p:spPr>
+          <a:xfrm>
+            <a:off x="3560089" y="6439375"/>
+            <a:ext cx="519414" cy="299015"/>
+          </a:xfrm>
+          <a:prstGeom prst="roundRect">
+            <a:avLst/>
+          </a:prstGeom>
+          <a:solidFill>
+            <a:schemeClr val="accent6"/>
+          </a:solidFill>
+        </p:spPr>
+        <p:style>
+          <a:lnRef idx="2">
+            <a:schemeClr val="accent1">
+              <a:shade val="15000"/>
+            </a:schemeClr>
+          </a:lnRef>
+          <a:fillRef idx="1">
+            <a:schemeClr val="accent1"/>
+          </a:fillRef>
+          <a:effectRef idx="0">
+            <a:schemeClr val="accent1"/>
+          </a:effectRef>
+          <a:fontRef idx="minor">
+            <a:schemeClr val="lt1"/>
+          </a:fontRef>
+        </p:style>
+        <p:txBody>
+          <a:bodyPr rtlCol="0" anchor="ctr"/>
+          <a:lstStyle/>
+          <a:p>
+            <a:pPr algn="ctr"/>
+            <a:r>
+              <a:rPr lang="es-CL" sz="1400" dirty="0"/>
+              <a:t>(RS)</a:t>
+            </a:r>
+            <a:endParaRPr lang="en-US" sz="1400" dirty="0"/>
+          </a:p>
+        </p:txBody>
+      </p:sp>
+      <p:sp>
+        <p:nvSpPr>
+          <p:cNvPr id="17" name="Rectangle: Rounded Corners 16">
+            <a:extLst>
+              <a:ext uri="{FF2B5EF4-FFF2-40B4-BE49-F238E27FC236}">
+                <a16:creationId xmlns:a16="http://schemas.microsoft.com/office/drawing/2014/main" id="{74D65C1A-89C4-B830-1B23-3B1D33ADDB9A}"/>
+              </a:ext>
+            </a:extLst>
+          </p:cNvPr>
+          <p:cNvSpPr/>
+          <p:nvPr/>
+        </p:nvSpPr>
+        <p:spPr>
+          <a:xfrm>
+            <a:off x="3537718" y="4714085"/>
+            <a:ext cx="401275" cy="283833"/>
+          </a:xfrm>
+          <a:prstGeom prst="roundRect">
+            <a:avLst/>
+          </a:prstGeom>
+        </p:spPr>
+        <p:style>
+          <a:lnRef idx="2">
+            <a:schemeClr val="accent6">
+              <a:shade val="15000"/>
+            </a:schemeClr>
+          </a:lnRef>
+          <a:fillRef idx="1">
+            <a:schemeClr val="accent6"/>
+          </a:fillRef>
+          <a:effectRef idx="0">
+            <a:schemeClr val="accent6"/>
+          </a:effectRef>
+          <a:fontRef idx="minor">
+            <a:schemeClr val="lt1"/>
+          </a:fontRef>
+        </p:style>
+        <p:txBody>
+          <a:bodyPr rtlCol="0" anchor="ctr"/>
+          <a:lstStyle/>
+          <a:p>
+            <a:pPr algn="ctr"/>
+            <a:r>
+              <a:rPr lang="es-CL" sz="1400" dirty="0"/>
+              <a:t>T2</a:t>
+            </a:r>
+            <a:endParaRPr lang="en-US" sz="1400" dirty="0"/>
+          </a:p>
+        </p:txBody>
+      </p:sp>
+      <p:cxnSp>
+        <p:nvCxnSpPr>
+          <p:cNvPr id="18" name="Connector: Elbow 17">
+            <a:extLst>
+              <a:ext uri="{FF2B5EF4-FFF2-40B4-BE49-F238E27FC236}">
+                <a16:creationId xmlns:a16="http://schemas.microsoft.com/office/drawing/2014/main" id="{785DC869-6D94-1002-5499-3D5834DA34A9}"/>
+              </a:ext>
+            </a:extLst>
+          </p:cNvPr>
+          <p:cNvCxnSpPr/>
+          <p:nvPr/>
+        </p:nvCxnSpPr>
+        <p:spPr>
+          <a:xfrm rot="5400000">
+            <a:off x="2785956" y="5453604"/>
+            <a:ext cx="326095" cy="8236"/>
+          </a:xfrm>
+          <a:prstGeom prst="bentConnector3">
+            <a:avLst/>
+          </a:prstGeom>
+          <a:ln>
+            <a:tailEnd type="triangle"/>
+          </a:ln>
+        </p:spPr>
+        <p:style>
+          <a:lnRef idx="1">
+            <a:schemeClr val="accent1"/>
+          </a:lnRef>
+          <a:fillRef idx="0">
+            <a:schemeClr val="accent1"/>
+          </a:fillRef>
+          <a:effectRef idx="0">
+            <a:schemeClr val="accent1"/>
+          </a:effectRef>
+          <a:fontRef idx="minor">
+            <a:schemeClr val="tx1"/>
+          </a:fontRef>
+        </p:style>
+      </p:cxnSp>
+    </p:spTree>
+    <p:extLst>
+      <p:ext uri="{BB962C8B-B14F-4D97-AF65-F5344CB8AC3E}">
+        <p14:creationId xmlns:p14="http://schemas.microsoft.com/office/powerpoint/2010/main" val="3409246693"/>
+      </p:ext>
+    </p:extLst>
+  </p:cSld>
+  <p:clrMapOvr>
+    <a:masterClrMapping/>
+  </p:clrMapOvr>
+</p:sld>
+</file>
+
 <file path=ppt/theme/theme1.xml><?xml version="1.0" encoding="utf-8"?>
 <a:theme xmlns:a="http://schemas.openxmlformats.org/drawingml/2006/main" name="Office Theme">
   <a:themeElements>

</xml_diff>

<commit_message>
update TX and notas to 2/2025
</commit_message>
<xml_diff>
--- a/img/TX.pptx
+++ b/img/TX.pptx
@@ -5,7 +5,7 @@
     <p:sldMasterId id="2147483648" r:id="rId1"/>
   </p:sldMasterIdLst>
   <p:sldIdLst>
-    <p:sldId id="259" r:id="rId2"/>
+    <p:sldId id="260" r:id="rId2"/>
   </p:sldIdLst>
   <p:sldSz cx="12192000" cy="6858000"/>
   <p:notesSz cx="6858000" cy="9144000"/>
@@ -259,7 +259,7 @@
           <a:p>
             <a:fld id="{6BD44EFA-B01F-4EEC-BDEE-1E8697900FDD}" type="datetimeFigureOut">
               <a:rPr lang="en-US" smtClean="0"/>
-              <a:t>3/8/2025</a:t>
+              <a:t>8/17/2025</a:t>
             </a:fld>
             <a:endParaRPr lang="en-US"/>
           </a:p>
@@ -457,7 +457,7 @@
           <a:p>
             <a:fld id="{6BD44EFA-B01F-4EEC-BDEE-1E8697900FDD}" type="datetimeFigureOut">
               <a:rPr lang="en-US" smtClean="0"/>
-              <a:t>3/8/2025</a:t>
+              <a:t>8/17/2025</a:t>
             </a:fld>
             <a:endParaRPr lang="en-US"/>
           </a:p>
@@ -665,7 +665,7 @@
           <a:p>
             <a:fld id="{6BD44EFA-B01F-4EEC-BDEE-1E8697900FDD}" type="datetimeFigureOut">
               <a:rPr lang="en-US" smtClean="0"/>
-              <a:t>3/8/2025</a:t>
+              <a:t>8/17/2025</a:t>
             </a:fld>
             <a:endParaRPr lang="en-US"/>
           </a:p>
@@ -863,7 +863,7 @@
           <a:p>
             <a:fld id="{6BD44EFA-B01F-4EEC-BDEE-1E8697900FDD}" type="datetimeFigureOut">
               <a:rPr lang="en-US" smtClean="0"/>
-              <a:t>3/8/2025</a:t>
+              <a:t>8/17/2025</a:t>
             </a:fld>
             <a:endParaRPr lang="en-US"/>
           </a:p>
@@ -1138,7 +1138,7 @@
           <a:p>
             <a:fld id="{6BD44EFA-B01F-4EEC-BDEE-1E8697900FDD}" type="datetimeFigureOut">
               <a:rPr lang="en-US" smtClean="0"/>
-              <a:t>3/8/2025</a:t>
+              <a:t>8/17/2025</a:t>
             </a:fld>
             <a:endParaRPr lang="en-US"/>
           </a:p>
@@ -1403,7 +1403,7 @@
           <a:p>
             <a:fld id="{6BD44EFA-B01F-4EEC-BDEE-1E8697900FDD}" type="datetimeFigureOut">
               <a:rPr lang="en-US" smtClean="0"/>
-              <a:t>3/8/2025</a:t>
+              <a:t>8/17/2025</a:t>
             </a:fld>
             <a:endParaRPr lang="en-US"/>
           </a:p>
@@ -1815,7 +1815,7 @@
           <a:p>
             <a:fld id="{6BD44EFA-B01F-4EEC-BDEE-1E8697900FDD}" type="datetimeFigureOut">
               <a:rPr lang="en-US" smtClean="0"/>
-              <a:t>3/8/2025</a:t>
+              <a:t>8/17/2025</a:t>
             </a:fld>
             <a:endParaRPr lang="en-US"/>
           </a:p>
@@ -1956,7 +1956,7 @@
           <a:p>
             <a:fld id="{6BD44EFA-B01F-4EEC-BDEE-1E8697900FDD}" type="datetimeFigureOut">
               <a:rPr lang="en-US" smtClean="0"/>
-              <a:t>3/8/2025</a:t>
+              <a:t>8/17/2025</a:t>
             </a:fld>
             <a:endParaRPr lang="en-US"/>
           </a:p>
@@ -2069,7 +2069,7 @@
           <a:p>
             <a:fld id="{6BD44EFA-B01F-4EEC-BDEE-1E8697900FDD}" type="datetimeFigureOut">
               <a:rPr lang="en-US" smtClean="0"/>
-              <a:t>3/8/2025</a:t>
+              <a:t>8/17/2025</a:t>
             </a:fld>
             <a:endParaRPr lang="en-US"/>
           </a:p>
@@ -2380,7 +2380,7 @@
           <a:p>
             <a:fld id="{6BD44EFA-B01F-4EEC-BDEE-1E8697900FDD}" type="datetimeFigureOut">
               <a:rPr lang="en-US" smtClean="0"/>
-              <a:t>3/8/2025</a:t>
+              <a:t>8/17/2025</a:t>
             </a:fld>
             <a:endParaRPr lang="en-US"/>
           </a:p>
@@ -2668,7 +2668,7 @@
           <a:p>
             <a:fld id="{6BD44EFA-B01F-4EEC-BDEE-1E8697900FDD}" type="datetimeFigureOut">
               <a:rPr lang="en-US" smtClean="0"/>
-              <a:t>3/8/2025</a:t>
+              <a:t>8/17/2025</a:t>
             </a:fld>
             <a:endParaRPr lang="en-US"/>
           </a:p>
@@ -2909,7 +2909,7 @@
           <a:p>
             <a:fld id="{6BD44EFA-B01F-4EEC-BDEE-1E8697900FDD}" type="datetimeFigureOut">
               <a:rPr lang="en-US" smtClean="0"/>
-              <a:t>3/8/2025</a:t>
+              <a:t>8/17/2025</a:t>
             </a:fld>
             <a:endParaRPr lang="en-US"/>
           </a:p>
@@ -3317,7 +3317,7 @@
         <p:cNvPr id="1" name="">
           <a:extLst>
             <a:ext uri="{FF2B5EF4-FFF2-40B4-BE49-F238E27FC236}">
-              <a16:creationId xmlns:a16="http://schemas.microsoft.com/office/drawing/2014/main" id="{B1CA129C-9BC8-7446-6D30-CCAC5FAB4C76}"/>
+              <a16:creationId xmlns:a16="http://schemas.microsoft.com/office/drawing/2014/main" id="{F04EA4DB-19B0-3F2D-4600-665989964765}"/>
             </a:ext>
           </a:extLst>
         </p:cNvPr>
@@ -3334,10 +3334,10 @@
       </p:grpSpPr>
       <p:sp>
         <p:nvSpPr>
-          <p:cNvPr id="75" name="Rectangle: Rounded Corners 74">
-            <a:extLst>
-              <a:ext uri="{FF2B5EF4-FFF2-40B4-BE49-F238E27FC236}">
-                <a16:creationId xmlns:a16="http://schemas.microsoft.com/office/drawing/2014/main" id="{4F660BC8-10D3-E3B6-0851-7308AA3EE028}"/>
+          <p:cNvPr id="4" name="Rectangle: Rounded Corners 3">
+            <a:extLst>
+              <a:ext uri="{FF2B5EF4-FFF2-40B4-BE49-F238E27FC236}">
+                <a16:creationId xmlns:a16="http://schemas.microsoft.com/office/drawing/2014/main" id="{D77F7598-6833-EFA4-1680-EA357E7D416C}"/>
               </a:ext>
             </a:extLst>
           </p:cNvPr>
@@ -3346,7 +3346,7 @@
         </p:nvSpPr>
         <p:spPr>
           <a:xfrm>
-            <a:off x="296244" y="460803"/>
+            <a:off x="334030" y="2281139"/>
             <a:ext cx="1585519" cy="771787"/>
           </a:xfrm>
           <a:prstGeom prst="roundRect">
@@ -3376,7 +3376,7 @@
             <a:pPr algn="ctr"/>
             <a:r>
               <a:rPr lang="es-CL" dirty="0"/>
-              <a:t>Fuente de luz verde</a:t>
+              <a:t>micrófono</a:t>
             </a:r>
             <a:endParaRPr lang="en-US" dirty="0"/>
           </a:p>
@@ -3384,10 +3384,10 @@
       </p:sp>
       <p:sp>
         <p:nvSpPr>
-          <p:cNvPr id="2" name="Rectangle: Rounded Corners 1">
-            <a:extLst>
-              <a:ext uri="{FF2B5EF4-FFF2-40B4-BE49-F238E27FC236}">
-                <a16:creationId xmlns:a16="http://schemas.microsoft.com/office/drawing/2014/main" id="{298D98E5-C63D-8BF0-36DD-5E350B71AC94}"/>
+          <p:cNvPr id="5" name="Rectangle: Rounded Corners 4">
+            <a:extLst>
+              <a:ext uri="{FF2B5EF4-FFF2-40B4-BE49-F238E27FC236}">
+                <a16:creationId xmlns:a16="http://schemas.microsoft.com/office/drawing/2014/main" id="{872CD837-96F8-6E12-3DC4-2389E2172D4A}"/>
               </a:ext>
             </a:extLst>
           </p:cNvPr>
@@ -3396,7 +3396,57 @@
         </p:nvSpPr>
         <p:spPr>
           <a:xfrm>
-            <a:off x="2662926" y="483158"/>
+            <a:off x="1663009" y="2139222"/>
+            <a:ext cx="401275" cy="283833"/>
+          </a:xfrm>
+          <a:prstGeom prst="roundRect">
+            <a:avLst/>
+          </a:prstGeom>
+        </p:spPr>
+        <p:style>
+          <a:lnRef idx="2">
+            <a:schemeClr val="accent6">
+              <a:shade val="15000"/>
+            </a:schemeClr>
+          </a:lnRef>
+          <a:fillRef idx="1">
+            <a:schemeClr val="accent6"/>
+          </a:fillRef>
+          <a:effectRef idx="0">
+            <a:schemeClr val="accent6"/>
+          </a:effectRef>
+          <a:fontRef idx="minor">
+            <a:schemeClr val="lt1"/>
+          </a:fontRef>
+        </p:style>
+        <p:txBody>
+          <a:bodyPr rtlCol="0" anchor="ctr"/>
+          <a:lstStyle/>
+          <a:p>
+            <a:pPr algn="ctr"/>
+            <a:r>
+              <a:rPr lang="es-CL" sz="1400" dirty="0"/>
+              <a:t>T2</a:t>
+            </a:r>
+            <a:endParaRPr lang="en-US" sz="1400" dirty="0"/>
+          </a:p>
+        </p:txBody>
+      </p:sp>
+      <p:sp>
+        <p:nvSpPr>
+          <p:cNvPr id="6" name="Rectangle: Rounded Corners 5">
+            <a:extLst>
+              <a:ext uri="{FF2B5EF4-FFF2-40B4-BE49-F238E27FC236}">
+                <a16:creationId xmlns:a16="http://schemas.microsoft.com/office/drawing/2014/main" id="{ECDC8EFA-77E9-7B31-0AEF-51A0E8DFD9EE}"/>
+              </a:ext>
+            </a:extLst>
+          </p:cNvPr>
+          <p:cNvSpPr/>
+          <p:nvPr/>
+        </p:nvSpPr>
+        <p:spPr>
+          <a:xfrm>
+            <a:off x="2501312" y="2287889"/>
             <a:ext cx="1585519" cy="771787"/>
           </a:xfrm>
           <a:prstGeom prst="roundRect">
@@ -3426,7 +3476,7 @@
             <a:pPr algn="ctr"/>
             <a:r>
               <a:rPr lang="es-CL" dirty="0"/>
-              <a:t>Detector óptico</a:t>
+              <a:t>Amplificador 1</a:t>
             </a:r>
             <a:endParaRPr lang="en-US" dirty="0"/>
           </a:p>
@@ -3434,10 +3484,10 @@
       </p:sp>
       <p:sp>
         <p:nvSpPr>
-          <p:cNvPr id="3" name="Rectangle: Rounded Corners 2">
-            <a:extLst>
-              <a:ext uri="{FF2B5EF4-FFF2-40B4-BE49-F238E27FC236}">
-                <a16:creationId xmlns:a16="http://schemas.microsoft.com/office/drawing/2014/main" id="{16B7E7F0-8BC7-FEF5-8E8F-7C0F71D6C064}"/>
+          <p:cNvPr id="7" name="Rectangle: Rounded Corners 6">
+            <a:extLst>
+              <a:ext uri="{FF2B5EF4-FFF2-40B4-BE49-F238E27FC236}">
+                <a16:creationId xmlns:a16="http://schemas.microsoft.com/office/drawing/2014/main" id="{9F4373F1-D9C5-63A7-03CF-CE3F9390E64C}"/>
               </a:ext>
             </a:extLst>
           </p:cNvPr>
@@ -3446,1577 +3496,7 @@
         </p:nvSpPr>
         <p:spPr>
           <a:xfrm>
-            <a:off x="4510481" y="483158"/>
-            <a:ext cx="1585519" cy="771787"/>
-          </a:xfrm>
-          <a:prstGeom prst="roundRect">
-            <a:avLst/>
-          </a:prstGeom>
-        </p:spPr>
-        <p:style>
-          <a:lnRef idx="2">
-            <a:schemeClr val="accent1">
-              <a:shade val="15000"/>
-            </a:schemeClr>
-          </a:lnRef>
-          <a:fillRef idx="1">
-            <a:schemeClr val="accent1"/>
-          </a:fillRef>
-          <a:effectRef idx="0">
-            <a:schemeClr val="accent1"/>
-          </a:effectRef>
-          <a:fontRef idx="minor">
-            <a:schemeClr val="lt1"/>
-          </a:fontRef>
-        </p:style>
-        <p:txBody>
-          <a:bodyPr rtlCol="0" anchor="ctr"/>
-          <a:lstStyle/>
-          <a:p>
-            <a:pPr algn="ctr"/>
-            <a:r>
-              <a:rPr lang="es-CL" dirty="0"/>
-              <a:t>Amplificador y filtro 1</a:t>
-            </a:r>
-            <a:endParaRPr lang="en-US" dirty="0"/>
-          </a:p>
-        </p:txBody>
-      </p:sp>
-      <p:sp>
-        <p:nvSpPr>
-          <p:cNvPr id="18" name="Rectangle: Rounded Corners 17">
-            <a:extLst>
-              <a:ext uri="{FF2B5EF4-FFF2-40B4-BE49-F238E27FC236}">
-                <a16:creationId xmlns:a16="http://schemas.microsoft.com/office/drawing/2014/main" id="{982AFB2C-B078-0CE8-8E19-19B3D076B5CE}"/>
-              </a:ext>
-            </a:extLst>
-          </p:cNvPr>
-          <p:cNvSpPr/>
-          <p:nvPr/>
-        </p:nvSpPr>
-        <p:spPr>
-          <a:xfrm>
-            <a:off x="6267563" y="483158"/>
-            <a:ext cx="1585519" cy="771787"/>
-          </a:xfrm>
-          <a:prstGeom prst="roundRect">
-            <a:avLst/>
-          </a:prstGeom>
-        </p:spPr>
-        <p:style>
-          <a:lnRef idx="2">
-            <a:schemeClr val="accent1">
-              <a:shade val="15000"/>
-            </a:schemeClr>
-          </a:lnRef>
-          <a:fillRef idx="1">
-            <a:schemeClr val="accent1"/>
-          </a:fillRef>
-          <a:effectRef idx="0">
-            <a:schemeClr val="accent1"/>
-          </a:effectRef>
-          <a:fontRef idx="minor">
-            <a:schemeClr val="lt1"/>
-          </a:fontRef>
-        </p:style>
-        <p:txBody>
-          <a:bodyPr rtlCol="0" anchor="ctr"/>
-          <a:lstStyle/>
-          <a:p>
-            <a:pPr algn="ctr"/>
-            <a:r>
-              <a:rPr lang="es-CL" dirty="0"/>
-              <a:t>Amplificador y filtro 2</a:t>
-            </a:r>
-            <a:endParaRPr lang="en-US" dirty="0"/>
-          </a:p>
-        </p:txBody>
-      </p:sp>
-      <p:sp>
-        <p:nvSpPr>
-          <p:cNvPr id="21" name="Rectangle: Rounded Corners 20">
-            <a:extLst>
-              <a:ext uri="{FF2B5EF4-FFF2-40B4-BE49-F238E27FC236}">
-                <a16:creationId xmlns:a16="http://schemas.microsoft.com/office/drawing/2014/main" id="{BB2D7C04-7189-F48F-659F-1077A6B0E817}"/>
-              </a:ext>
-            </a:extLst>
-          </p:cNvPr>
-          <p:cNvSpPr/>
-          <p:nvPr/>
-        </p:nvSpPr>
-        <p:spPr>
-          <a:xfrm>
-            <a:off x="8024645" y="483158"/>
-            <a:ext cx="1585519" cy="771787"/>
-          </a:xfrm>
-          <a:prstGeom prst="roundRect">
-            <a:avLst/>
-          </a:prstGeom>
-        </p:spPr>
-        <p:style>
-          <a:lnRef idx="2">
-            <a:schemeClr val="accent1">
-              <a:shade val="15000"/>
-            </a:schemeClr>
-          </a:lnRef>
-          <a:fillRef idx="1">
-            <a:schemeClr val="accent1"/>
-          </a:fillRef>
-          <a:effectRef idx="0">
-            <a:schemeClr val="accent1"/>
-          </a:effectRef>
-          <a:fontRef idx="minor">
-            <a:schemeClr val="lt1"/>
-          </a:fontRef>
-        </p:style>
-        <p:txBody>
-          <a:bodyPr rtlCol="0" anchor="ctr"/>
-          <a:lstStyle/>
-          <a:p>
-            <a:pPr algn="ctr"/>
-            <a:r>
-              <a:rPr lang="es-CL" dirty="0"/>
-              <a:t>Comparador</a:t>
-            </a:r>
-            <a:endParaRPr lang="en-US" dirty="0"/>
-          </a:p>
-        </p:txBody>
-      </p:sp>
-      <p:sp>
-        <p:nvSpPr>
-          <p:cNvPr id="23" name="Rectangle: Rounded Corners 22">
-            <a:extLst>
-              <a:ext uri="{FF2B5EF4-FFF2-40B4-BE49-F238E27FC236}">
-                <a16:creationId xmlns:a16="http://schemas.microsoft.com/office/drawing/2014/main" id="{93692AC2-ACCD-4F39-2032-61A5CA477E41}"/>
-              </a:ext>
-            </a:extLst>
-          </p:cNvPr>
-          <p:cNvSpPr/>
-          <p:nvPr/>
-        </p:nvSpPr>
-        <p:spPr>
-          <a:xfrm>
-            <a:off x="660314" y="2519905"/>
-            <a:ext cx="1585519" cy="771787"/>
-          </a:xfrm>
-          <a:prstGeom prst="roundRect">
-            <a:avLst/>
-          </a:prstGeom>
-        </p:spPr>
-        <p:style>
-          <a:lnRef idx="2">
-            <a:schemeClr val="accent1">
-              <a:shade val="15000"/>
-            </a:schemeClr>
-          </a:lnRef>
-          <a:fillRef idx="1">
-            <a:schemeClr val="accent1"/>
-          </a:fillRef>
-          <a:effectRef idx="0">
-            <a:schemeClr val="accent1"/>
-          </a:effectRef>
-          <a:fontRef idx="minor">
-            <a:schemeClr val="lt1"/>
-          </a:fontRef>
-        </p:style>
-        <p:txBody>
-          <a:bodyPr rtlCol="0" anchor="ctr"/>
-          <a:lstStyle/>
-          <a:p>
-            <a:pPr algn="ctr"/>
-            <a:r>
-              <a:rPr lang="es-CL" dirty="0"/>
-              <a:t>Generador de pulso</a:t>
-            </a:r>
-            <a:endParaRPr lang="en-US" dirty="0"/>
-          </a:p>
-        </p:txBody>
-      </p:sp>
-      <p:sp>
-        <p:nvSpPr>
-          <p:cNvPr id="34" name="Rectangle: Rounded Corners 33">
-            <a:extLst>
-              <a:ext uri="{FF2B5EF4-FFF2-40B4-BE49-F238E27FC236}">
-                <a16:creationId xmlns:a16="http://schemas.microsoft.com/office/drawing/2014/main" id="{7AA697BD-FD88-8E03-8B06-09BAB5D098D9}"/>
-              </a:ext>
-            </a:extLst>
-          </p:cNvPr>
-          <p:cNvSpPr/>
-          <p:nvPr/>
-        </p:nvSpPr>
-        <p:spPr>
-          <a:xfrm>
-            <a:off x="2507868" y="2519905"/>
-            <a:ext cx="1585519" cy="771787"/>
-          </a:xfrm>
-          <a:prstGeom prst="roundRect">
-            <a:avLst/>
-          </a:prstGeom>
-        </p:spPr>
-        <p:style>
-          <a:lnRef idx="2">
-            <a:schemeClr val="accent1">
-              <a:shade val="15000"/>
-            </a:schemeClr>
-          </a:lnRef>
-          <a:fillRef idx="1">
-            <a:schemeClr val="accent1"/>
-          </a:fillRef>
-          <a:effectRef idx="0">
-            <a:schemeClr val="accent1"/>
-          </a:effectRef>
-          <a:fontRef idx="minor">
-            <a:schemeClr val="lt1"/>
-          </a:fontRef>
-        </p:style>
-        <p:txBody>
-          <a:bodyPr rtlCol="0" anchor="ctr"/>
-          <a:lstStyle/>
-          <a:p>
-            <a:pPr algn="ctr"/>
-            <a:r>
-              <a:rPr lang="es-CL" dirty="0"/>
-              <a:t>Multivibrador monoestable</a:t>
-            </a:r>
-            <a:endParaRPr lang="en-US" dirty="0"/>
-          </a:p>
-        </p:txBody>
-      </p:sp>
-      <p:sp>
-        <p:nvSpPr>
-          <p:cNvPr id="38" name="Rectangle: Rounded Corners 37">
-            <a:extLst>
-              <a:ext uri="{FF2B5EF4-FFF2-40B4-BE49-F238E27FC236}">
-                <a16:creationId xmlns:a16="http://schemas.microsoft.com/office/drawing/2014/main" id="{33813D1B-C625-8C8B-5689-8051080692EF}"/>
-              </a:ext>
-            </a:extLst>
-          </p:cNvPr>
-          <p:cNvSpPr/>
-          <p:nvPr/>
-        </p:nvSpPr>
-        <p:spPr>
-          <a:xfrm>
-            <a:off x="5021849" y="1946164"/>
-            <a:ext cx="1585519" cy="771787"/>
-          </a:xfrm>
-          <a:prstGeom prst="roundRect">
-            <a:avLst/>
-          </a:prstGeom>
-        </p:spPr>
-        <p:style>
-          <a:lnRef idx="2">
-            <a:schemeClr val="accent1">
-              <a:shade val="15000"/>
-            </a:schemeClr>
-          </a:lnRef>
-          <a:fillRef idx="1">
-            <a:schemeClr val="accent1"/>
-          </a:fillRef>
-          <a:effectRef idx="0">
-            <a:schemeClr val="accent1"/>
-          </a:effectRef>
-          <a:fontRef idx="minor">
-            <a:schemeClr val="lt1"/>
-          </a:fontRef>
-        </p:style>
-        <p:txBody>
-          <a:bodyPr rtlCol="0" anchor="ctr"/>
-          <a:lstStyle/>
-          <a:p>
-            <a:pPr algn="ctr"/>
-            <a:r>
-              <a:rPr lang="es-CL" dirty="0"/>
-              <a:t>Indicador de pulso</a:t>
-            </a:r>
-            <a:endParaRPr lang="en-US" dirty="0"/>
-          </a:p>
-        </p:txBody>
-      </p:sp>
-      <p:sp>
-        <p:nvSpPr>
-          <p:cNvPr id="40" name="Rectangle: Rounded Corners 39">
-            <a:extLst>
-              <a:ext uri="{FF2B5EF4-FFF2-40B4-BE49-F238E27FC236}">
-                <a16:creationId xmlns:a16="http://schemas.microsoft.com/office/drawing/2014/main" id="{B526BDB3-6DEE-FF5F-E62E-BD047A3BAA91}"/>
-              </a:ext>
-            </a:extLst>
-          </p:cNvPr>
-          <p:cNvSpPr/>
-          <p:nvPr/>
-        </p:nvSpPr>
-        <p:spPr>
-          <a:xfrm>
-            <a:off x="5021850" y="2905798"/>
-            <a:ext cx="1585519" cy="771787"/>
-          </a:xfrm>
-          <a:prstGeom prst="roundRect">
-            <a:avLst/>
-          </a:prstGeom>
-        </p:spPr>
-        <p:style>
-          <a:lnRef idx="2">
-            <a:schemeClr val="accent1">
-              <a:shade val="15000"/>
-            </a:schemeClr>
-          </a:lnRef>
-          <a:fillRef idx="1">
-            <a:schemeClr val="accent1"/>
-          </a:fillRef>
-          <a:effectRef idx="0">
-            <a:schemeClr val="accent1"/>
-          </a:effectRef>
-          <a:fontRef idx="minor">
-            <a:schemeClr val="lt1"/>
-          </a:fontRef>
-        </p:style>
-        <p:txBody>
-          <a:bodyPr rtlCol="0" anchor="ctr"/>
-          <a:lstStyle/>
-          <a:p>
-            <a:pPr algn="ctr"/>
-            <a:r>
-              <a:rPr lang="es-CL" dirty="0"/>
-              <a:t>Filtro paso-baja</a:t>
-            </a:r>
-            <a:endParaRPr lang="en-US" dirty="0"/>
-          </a:p>
-        </p:txBody>
-      </p:sp>
-      <p:sp>
-        <p:nvSpPr>
-          <p:cNvPr id="41" name="Rectangle: Rounded Corners 40">
-            <a:extLst>
-              <a:ext uri="{FF2B5EF4-FFF2-40B4-BE49-F238E27FC236}">
-                <a16:creationId xmlns:a16="http://schemas.microsoft.com/office/drawing/2014/main" id="{D46CE925-608B-48F6-446F-FB51B439B55E}"/>
-              </a:ext>
-            </a:extLst>
-          </p:cNvPr>
-          <p:cNvSpPr/>
-          <p:nvPr/>
-        </p:nvSpPr>
-        <p:spPr>
-          <a:xfrm>
-            <a:off x="5057710" y="3963634"/>
-            <a:ext cx="1585519" cy="771787"/>
-          </a:xfrm>
-          <a:prstGeom prst="roundRect">
-            <a:avLst/>
-          </a:prstGeom>
-        </p:spPr>
-        <p:style>
-          <a:lnRef idx="2">
-            <a:schemeClr val="accent1">
-              <a:shade val="15000"/>
-            </a:schemeClr>
-          </a:lnRef>
-          <a:fillRef idx="1">
-            <a:schemeClr val="accent1"/>
-          </a:fillRef>
-          <a:effectRef idx="0">
-            <a:schemeClr val="accent1"/>
-          </a:effectRef>
-          <a:fontRef idx="minor">
-            <a:schemeClr val="lt1"/>
-          </a:fontRef>
-        </p:style>
-        <p:txBody>
-          <a:bodyPr rtlCol="0" anchor="ctr"/>
-          <a:lstStyle/>
-          <a:p>
-            <a:pPr algn="ctr"/>
-            <a:r>
-              <a:rPr lang="es-CL" dirty="0"/>
-              <a:t>Emisor de señal IR</a:t>
-            </a:r>
-            <a:endParaRPr lang="en-US" dirty="0"/>
-          </a:p>
-        </p:txBody>
-      </p:sp>
-      <p:sp>
-        <p:nvSpPr>
-          <p:cNvPr id="42" name="Rectangle: Rounded Corners 41">
-            <a:extLst>
-              <a:ext uri="{FF2B5EF4-FFF2-40B4-BE49-F238E27FC236}">
-                <a16:creationId xmlns:a16="http://schemas.microsoft.com/office/drawing/2014/main" id="{8CAD6202-93D2-FF69-7C54-C075A1ECF649}"/>
-              </a:ext>
-            </a:extLst>
-          </p:cNvPr>
-          <p:cNvSpPr/>
-          <p:nvPr/>
-        </p:nvSpPr>
-        <p:spPr>
-          <a:xfrm>
-            <a:off x="8168463" y="2919486"/>
-            <a:ext cx="1585519" cy="771787"/>
-          </a:xfrm>
-          <a:prstGeom prst="roundRect">
-            <a:avLst/>
-          </a:prstGeom>
-        </p:spPr>
-        <p:style>
-          <a:lnRef idx="2">
-            <a:schemeClr val="accent1">
-              <a:shade val="15000"/>
-            </a:schemeClr>
-          </a:lnRef>
-          <a:fillRef idx="1">
-            <a:schemeClr val="accent1"/>
-          </a:fillRef>
-          <a:effectRef idx="0">
-            <a:schemeClr val="accent1"/>
-          </a:effectRef>
-          <a:fontRef idx="minor">
-            <a:schemeClr val="lt1"/>
-          </a:fontRef>
-        </p:style>
-        <p:txBody>
-          <a:bodyPr rtlCol="0" anchor="ctr"/>
-          <a:lstStyle/>
-          <a:p>
-            <a:pPr algn="ctr"/>
-            <a:r>
-              <a:rPr lang="es-CL" dirty="0"/>
-              <a:t>Selector</a:t>
-            </a:r>
-            <a:endParaRPr lang="en-US" dirty="0"/>
-          </a:p>
-        </p:txBody>
-      </p:sp>
-      <p:cxnSp>
-        <p:nvCxnSpPr>
-          <p:cNvPr id="55" name="Straight Arrow Connector 54">
-            <a:extLst>
-              <a:ext uri="{FF2B5EF4-FFF2-40B4-BE49-F238E27FC236}">
-                <a16:creationId xmlns:a16="http://schemas.microsoft.com/office/drawing/2014/main" id="{2D13181D-9862-0BB9-926C-9F435F547293}"/>
-              </a:ext>
-            </a:extLst>
-          </p:cNvPr>
-          <p:cNvCxnSpPr>
-            <a:stCxn id="40" idx="3"/>
-            <a:endCxn id="42" idx="1"/>
-          </p:cNvCxnSpPr>
-          <p:nvPr/>
-        </p:nvCxnSpPr>
-        <p:spPr>
-          <a:xfrm>
-            <a:off x="6607369" y="3291692"/>
-            <a:ext cx="1561094" cy="13688"/>
-          </a:xfrm>
-          <a:prstGeom prst="straightConnector1">
-            <a:avLst/>
-          </a:prstGeom>
-          <a:ln>
-            <a:tailEnd type="triangle"/>
-          </a:ln>
-        </p:spPr>
-        <p:style>
-          <a:lnRef idx="1">
-            <a:schemeClr val="accent1"/>
-          </a:lnRef>
-          <a:fillRef idx="0">
-            <a:schemeClr val="accent1"/>
-          </a:fillRef>
-          <a:effectRef idx="0">
-            <a:schemeClr val="accent1"/>
-          </a:effectRef>
-          <a:fontRef idx="minor">
-            <a:schemeClr val="tx1"/>
-          </a:fontRef>
-        </p:style>
-      </p:cxnSp>
-      <p:sp>
-        <p:nvSpPr>
-          <p:cNvPr id="57" name="TextBox 56">
-            <a:extLst>
-              <a:ext uri="{FF2B5EF4-FFF2-40B4-BE49-F238E27FC236}">
-                <a16:creationId xmlns:a16="http://schemas.microsoft.com/office/drawing/2014/main" id="{AA17C173-7ABB-CAB7-75C9-144B8EAA6C5F}"/>
-              </a:ext>
-            </a:extLst>
-          </p:cNvPr>
-          <p:cNvSpPr txBox="1"/>
-          <p:nvPr/>
-        </p:nvSpPr>
-        <p:spPr>
-          <a:xfrm>
-            <a:off x="6775122" y="2681656"/>
-            <a:ext cx="1201163" cy="646331"/>
-          </a:xfrm>
-          <a:prstGeom prst="rect">
-            <a:avLst/>
-          </a:prstGeom>
-          <a:noFill/>
-        </p:spPr>
-        <p:txBody>
-          <a:bodyPr wrap="none" rtlCol="0">
-            <a:spAutoFit/>
-          </a:bodyPr>
-          <a:lstStyle/>
-          <a:p>
-            <a:r>
-              <a:rPr lang="es-CL" dirty="0"/>
-              <a:t>Frecuencia</a:t>
-            </a:r>
-          </a:p>
-          <a:p>
-            <a:r>
-              <a:rPr lang="es-CL" dirty="0"/>
-              <a:t>cardiaca</a:t>
-            </a:r>
-            <a:endParaRPr lang="en-US" dirty="0"/>
-          </a:p>
-        </p:txBody>
-      </p:sp>
-      <p:sp>
-        <p:nvSpPr>
-          <p:cNvPr id="59" name="Rectangle: Rounded Corners 58">
-            <a:extLst>
-              <a:ext uri="{FF2B5EF4-FFF2-40B4-BE49-F238E27FC236}">
-                <a16:creationId xmlns:a16="http://schemas.microsoft.com/office/drawing/2014/main" id="{419F0BC7-8A95-C4BE-8DB2-4F12480A87AA}"/>
-              </a:ext>
-            </a:extLst>
-          </p:cNvPr>
-          <p:cNvSpPr/>
-          <p:nvPr/>
-        </p:nvSpPr>
-        <p:spPr>
-          <a:xfrm>
-            <a:off x="10240347" y="2919486"/>
-            <a:ext cx="1585519" cy="771787"/>
-          </a:xfrm>
-          <a:prstGeom prst="roundRect">
-            <a:avLst/>
-          </a:prstGeom>
-        </p:spPr>
-        <p:style>
-          <a:lnRef idx="2">
-            <a:schemeClr val="accent1">
-              <a:shade val="15000"/>
-            </a:schemeClr>
-          </a:lnRef>
-          <a:fillRef idx="1">
-            <a:schemeClr val="accent1"/>
-          </a:fillRef>
-          <a:effectRef idx="0">
-            <a:schemeClr val="accent1"/>
-          </a:effectRef>
-          <a:fontRef idx="minor">
-            <a:schemeClr val="lt1"/>
-          </a:fontRef>
-        </p:style>
-        <p:txBody>
-          <a:bodyPr rtlCol="0" anchor="ctr"/>
-          <a:lstStyle/>
-          <a:p>
-            <a:pPr algn="ctr"/>
-            <a:r>
-              <a:rPr lang="es-CL" dirty="0" err="1"/>
-              <a:t>Display</a:t>
-            </a:r>
-            <a:endParaRPr lang="en-US" dirty="0"/>
-          </a:p>
-        </p:txBody>
-      </p:sp>
-      <p:sp>
-        <p:nvSpPr>
-          <p:cNvPr id="60" name="Rectangle: Rounded Corners 59">
-            <a:extLst>
-              <a:ext uri="{FF2B5EF4-FFF2-40B4-BE49-F238E27FC236}">
-                <a16:creationId xmlns:a16="http://schemas.microsoft.com/office/drawing/2014/main" id="{96951092-0AA9-174D-9227-D762C8CC3E1B}"/>
-              </a:ext>
-            </a:extLst>
-          </p:cNvPr>
-          <p:cNvSpPr/>
-          <p:nvPr/>
-        </p:nvSpPr>
-        <p:spPr>
-          <a:xfrm>
-            <a:off x="2652849" y="3963634"/>
-            <a:ext cx="1585519" cy="771787"/>
-          </a:xfrm>
-          <a:prstGeom prst="roundRect">
-            <a:avLst/>
-          </a:prstGeom>
-        </p:spPr>
-        <p:style>
-          <a:lnRef idx="2">
-            <a:schemeClr val="accent1">
-              <a:shade val="15000"/>
-            </a:schemeClr>
-          </a:lnRef>
-          <a:fillRef idx="1">
-            <a:schemeClr val="accent1"/>
-          </a:fillRef>
-          <a:effectRef idx="0">
-            <a:schemeClr val="accent1"/>
-          </a:effectRef>
-          <a:fontRef idx="minor">
-            <a:schemeClr val="lt1"/>
-          </a:fontRef>
-        </p:style>
-        <p:txBody>
-          <a:bodyPr rtlCol="0" anchor="ctr"/>
-          <a:lstStyle/>
-          <a:p>
-            <a:pPr algn="ctr"/>
-            <a:r>
-              <a:rPr lang="es-CL" dirty="0" err="1"/>
-              <a:t>Latch</a:t>
-            </a:r>
-            <a:r>
-              <a:rPr lang="es-CL" dirty="0"/>
-              <a:t> SR</a:t>
-            </a:r>
-            <a:endParaRPr lang="en-US" dirty="0"/>
-          </a:p>
-        </p:txBody>
-      </p:sp>
-      <p:sp>
-        <p:nvSpPr>
-          <p:cNvPr id="61" name="Rectangle: Rounded Corners 60">
-            <a:extLst>
-              <a:ext uri="{FF2B5EF4-FFF2-40B4-BE49-F238E27FC236}">
-                <a16:creationId xmlns:a16="http://schemas.microsoft.com/office/drawing/2014/main" id="{5A654D09-FB14-BB84-9973-89F8F04585E7}"/>
-              </a:ext>
-            </a:extLst>
-          </p:cNvPr>
-          <p:cNvSpPr/>
-          <p:nvPr/>
-        </p:nvSpPr>
-        <p:spPr>
-          <a:xfrm>
-            <a:off x="570096" y="3963634"/>
-            <a:ext cx="1585519" cy="771787"/>
-          </a:xfrm>
-          <a:prstGeom prst="roundRect">
-            <a:avLst/>
-          </a:prstGeom>
-        </p:spPr>
-        <p:style>
-          <a:lnRef idx="2">
-            <a:schemeClr val="accent1">
-              <a:shade val="15000"/>
-            </a:schemeClr>
-          </a:lnRef>
-          <a:fillRef idx="1">
-            <a:schemeClr val="accent1"/>
-          </a:fillRef>
-          <a:effectRef idx="0">
-            <a:schemeClr val="accent1"/>
-          </a:effectRef>
-          <a:fontRef idx="minor">
-            <a:schemeClr val="lt1"/>
-          </a:fontRef>
-        </p:style>
-        <p:txBody>
-          <a:bodyPr rtlCol="0" anchor="ctr"/>
-          <a:lstStyle/>
-          <a:p>
-            <a:pPr algn="ctr"/>
-            <a:r>
-              <a:rPr lang="es-CL" dirty="0"/>
-              <a:t>Detector de señal IR</a:t>
-            </a:r>
-            <a:endParaRPr lang="en-US" dirty="0"/>
-          </a:p>
-        </p:txBody>
-      </p:sp>
-      <p:sp>
-        <p:nvSpPr>
-          <p:cNvPr id="62" name="Rectangle: Rounded Corners 61">
-            <a:extLst>
-              <a:ext uri="{FF2B5EF4-FFF2-40B4-BE49-F238E27FC236}">
-                <a16:creationId xmlns:a16="http://schemas.microsoft.com/office/drawing/2014/main" id="{E8F06312-927F-66D8-796D-FF3C040588E8}"/>
-              </a:ext>
-            </a:extLst>
-          </p:cNvPr>
-          <p:cNvSpPr/>
-          <p:nvPr/>
-        </p:nvSpPr>
-        <p:spPr>
-          <a:xfrm>
-            <a:off x="4541051" y="5403590"/>
-            <a:ext cx="1585519" cy="771787"/>
-          </a:xfrm>
-          <a:prstGeom prst="roundRect">
-            <a:avLst/>
-          </a:prstGeom>
-        </p:spPr>
-        <p:style>
-          <a:lnRef idx="2">
-            <a:schemeClr val="accent1">
-              <a:shade val="15000"/>
-            </a:schemeClr>
-          </a:lnRef>
-          <a:fillRef idx="1">
-            <a:schemeClr val="accent1"/>
-          </a:fillRef>
-          <a:effectRef idx="0">
-            <a:schemeClr val="accent1"/>
-          </a:effectRef>
-          <a:fontRef idx="minor">
-            <a:schemeClr val="lt1"/>
-          </a:fontRef>
-        </p:style>
-        <p:txBody>
-          <a:bodyPr rtlCol="0" anchor="ctr"/>
-          <a:lstStyle/>
-          <a:p>
-            <a:pPr algn="ctr"/>
-            <a:r>
-              <a:rPr lang="es-CL" dirty="0"/>
-              <a:t>Integrador</a:t>
-            </a:r>
-            <a:endParaRPr lang="en-US" dirty="0"/>
-          </a:p>
-        </p:txBody>
-      </p:sp>
-      <p:sp>
-        <p:nvSpPr>
-          <p:cNvPr id="63" name="Rectangle: Rounded Corners 62">
-            <a:extLst>
-              <a:ext uri="{FF2B5EF4-FFF2-40B4-BE49-F238E27FC236}">
-                <a16:creationId xmlns:a16="http://schemas.microsoft.com/office/drawing/2014/main" id="{F9E5D781-9662-1C0A-5E96-F672BD5B2250}"/>
-              </a:ext>
-            </a:extLst>
-          </p:cNvPr>
-          <p:cNvSpPr/>
-          <p:nvPr/>
-        </p:nvSpPr>
-        <p:spPr>
-          <a:xfrm>
-            <a:off x="6396652" y="5407363"/>
-            <a:ext cx="1585519" cy="771787"/>
-          </a:xfrm>
-          <a:prstGeom prst="roundRect">
-            <a:avLst/>
-          </a:prstGeom>
-        </p:spPr>
-        <p:style>
-          <a:lnRef idx="2">
-            <a:schemeClr val="accent1">
-              <a:shade val="15000"/>
-            </a:schemeClr>
-          </a:lnRef>
-          <a:fillRef idx="1">
-            <a:schemeClr val="accent1"/>
-          </a:fillRef>
-          <a:effectRef idx="0">
-            <a:schemeClr val="accent1"/>
-          </a:effectRef>
-          <a:fontRef idx="minor">
-            <a:schemeClr val="lt1"/>
-          </a:fontRef>
-        </p:style>
-        <p:txBody>
-          <a:bodyPr rtlCol="0" anchor="ctr"/>
-          <a:lstStyle/>
-          <a:p>
-            <a:pPr algn="ctr"/>
-            <a:r>
-              <a:rPr lang="es-CL" dirty="0"/>
-              <a:t>Detector de </a:t>
-            </a:r>
-            <a:r>
-              <a:rPr lang="es-CL" dirty="0" err="1"/>
-              <a:t>peak</a:t>
-            </a:r>
-            <a:endParaRPr lang="en-US" dirty="0"/>
-          </a:p>
-        </p:txBody>
-      </p:sp>
-      <p:cxnSp>
-        <p:nvCxnSpPr>
-          <p:cNvPr id="67" name="Straight Arrow Connector 66">
-            <a:extLst>
-              <a:ext uri="{FF2B5EF4-FFF2-40B4-BE49-F238E27FC236}">
-                <a16:creationId xmlns:a16="http://schemas.microsoft.com/office/drawing/2014/main" id="{D7D80486-ABC7-0565-7D03-2819393F8CEB}"/>
-              </a:ext>
-            </a:extLst>
-          </p:cNvPr>
-          <p:cNvCxnSpPr>
-            <a:stCxn id="63" idx="3"/>
-            <a:endCxn id="42" idx="2"/>
-          </p:cNvCxnSpPr>
-          <p:nvPr/>
-        </p:nvCxnSpPr>
-        <p:spPr>
-          <a:xfrm flipV="1">
-            <a:off x="7982171" y="3691273"/>
-            <a:ext cx="979052" cy="2101984"/>
-          </a:xfrm>
-          <a:prstGeom prst="straightConnector1">
-            <a:avLst/>
-          </a:prstGeom>
-          <a:ln>
-            <a:tailEnd type="triangle"/>
-          </a:ln>
-        </p:spPr>
-        <p:style>
-          <a:lnRef idx="1">
-            <a:schemeClr val="accent1"/>
-          </a:lnRef>
-          <a:fillRef idx="0">
-            <a:schemeClr val="accent1"/>
-          </a:fillRef>
-          <a:effectRef idx="0">
-            <a:schemeClr val="accent1"/>
-          </a:effectRef>
-          <a:fontRef idx="minor">
-            <a:schemeClr val="tx1"/>
-          </a:fontRef>
-        </p:style>
-      </p:cxnSp>
-      <p:sp>
-        <p:nvSpPr>
-          <p:cNvPr id="68" name="TextBox 67">
-            <a:extLst>
-              <a:ext uri="{FF2B5EF4-FFF2-40B4-BE49-F238E27FC236}">
-                <a16:creationId xmlns:a16="http://schemas.microsoft.com/office/drawing/2014/main" id="{C917D067-0D1D-AD74-D089-432D1B25D07A}"/>
-              </a:ext>
-            </a:extLst>
-          </p:cNvPr>
-          <p:cNvSpPr txBox="1"/>
-          <p:nvPr/>
-        </p:nvSpPr>
-        <p:spPr>
-          <a:xfrm>
-            <a:off x="8006309" y="4557598"/>
-            <a:ext cx="529825" cy="369332"/>
-          </a:xfrm>
-          <a:prstGeom prst="rect">
-            <a:avLst/>
-          </a:prstGeom>
-          <a:noFill/>
-        </p:spPr>
-        <p:txBody>
-          <a:bodyPr wrap="none" rtlCol="0">
-            <a:spAutoFit/>
-          </a:bodyPr>
-          <a:lstStyle/>
-          <a:p>
-            <a:r>
-              <a:rPr lang="es-CL" dirty="0"/>
-              <a:t>PTT</a:t>
-            </a:r>
-            <a:endParaRPr lang="en-US" dirty="0"/>
-          </a:p>
-        </p:txBody>
-      </p:sp>
-      <p:sp>
-        <p:nvSpPr>
-          <p:cNvPr id="69" name="Rectangle: Rounded Corners 68">
-            <a:extLst>
-              <a:ext uri="{FF2B5EF4-FFF2-40B4-BE49-F238E27FC236}">
-                <a16:creationId xmlns:a16="http://schemas.microsoft.com/office/drawing/2014/main" id="{2F840C14-4E60-83A3-1483-33046F0CE759}"/>
-              </a:ext>
-            </a:extLst>
-          </p:cNvPr>
-          <p:cNvSpPr/>
-          <p:nvPr/>
-        </p:nvSpPr>
-        <p:spPr>
-          <a:xfrm>
-            <a:off x="10107855" y="4282626"/>
-            <a:ext cx="1585519" cy="771787"/>
-          </a:xfrm>
-          <a:prstGeom prst="roundRect">
-            <a:avLst/>
-          </a:prstGeom>
-        </p:spPr>
-        <p:style>
-          <a:lnRef idx="2">
-            <a:schemeClr val="accent1">
-              <a:shade val="15000"/>
-            </a:schemeClr>
-          </a:lnRef>
-          <a:fillRef idx="1">
-            <a:schemeClr val="accent1"/>
-          </a:fillRef>
-          <a:effectRef idx="0">
-            <a:schemeClr val="accent1"/>
-          </a:effectRef>
-          <a:fontRef idx="minor">
-            <a:schemeClr val="lt1"/>
-          </a:fontRef>
-        </p:style>
-        <p:txBody>
-          <a:bodyPr rtlCol="0" anchor="ctr"/>
-          <a:lstStyle/>
-          <a:p>
-            <a:pPr algn="ctr"/>
-            <a:r>
-              <a:rPr lang="es-CL" dirty="0" err="1"/>
-              <a:t>Bateria</a:t>
-            </a:r>
-            <a:endParaRPr lang="en-US" dirty="0"/>
-          </a:p>
-        </p:txBody>
-      </p:sp>
-      <p:sp>
-        <p:nvSpPr>
-          <p:cNvPr id="71" name="Rectangle: Rounded Corners 70">
-            <a:extLst>
-              <a:ext uri="{FF2B5EF4-FFF2-40B4-BE49-F238E27FC236}">
-                <a16:creationId xmlns:a16="http://schemas.microsoft.com/office/drawing/2014/main" id="{827D41F0-0D71-EB0A-32FE-C65F5265B87E}"/>
-              </a:ext>
-            </a:extLst>
-          </p:cNvPr>
-          <p:cNvSpPr/>
-          <p:nvPr/>
-        </p:nvSpPr>
-        <p:spPr>
-          <a:xfrm>
-            <a:off x="10107854" y="5054413"/>
-            <a:ext cx="1585519" cy="771787"/>
-          </a:xfrm>
-          <a:prstGeom prst="roundRect">
-            <a:avLst/>
-          </a:prstGeom>
-        </p:spPr>
-        <p:style>
-          <a:lnRef idx="2">
-            <a:schemeClr val="accent1">
-              <a:shade val="15000"/>
-            </a:schemeClr>
-          </a:lnRef>
-          <a:fillRef idx="1">
-            <a:schemeClr val="accent1"/>
-          </a:fillRef>
-          <a:effectRef idx="0">
-            <a:schemeClr val="accent1"/>
-          </a:effectRef>
-          <a:fontRef idx="minor">
-            <a:schemeClr val="lt1"/>
-          </a:fontRef>
-        </p:style>
-        <p:txBody>
-          <a:bodyPr rtlCol="0" anchor="ctr"/>
-          <a:lstStyle/>
-          <a:p>
-            <a:pPr algn="ctr"/>
-            <a:r>
-              <a:rPr lang="es-CL" dirty="0"/>
-              <a:t>Fuente CC</a:t>
-            </a:r>
-            <a:endParaRPr lang="en-US" dirty="0"/>
-          </a:p>
-        </p:txBody>
-      </p:sp>
-      <p:sp>
-        <p:nvSpPr>
-          <p:cNvPr id="72" name="Rectangle: Rounded Corners 71">
-            <a:extLst>
-              <a:ext uri="{FF2B5EF4-FFF2-40B4-BE49-F238E27FC236}">
-                <a16:creationId xmlns:a16="http://schemas.microsoft.com/office/drawing/2014/main" id="{DD941DE3-62E1-7833-B77E-4407D97B1CF1}"/>
-              </a:ext>
-            </a:extLst>
-          </p:cNvPr>
-          <p:cNvSpPr/>
-          <p:nvPr/>
-        </p:nvSpPr>
-        <p:spPr>
-          <a:xfrm>
-            <a:off x="10107854" y="5909617"/>
-            <a:ext cx="1585519" cy="771787"/>
-          </a:xfrm>
-          <a:prstGeom prst="roundRect">
-            <a:avLst/>
-          </a:prstGeom>
-        </p:spPr>
-        <p:style>
-          <a:lnRef idx="2">
-            <a:schemeClr val="accent1">
-              <a:shade val="15000"/>
-            </a:schemeClr>
-          </a:lnRef>
-          <a:fillRef idx="1">
-            <a:schemeClr val="accent1"/>
-          </a:fillRef>
-          <a:effectRef idx="0">
-            <a:schemeClr val="accent1"/>
-          </a:effectRef>
-          <a:fontRef idx="minor">
-            <a:schemeClr val="lt1"/>
-          </a:fontRef>
-        </p:style>
-        <p:txBody>
-          <a:bodyPr rtlCol="0" anchor="ctr"/>
-          <a:lstStyle/>
-          <a:p>
-            <a:pPr algn="ctr"/>
-            <a:r>
-              <a:rPr lang="es-CL" dirty="0"/>
-              <a:t>Tierra virtual</a:t>
-            </a:r>
-            <a:endParaRPr lang="en-US" dirty="0"/>
-          </a:p>
-        </p:txBody>
-      </p:sp>
-      <p:cxnSp>
-        <p:nvCxnSpPr>
-          <p:cNvPr id="76" name="Straight Arrow Connector 75">
-            <a:extLst>
-              <a:ext uri="{FF2B5EF4-FFF2-40B4-BE49-F238E27FC236}">
-                <a16:creationId xmlns:a16="http://schemas.microsoft.com/office/drawing/2014/main" id="{BE478FEB-A8B8-C09D-56CE-CE249FB8A98A}"/>
-              </a:ext>
-            </a:extLst>
-          </p:cNvPr>
-          <p:cNvCxnSpPr>
-            <a:stCxn id="2" idx="3"/>
-            <a:endCxn id="3" idx="1"/>
-          </p:cNvCxnSpPr>
-          <p:nvPr/>
-        </p:nvCxnSpPr>
-        <p:spPr>
-          <a:xfrm>
-            <a:off x="4248445" y="869052"/>
-            <a:ext cx="262036" cy="0"/>
-          </a:xfrm>
-          <a:prstGeom prst="straightConnector1">
-            <a:avLst/>
-          </a:prstGeom>
-          <a:ln>
-            <a:tailEnd type="triangle"/>
-          </a:ln>
-        </p:spPr>
-        <p:style>
-          <a:lnRef idx="1">
-            <a:schemeClr val="accent1"/>
-          </a:lnRef>
-          <a:fillRef idx="0">
-            <a:schemeClr val="accent1"/>
-          </a:fillRef>
-          <a:effectRef idx="0">
-            <a:schemeClr val="accent1"/>
-          </a:effectRef>
-          <a:fontRef idx="minor">
-            <a:schemeClr val="tx1"/>
-          </a:fontRef>
-        </p:style>
-      </p:cxnSp>
-      <p:cxnSp>
-        <p:nvCxnSpPr>
-          <p:cNvPr id="80" name="Straight Arrow Connector 79">
-            <a:extLst>
-              <a:ext uri="{FF2B5EF4-FFF2-40B4-BE49-F238E27FC236}">
-                <a16:creationId xmlns:a16="http://schemas.microsoft.com/office/drawing/2014/main" id="{72FE4187-3072-FBF1-EBBA-FD739C162CEF}"/>
-              </a:ext>
-            </a:extLst>
-          </p:cNvPr>
-          <p:cNvCxnSpPr>
-            <a:stCxn id="3" idx="3"/>
-            <a:endCxn id="18" idx="1"/>
-          </p:cNvCxnSpPr>
-          <p:nvPr/>
-        </p:nvCxnSpPr>
-        <p:spPr>
-          <a:xfrm>
-            <a:off x="6096000" y="869052"/>
-            <a:ext cx="171563" cy="0"/>
-          </a:xfrm>
-          <a:prstGeom prst="straightConnector1">
-            <a:avLst/>
-          </a:prstGeom>
-          <a:ln>
-            <a:tailEnd type="triangle"/>
-          </a:ln>
-        </p:spPr>
-        <p:style>
-          <a:lnRef idx="1">
-            <a:schemeClr val="accent1"/>
-          </a:lnRef>
-          <a:fillRef idx="0">
-            <a:schemeClr val="accent1"/>
-          </a:fillRef>
-          <a:effectRef idx="0">
-            <a:schemeClr val="accent1"/>
-          </a:effectRef>
-          <a:fontRef idx="minor">
-            <a:schemeClr val="tx1"/>
-          </a:fontRef>
-        </p:style>
-      </p:cxnSp>
-      <p:cxnSp>
-        <p:nvCxnSpPr>
-          <p:cNvPr id="85" name="Straight Arrow Connector 84">
-            <a:extLst>
-              <a:ext uri="{FF2B5EF4-FFF2-40B4-BE49-F238E27FC236}">
-                <a16:creationId xmlns:a16="http://schemas.microsoft.com/office/drawing/2014/main" id="{D94D089F-2955-FF78-A06E-BDBA700F934C}"/>
-              </a:ext>
-            </a:extLst>
-          </p:cNvPr>
-          <p:cNvCxnSpPr>
-            <a:stCxn id="18" idx="3"/>
-            <a:endCxn id="21" idx="1"/>
-          </p:cNvCxnSpPr>
-          <p:nvPr/>
-        </p:nvCxnSpPr>
-        <p:spPr>
-          <a:xfrm>
-            <a:off x="7853082" y="869052"/>
-            <a:ext cx="171563" cy="0"/>
-          </a:xfrm>
-          <a:prstGeom prst="straightConnector1">
-            <a:avLst/>
-          </a:prstGeom>
-          <a:ln>
-            <a:tailEnd type="triangle"/>
-          </a:ln>
-        </p:spPr>
-        <p:style>
-          <a:lnRef idx="1">
-            <a:schemeClr val="accent1"/>
-          </a:lnRef>
-          <a:fillRef idx="0">
-            <a:schemeClr val="accent1"/>
-          </a:fillRef>
-          <a:effectRef idx="0">
-            <a:schemeClr val="accent1"/>
-          </a:effectRef>
-          <a:fontRef idx="minor">
-            <a:schemeClr val="tx1"/>
-          </a:fontRef>
-        </p:style>
-      </p:cxnSp>
-      <p:cxnSp>
-        <p:nvCxnSpPr>
-          <p:cNvPr id="93" name="Connector: Elbow 92">
-            <a:extLst>
-              <a:ext uri="{FF2B5EF4-FFF2-40B4-BE49-F238E27FC236}">
-                <a16:creationId xmlns:a16="http://schemas.microsoft.com/office/drawing/2014/main" id="{B0FFD77E-FACF-A492-E6A8-6A775DE1681B}"/>
-              </a:ext>
-            </a:extLst>
-          </p:cNvPr>
-          <p:cNvCxnSpPr>
-            <a:stCxn id="21" idx="2"/>
-            <a:endCxn id="23" idx="1"/>
-          </p:cNvCxnSpPr>
-          <p:nvPr/>
-        </p:nvCxnSpPr>
-        <p:spPr>
-          <a:xfrm rot="5400000">
-            <a:off x="3913433" y="-1998173"/>
-            <a:ext cx="1650854" cy="8157091"/>
-          </a:xfrm>
-          <a:prstGeom prst="bentConnector4">
-            <a:avLst>
-              <a:gd name="adj1" fmla="val 21832"/>
-              <a:gd name="adj2" fmla="val 102802"/>
-            </a:avLst>
-          </a:prstGeom>
-          <a:ln>
-            <a:tailEnd type="triangle"/>
-          </a:ln>
-        </p:spPr>
-        <p:style>
-          <a:lnRef idx="1">
-            <a:schemeClr val="accent1"/>
-          </a:lnRef>
-          <a:fillRef idx="0">
-            <a:schemeClr val="accent1"/>
-          </a:fillRef>
-          <a:effectRef idx="0">
-            <a:schemeClr val="accent1"/>
-          </a:effectRef>
-          <a:fontRef idx="minor">
-            <a:schemeClr val="tx1"/>
-          </a:fontRef>
-        </p:style>
-      </p:cxnSp>
-      <p:cxnSp>
-        <p:nvCxnSpPr>
-          <p:cNvPr id="96" name="Straight Arrow Connector 95">
-            <a:extLst>
-              <a:ext uri="{FF2B5EF4-FFF2-40B4-BE49-F238E27FC236}">
-                <a16:creationId xmlns:a16="http://schemas.microsoft.com/office/drawing/2014/main" id="{3E2F1383-497F-72CC-5077-20EC27D085C7}"/>
-              </a:ext>
-            </a:extLst>
-          </p:cNvPr>
-          <p:cNvCxnSpPr>
-            <a:stCxn id="23" idx="3"/>
-            <a:endCxn id="34" idx="1"/>
-          </p:cNvCxnSpPr>
-          <p:nvPr/>
-        </p:nvCxnSpPr>
-        <p:spPr>
-          <a:xfrm>
-            <a:off x="2245833" y="2905799"/>
-            <a:ext cx="262035" cy="0"/>
-          </a:xfrm>
-          <a:prstGeom prst="straightConnector1">
-            <a:avLst/>
-          </a:prstGeom>
-          <a:ln>
-            <a:tailEnd type="triangle"/>
-          </a:ln>
-        </p:spPr>
-        <p:style>
-          <a:lnRef idx="1">
-            <a:schemeClr val="accent1"/>
-          </a:lnRef>
-          <a:fillRef idx="0">
-            <a:schemeClr val="accent1"/>
-          </a:fillRef>
-          <a:effectRef idx="0">
-            <a:schemeClr val="accent1"/>
-          </a:effectRef>
-          <a:fontRef idx="minor">
-            <a:schemeClr val="tx1"/>
-          </a:fontRef>
-        </p:style>
-      </p:cxnSp>
-      <p:cxnSp>
-        <p:nvCxnSpPr>
-          <p:cNvPr id="100" name="Straight Arrow Connector 99">
-            <a:extLst>
-              <a:ext uri="{FF2B5EF4-FFF2-40B4-BE49-F238E27FC236}">
-                <a16:creationId xmlns:a16="http://schemas.microsoft.com/office/drawing/2014/main" id="{B90CCB7D-E18C-A9E4-920B-F3B78527E1C7}"/>
-              </a:ext>
-            </a:extLst>
-          </p:cNvPr>
-          <p:cNvCxnSpPr>
-            <a:stCxn id="34" idx="3"/>
-            <a:endCxn id="38" idx="1"/>
-          </p:cNvCxnSpPr>
-          <p:nvPr/>
-        </p:nvCxnSpPr>
-        <p:spPr>
-          <a:xfrm flipV="1">
-            <a:off x="4093387" y="2332058"/>
-            <a:ext cx="928462" cy="573741"/>
-          </a:xfrm>
-          <a:prstGeom prst="straightConnector1">
-            <a:avLst/>
-          </a:prstGeom>
-          <a:ln>
-            <a:tailEnd type="triangle"/>
-          </a:ln>
-        </p:spPr>
-        <p:style>
-          <a:lnRef idx="1">
-            <a:schemeClr val="accent1"/>
-          </a:lnRef>
-          <a:fillRef idx="0">
-            <a:schemeClr val="accent1"/>
-          </a:fillRef>
-          <a:effectRef idx="0">
-            <a:schemeClr val="accent1"/>
-          </a:effectRef>
-          <a:fontRef idx="minor">
-            <a:schemeClr val="tx1"/>
-          </a:fontRef>
-        </p:style>
-      </p:cxnSp>
-      <p:cxnSp>
-        <p:nvCxnSpPr>
-          <p:cNvPr id="103" name="Straight Arrow Connector 102">
-            <a:extLst>
-              <a:ext uri="{FF2B5EF4-FFF2-40B4-BE49-F238E27FC236}">
-                <a16:creationId xmlns:a16="http://schemas.microsoft.com/office/drawing/2014/main" id="{E881F56E-DC17-C7A0-2410-1AD76C1FA4D1}"/>
-              </a:ext>
-            </a:extLst>
-          </p:cNvPr>
-          <p:cNvCxnSpPr>
-            <a:stCxn id="34" idx="3"/>
-            <a:endCxn id="40" idx="1"/>
-          </p:cNvCxnSpPr>
-          <p:nvPr/>
-        </p:nvCxnSpPr>
-        <p:spPr>
-          <a:xfrm>
-            <a:off x="4093387" y="2905799"/>
-            <a:ext cx="928463" cy="385893"/>
-          </a:xfrm>
-          <a:prstGeom prst="straightConnector1">
-            <a:avLst/>
-          </a:prstGeom>
-          <a:ln>
-            <a:tailEnd type="triangle"/>
-          </a:ln>
-        </p:spPr>
-        <p:style>
-          <a:lnRef idx="1">
-            <a:schemeClr val="accent1"/>
-          </a:lnRef>
-          <a:fillRef idx="0">
-            <a:schemeClr val="accent1"/>
-          </a:fillRef>
-          <a:effectRef idx="0">
-            <a:schemeClr val="accent1"/>
-          </a:effectRef>
-          <a:fontRef idx="minor">
-            <a:schemeClr val="tx1"/>
-          </a:fontRef>
-        </p:style>
-      </p:cxnSp>
-      <p:cxnSp>
-        <p:nvCxnSpPr>
-          <p:cNvPr id="105" name="Straight Arrow Connector 104">
-            <a:extLst>
-              <a:ext uri="{FF2B5EF4-FFF2-40B4-BE49-F238E27FC236}">
-                <a16:creationId xmlns:a16="http://schemas.microsoft.com/office/drawing/2014/main" id="{35DDB7EC-0794-C7F5-4EB4-55E83B2D4349}"/>
-              </a:ext>
-            </a:extLst>
-          </p:cNvPr>
-          <p:cNvCxnSpPr>
-            <a:stCxn id="34" idx="3"/>
-            <a:endCxn id="41" idx="1"/>
-          </p:cNvCxnSpPr>
-          <p:nvPr/>
-        </p:nvCxnSpPr>
-        <p:spPr>
-          <a:xfrm>
-            <a:off x="4093387" y="2905799"/>
-            <a:ext cx="964323" cy="1443729"/>
-          </a:xfrm>
-          <a:prstGeom prst="straightConnector1">
-            <a:avLst/>
-          </a:prstGeom>
-          <a:ln>
-            <a:tailEnd type="triangle"/>
-          </a:ln>
-        </p:spPr>
-        <p:style>
-          <a:lnRef idx="1">
-            <a:schemeClr val="accent1"/>
-          </a:lnRef>
-          <a:fillRef idx="0">
-            <a:schemeClr val="accent1"/>
-          </a:fillRef>
-          <a:effectRef idx="0">
-            <a:schemeClr val="accent1"/>
-          </a:effectRef>
-          <a:fontRef idx="minor">
-            <a:schemeClr val="tx1"/>
-          </a:fontRef>
-        </p:style>
-      </p:cxnSp>
-      <p:cxnSp>
-        <p:nvCxnSpPr>
-          <p:cNvPr id="107" name="Straight Arrow Connector 106">
-            <a:extLst>
-              <a:ext uri="{FF2B5EF4-FFF2-40B4-BE49-F238E27FC236}">
-                <a16:creationId xmlns:a16="http://schemas.microsoft.com/office/drawing/2014/main" id="{BFCCF2F7-8530-5408-5726-9BB39B3B8F9B}"/>
-              </a:ext>
-            </a:extLst>
-          </p:cNvPr>
-          <p:cNvCxnSpPr>
-            <a:stCxn id="34" idx="2"/>
-            <a:endCxn id="60" idx="0"/>
-          </p:cNvCxnSpPr>
-          <p:nvPr/>
-        </p:nvCxnSpPr>
-        <p:spPr>
-          <a:xfrm>
-            <a:off x="3300628" y="3291692"/>
-            <a:ext cx="144981" cy="671942"/>
-          </a:xfrm>
-          <a:prstGeom prst="straightConnector1">
-            <a:avLst/>
-          </a:prstGeom>
-          <a:ln>
-            <a:tailEnd type="triangle"/>
-          </a:ln>
-        </p:spPr>
-        <p:style>
-          <a:lnRef idx="1">
-            <a:schemeClr val="accent1"/>
-          </a:lnRef>
-          <a:fillRef idx="0">
-            <a:schemeClr val="accent1"/>
-          </a:fillRef>
-          <a:effectRef idx="0">
-            <a:schemeClr val="accent1"/>
-          </a:effectRef>
-          <a:fontRef idx="minor">
-            <a:schemeClr val="tx1"/>
-          </a:fontRef>
-        </p:style>
-      </p:cxnSp>
-      <p:cxnSp>
-        <p:nvCxnSpPr>
-          <p:cNvPr id="109" name="Straight Arrow Connector 108">
-            <a:extLst>
-              <a:ext uri="{FF2B5EF4-FFF2-40B4-BE49-F238E27FC236}">
-                <a16:creationId xmlns:a16="http://schemas.microsoft.com/office/drawing/2014/main" id="{5496257C-8E62-E7B9-92D8-5F32101582AC}"/>
-              </a:ext>
-            </a:extLst>
-          </p:cNvPr>
-          <p:cNvCxnSpPr>
-            <a:stCxn id="61" idx="3"/>
-            <a:endCxn id="60" idx="1"/>
-          </p:cNvCxnSpPr>
-          <p:nvPr/>
-        </p:nvCxnSpPr>
-        <p:spPr>
-          <a:xfrm>
-            <a:off x="2155615" y="4349528"/>
-            <a:ext cx="497234" cy="0"/>
-          </a:xfrm>
-          <a:prstGeom prst="straightConnector1">
-            <a:avLst/>
-          </a:prstGeom>
-          <a:ln>
-            <a:tailEnd type="triangle"/>
-          </a:ln>
-        </p:spPr>
-        <p:style>
-          <a:lnRef idx="1">
-            <a:schemeClr val="accent1"/>
-          </a:lnRef>
-          <a:fillRef idx="0">
-            <a:schemeClr val="accent1"/>
-          </a:fillRef>
-          <a:effectRef idx="0">
-            <a:schemeClr val="accent1"/>
-          </a:effectRef>
-          <a:fontRef idx="minor">
-            <a:schemeClr val="tx1"/>
-          </a:fontRef>
-        </p:style>
-      </p:cxnSp>
-      <p:cxnSp>
-        <p:nvCxnSpPr>
-          <p:cNvPr id="111" name="Straight Arrow Connector 110">
-            <a:extLst>
-              <a:ext uri="{FF2B5EF4-FFF2-40B4-BE49-F238E27FC236}">
-                <a16:creationId xmlns:a16="http://schemas.microsoft.com/office/drawing/2014/main" id="{1855CD87-156D-89E9-D55C-81AE26848F4B}"/>
-              </a:ext>
-            </a:extLst>
-          </p:cNvPr>
-          <p:cNvCxnSpPr>
-            <a:cxnSpLocks/>
-            <a:stCxn id="60" idx="2"/>
-            <a:endCxn id="132" idx="0"/>
-          </p:cNvCxnSpPr>
-          <p:nvPr/>
-        </p:nvCxnSpPr>
-        <p:spPr>
-          <a:xfrm flipH="1">
-            <a:off x="3440596" y="4735421"/>
-            <a:ext cx="5013" cy="668169"/>
-          </a:xfrm>
-          <a:prstGeom prst="straightConnector1">
-            <a:avLst/>
-          </a:prstGeom>
-          <a:ln>
-            <a:tailEnd type="triangle"/>
-          </a:ln>
-        </p:spPr>
-        <p:style>
-          <a:lnRef idx="1">
-            <a:schemeClr val="accent1"/>
-          </a:lnRef>
-          <a:fillRef idx="0">
-            <a:schemeClr val="accent1"/>
-          </a:fillRef>
-          <a:effectRef idx="0">
-            <a:schemeClr val="accent1"/>
-          </a:effectRef>
-          <a:fontRef idx="minor">
-            <a:schemeClr val="tx1"/>
-          </a:fontRef>
-        </p:style>
-      </p:cxnSp>
-      <p:cxnSp>
-        <p:nvCxnSpPr>
-          <p:cNvPr id="113" name="Straight Arrow Connector 112">
-            <a:extLst>
-              <a:ext uri="{FF2B5EF4-FFF2-40B4-BE49-F238E27FC236}">
-                <a16:creationId xmlns:a16="http://schemas.microsoft.com/office/drawing/2014/main" id="{E3795DF3-0C21-1350-2AAD-CFA3B31BF3A7}"/>
-              </a:ext>
-            </a:extLst>
-          </p:cNvPr>
-          <p:cNvCxnSpPr>
-            <a:stCxn id="62" idx="3"/>
-            <a:endCxn id="63" idx="1"/>
-          </p:cNvCxnSpPr>
-          <p:nvPr/>
-        </p:nvCxnSpPr>
-        <p:spPr>
-          <a:xfrm>
-            <a:off x="6126570" y="5789484"/>
-            <a:ext cx="270082" cy="3773"/>
-          </a:xfrm>
-          <a:prstGeom prst="straightConnector1">
-            <a:avLst/>
-          </a:prstGeom>
-          <a:ln>
-            <a:tailEnd type="triangle"/>
-          </a:ln>
-        </p:spPr>
-        <p:style>
-          <a:lnRef idx="1">
-            <a:schemeClr val="accent1"/>
-          </a:lnRef>
-          <a:fillRef idx="0">
-            <a:schemeClr val="accent1"/>
-          </a:fillRef>
-          <a:effectRef idx="0">
-            <a:schemeClr val="accent1"/>
-          </a:effectRef>
-          <a:fontRef idx="minor">
-            <a:schemeClr val="tx1"/>
-          </a:fontRef>
-        </p:style>
-      </p:cxnSp>
-      <p:cxnSp>
-        <p:nvCxnSpPr>
-          <p:cNvPr id="116" name="Straight Arrow Connector 115">
-            <a:extLst>
-              <a:ext uri="{FF2B5EF4-FFF2-40B4-BE49-F238E27FC236}">
-                <a16:creationId xmlns:a16="http://schemas.microsoft.com/office/drawing/2014/main" id="{4088007D-DAEC-D569-5FE2-40B72DBB5CDA}"/>
-              </a:ext>
-            </a:extLst>
-          </p:cNvPr>
-          <p:cNvCxnSpPr>
-            <a:stCxn id="42" idx="3"/>
-            <a:endCxn id="59" idx="1"/>
-          </p:cNvCxnSpPr>
-          <p:nvPr/>
-        </p:nvCxnSpPr>
-        <p:spPr>
-          <a:xfrm>
-            <a:off x="9753982" y="3305380"/>
-            <a:ext cx="486365" cy="0"/>
-          </a:xfrm>
-          <a:prstGeom prst="straightConnector1">
-            <a:avLst/>
-          </a:prstGeom>
-          <a:ln>
-            <a:tailEnd type="triangle"/>
-          </a:ln>
-        </p:spPr>
-        <p:style>
-          <a:lnRef idx="1">
-            <a:schemeClr val="accent1"/>
-          </a:lnRef>
-          <a:fillRef idx="0">
-            <a:schemeClr val="accent1"/>
-          </a:fillRef>
-          <a:effectRef idx="0">
-            <a:schemeClr val="accent1"/>
-          </a:effectRef>
-          <a:fontRef idx="minor">
-            <a:schemeClr val="tx1"/>
-          </a:fontRef>
-        </p:style>
-      </p:cxnSp>
-      <p:sp>
-        <p:nvSpPr>
-          <p:cNvPr id="118" name="Rectangle: Rounded Corners 117">
-            <a:extLst>
-              <a:ext uri="{FF2B5EF4-FFF2-40B4-BE49-F238E27FC236}">
-                <a16:creationId xmlns:a16="http://schemas.microsoft.com/office/drawing/2014/main" id="{E2C7F0AE-7BFC-A10D-6246-69CB55FF8446}"/>
-              </a:ext>
-            </a:extLst>
-          </p:cNvPr>
-          <p:cNvSpPr/>
-          <p:nvPr/>
-        </p:nvSpPr>
-        <p:spPr>
-          <a:xfrm>
-            <a:off x="1566269" y="296531"/>
+            <a:off x="3886193" y="2109678"/>
             <a:ext cx="401275" cy="283833"/>
           </a:xfrm>
           <a:prstGeom prst="roundRect">
@@ -5054,10 +3534,10 @@
       </p:sp>
       <p:sp>
         <p:nvSpPr>
-          <p:cNvPr id="119" name="Rectangle: Rounded Corners 118">
-            <a:extLst>
-              <a:ext uri="{FF2B5EF4-FFF2-40B4-BE49-F238E27FC236}">
-                <a16:creationId xmlns:a16="http://schemas.microsoft.com/office/drawing/2014/main" id="{926211FD-2BC4-763F-B6B2-198F0FA85AC9}"/>
+          <p:cNvPr id="8" name="Rectangle: Rounded Corners 7">
+            <a:extLst>
+              <a:ext uri="{FF2B5EF4-FFF2-40B4-BE49-F238E27FC236}">
+                <a16:creationId xmlns:a16="http://schemas.microsoft.com/office/drawing/2014/main" id="{8A3CF87C-1899-6BB2-C935-59BD4BE1086C}"/>
               </a:ext>
             </a:extLst>
           </p:cNvPr>
@@ -5066,12 +3546,65 @@
         </p:nvSpPr>
         <p:spPr>
           <a:xfrm>
-            <a:off x="6434852" y="1796539"/>
-            <a:ext cx="401275" cy="283833"/>
+            <a:off x="4678952" y="2287889"/>
+            <a:ext cx="1585519" cy="771787"/>
           </a:xfrm>
           <a:prstGeom prst="roundRect">
             <a:avLst/>
           </a:prstGeom>
+        </p:spPr>
+        <p:style>
+          <a:lnRef idx="2">
+            <a:schemeClr val="accent1">
+              <a:shade val="15000"/>
+            </a:schemeClr>
+          </a:lnRef>
+          <a:fillRef idx="1">
+            <a:schemeClr val="accent1"/>
+          </a:fillRef>
+          <a:effectRef idx="0">
+            <a:schemeClr val="accent1"/>
+          </a:effectRef>
+          <a:fontRef idx="minor">
+            <a:schemeClr val="lt1"/>
+          </a:fontRef>
+        </p:style>
+        <p:txBody>
+          <a:bodyPr rtlCol="0" anchor="ctr"/>
+          <a:lstStyle/>
+          <a:p>
+            <a:pPr algn="ctr"/>
+            <a:r>
+              <a:rPr lang="es-CL" dirty="0"/>
+              <a:t>Filtro 1*</a:t>
+            </a:r>
+            <a:endParaRPr lang="en-US" dirty="0"/>
+          </a:p>
+        </p:txBody>
+      </p:sp>
+      <p:sp>
+        <p:nvSpPr>
+          <p:cNvPr id="9" name="Rectangle: Rounded Corners 8">
+            <a:extLst>
+              <a:ext uri="{FF2B5EF4-FFF2-40B4-BE49-F238E27FC236}">
+                <a16:creationId xmlns:a16="http://schemas.microsoft.com/office/drawing/2014/main" id="{17F4228F-D38F-E594-64D3-020C856B38AD}"/>
+              </a:ext>
+            </a:extLst>
+          </p:cNvPr>
+          <p:cNvSpPr/>
+          <p:nvPr/>
+        </p:nvSpPr>
+        <p:spPr>
+          <a:xfrm>
+            <a:off x="6022206" y="2145972"/>
+            <a:ext cx="401275" cy="283833"/>
+          </a:xfrm>
+          <a:prstGeom prst="roundRect">
+            <a:avLst/>
+          </a:prstGeom>
+          <a:solidFill>
+            <a:srgbClr val="00B0F0"/>
+          </a:solidFill>
         </p:spPr>
         <p:style>
           <a:lnRef idx="2">
@@ -5096,7 +3629,7 @@
             <a:pPr algn="ctr"/>
             <a:r>
               <a:rPr lang="es-CL" sz="1400" dirty="0"/>
-              <a:t>T1</a:t>
+              <a:t>T4</a:t>
             </a:r>
             <a:endParaRPr lang="en-US" sz="1400" dirty="0"/>
           </a:p>
@@ -5104,10 +3637,10 @@
       </p:sp>
       <p:sp>
         <p:nvSpPr>
-          <p:cNvPr id="120" name="Rectangle: Rounded Corners 119">
-            <a:extLst>
-              <a:ext uri="{FF2B5EF4-FFF2-40B4-BE49-F238E27FC236}">
-                <a16:creationId xmlns:a16="http://schemas.microsoft.com/office/drawing/2014/main" id="{65CE50B2-BB62-CC80-DD3C-18939F38527B}"/>
+          <p:cNvPr id="10" name="Rectangle: Rounded Corners 9">
+            <a:extLst>
+              <a:ext uri="{FF2B5EF4-FFF2-40B4-BE49-F238E27FC236}">
+                <a16:creationId xmlns:a16="http://schemas.microsoft.com/office/drawing/2014/main" id="{26417C96-4FDD-A40F-DABE-6FDDD98877C8}"/>
               </a:ext>
             </a:extLst>
           </p:cNvPr>
@@ -5116,7 +3649,107 @@
         </p:nvSpPr>
         <p:spPr>
           <a:xfrm>
-            <a:off x="6406729" y="3898954"/>
+            <a:off x="7054744" y="2287889"/>
+            <a:ext cx="1585519" cy="771787"/>
+          </a:xfrm>
+          <a:prstGeom prst="roundRect">
+            <a:avLst/>
+          </a:prstGeom>
+        </p:spPr>
+        <p:style>
+          <a:lnRef idx="2">
+            <a:schemeClr val="accent1">
+              <a:shade val="15000"/>
+            </a:schemeClr>
+          </a:lnRef>
+          <a:fillRef idx="1">
+            <a:schemeClr val="accent1"/>
+          </a:fillRef>
+          <a:effectRef idx="0">
+            <a:schemeClr val="accent1"/>
+          </a:effectRef>
+          <a:fontRef idx="minor">
+            <a:schemeClr val="lt1"/>
+          </a:fontRef>
+        </p:style>
+        <p:txBody>
+          <a:bodyPr rtlCol="0" anchor="ctr"/>
+          <a:lstStyle/>
+          <a:p>
+            <a:pPr algn="ctr"/>
+            <a:r>
+              <a:rPr lang="es-CL" dirty="0"/>
+              <a:t>Control de volumen</a:t>
+            </a:r>
+            <a:endParaRPr lang="en-US" dirty="0"/>
+          </a:p>
+        </p:txBody>
+      </p:sp>
+      <p:sp>
+        <p:nvSpPr>
+          <p:cNvPr id="11" name="Rectangle: Rounded Corners 10">
+            <a:extLst>
+              <a:ext uri="{FF2B5EF4-FFF2-40B4-BE49-F238E27FC236}">
+                <a16:creationId xmlns:a16="http://schemas.microsoft.com/office/drawing/2014/main" id="{4B4B18DE-22FC-C146-89A0-7AA029B2D8E5}"/>
+              </a:ext>
+            </a:extLst>
+          </p:cNvPr>
+          <p:cNvSpPr/>
+          <p:nvPr/>
+        </p:nvSpPr>
+        <p:spPr>
+          <a:xfrm>
+            <a:off x="9271526" y="2287889"/>
+            <a:ext cx="1585519" cy="771787"/>
+          </a:xfrm>
+          <a:prstGeom prst="roundRect">
+            <a:avLst/>
+          </a:prstGeom>
+        </p:spPr>
+        <p:style>
+          <a:lnRef idx="2">
+            <a:schemeClr val="accent1">
+              <a:shade val="15000"/>
+            </a:schemeClr>
+          </a:lnRef>
+          <a:fillRef idx="1">
+            <a:schemeClr val="accent1"/>
+          </a:fillRef>
+          <a:effectRef idx="0">
+            <a:schemeClr val="accent1"/>
+          </a:effectRef>
+          <a:fontRef idx="minor">
+            <a:schemeClr val="lt1"/>
+          </a:fontRef>
+        </p:style>
+        <p:txBody>
+          <a:bodyPr rtlCol="0" anchor="ctr"/>
+          <a:lstStyle/>
+          <a:p>
+            <a:pPr algn="ctr"/>
+            <a:r>
+              <a:rPr lang="es-CL" dirty="0"/>
+              <a:t>Amplificador de audio</a:t>
+            </a:r>
+            <a:endParaRPr lang="en-US" dirty="0"/>
+          </a:p>
+        </p:txBody>
+      </p:sp>
+      <p:sp>
+        <p:nvSpPr>
+          <p:cNvPr id="12" name="Rectangle: Rounded Corners 11">
+            <a:extLst>
+              <a:ext uri="{FF2B5EF4-FFF2-40B4-BE49-F238E27FC236}">
+                <a16:creationId xmlns:a16="http://schemas.microsoft.com/office/drawing/2014/main" id="{B095B256-5072-439C-43DA-CED3D7C81379}"/>
+              </a:ext>
+            </a:extLst>
+          </p:cNvPr>
+          <p:cNvSpPr/>
+          <p:nvPr/>
+        </p:nvSpPr>
+        <p:spPr>
+          <a:xfrm>
+            <a:off x="10031244" y="2145972"/>
             <a:ext cx="401275" cy="283833"/>
           </a:xfrm>
           <a:prstGeom prst="roundRect">
@@ -5154,10 +3787,10 @@
       </p:sp>
       <p:sp>
         <p:nvSpPr>
-          <p:cNvPr id="121" name="Rectangle: Rounded Corners 120">
-            <a:extLst>
-              <a:ext uri="{FF2B5EF4-FFF2-40B4-BE49-F238E27FC236}">
-                <a16:creationId xmlns:a16="http://schemas.microsoft.com/office/drawing/2014/main" id="{491C466E-8B86-86B6-D7D5-AC41EC8BCD3C}"/>
+          <p:cNvPr id="14" name="Rectangle: Rounded Corners 13">
+            <a:extLst>
+              <a:ext uri="{FF2B5EF4-FFF2-40B4-BE49-F238E27FC236}">
+                <a16:creationId xmlns:a16="http://schemas.microsoft.com/office/drawing/2014/main" id="{C18804AF-EDD4-92FA-885A-0A99579EBBB2}"/>
               </a:ext>
             </a:extLst>
           </p:cNvPr>
@@ -5166,12 +3799,457 @@
         </p:nvSpPr>
         <p:spPr>
           <a:xfrm>
-            <a:off x="10913801" y="2681656"/>
-            <a:ext cx="401275" cy="283833"/>
+            <a:off x="319819" y="3805075"/>
+            <a:ext cx="1585519" cy="771787"/>
           </a:xfrm>
           <a:prstGeom prst="roundRect">
             <a:avLst/>
           </a:prstGeom>
+        </p:spPr>
+        <p:style>
+          <a:lnRef idx="2">
+            <a:schemeClr val="accent1">
+              <a:shade val="15000"/>
+            </a:schemeClr>
+          </a:lnRef>
+          <a:fillRef idx="1">
+            <a:schemeClr val="accent1"/>
+          </a:fillRef>
+          <a:effectRef idx="0">
+            <a:schemeClr val="accent1"/>
+          </a:effectRef>
+          <a:fontRef idx="minor">
+            <a:schemeClr val="lt1"/>
+          </a:fontRef>
+        </p:style>
+        <p:txBody>
+          <a:bodyPr rtlCol="0" anchor="ctr"/>
+          <a:lstStyle/>
+          <a:p>
+            <a:pPr algn="ctr"/>
+            <a:r>
+              <a:rPr lang="es-CL" dirty="0"/>
+              <a:t>Detector de envolvente</a:t>
+            </a:r>
+            <a:endParaRPr lang="en-US" dirty="0"/>
+          </a:p>
+        </p:txBody>
+      </p:sp>
+      <p:sp>
+        <p:nvSpPr>
+          <p:cNvPr id="17" name="Trapezoid 16">
+            <a:extLst>
+              <a:ext uri="{FF2B5EF4-FFF2-40B4-BE49-F238E27FC236}">
+                <a16:creationId xmlns:a16="http://schemas.microsoft.com/office/drawing/2014/main" id="{8CC4E393-7CE6-6CF2-942A-65714D79C903}"/>
+              </a:ext>
+            </a:extLst>
+          </p:cNvPr>
+          <p:cNvSpPr/>
+          <p:nvPr/>
+        </p:nvSpPr>
+        <p:spPr>
+          <a:xfrm rot="16200000">
+            <a:off x="11344725" y="2604489"/>
+            <a:ext cx="445865" cy="158698"/>
+          </a:xfrm>
+          <a:prstGeom prst="trapezoid">
+            <a:avLst/>
+          </a:prstGeom>
+        </p:spPr>
+        <p:style>
+          <a:lnRef idx="2">
+            <a:schemeClr val="accent1">
+              <a:shade val="15000"/>
+            </a:schemeClr>
+          </a:lnRef>
+          <a:fillRef idx="1">
+            <a:schemeClr val="accent1"/>
+          </a:fillRef>
+          <a:effectRef idx="0">
+            <a:schemeClr val="accent1"/>
+          </a:effectRef>
+          <a:fontRef idx="minor">
+            <a:schemeClr val="lt1"/>
+          </a:fontRef>
+        </p:style>
+        <p:txBody>
+          <a:bodyPr rtlCol="0" anchor="ctr"/>
+          <a:lstStyle/>
+          <a:p>
+            <a:pPr algn="ctr"/>
+            <a:endParaRPr lang="en-US"/>
+          </a:p>
+        </p:txBody>
+      </p:sp>
+      <p:sp>
+        <p:nvSpPr>
+          <p:cNvPr id="19" name="Rectangle 18">
+            <a:extLst>
+              <a:ext uri="{FF2B5EF4-FFF2-40B4-BE49-F238E27FC236}">
+                <a16:creationId xmlns:a16="http://schemas.microsoft.com/office/drawing/2014/main" id="{C3944E92-A1BD-786E-59CE-D0DFF1727AF5}"/>
+              </a:ext>
+            </a:extLst>
+          </p:cNvPr>
+          <p:cNvSpPr/>
+          <p:nvPr/>
+        </p:nvSpPr>
+        <p:spPr>
+          <a:xfrm rot="16200000">
+            <a:off x="11318275" y="2630940"/>
+            <a:ext cx="238045" cy="102020"/>
+          </a:xfrm>
+          <a:prstGeom prst="rect">
+            <a:avLst/>
+          </a:prstGeom>
+        </p:spPr>
+        <p:style>
+          <a:lnRef idx="2">
+            <a:schemeClr val="accent1">
+              <a:shade val="15000"/>
+            </a:schemeClr>
+          </a:lnRef>
+          <a:fillRef idx="1">
+            <a:schemeClr val="accent1"/>
+          </a:fillRef>
+          <a:effectRef idx="0">
+            <a:schemeClr val="accent1"/>
+          </a:effectRef>
+          <a:fontRef idx="minor">
+            <a:schemeClr val="lt1"/>
+          </a:fontRef>
+        </p:style>
+        <p:txBody>
+          <a:bodyPr rtlCol="0" anchor="ctr"/>
+          <a:lstStyle/>
+          <a:p>
+            <a:pPr algn="ctr"/>
+            <a:endParaRPr lang="en-US"/>
+          </a:p>
+        </p:txBody>
+      </p:sp>
+      <p:sp>
+        <p:nvSpPr>
+          <p:cNvPr id="20" name="Rectangle: Rounded Corners 19">
+            <a:extLst>
+              <a:ext uri="{FF2B5EF4-FFF2-40B4-BE49-F238E27FC236}">
+                <a16:creationId xmlns:a16="http://schemas.microsoft.com/office/drawing/2014/main" id="{6D5B386B-9274-C7DE-2DED-F7ECDEAB5F22}"/>
+              </a:ext>
+            </a:extLst>
+          </p:cNvPr>
+          <p:cNvSpPr/>
+          <p:nvPr/>
+        </p:nvSpPr>
+        <p:spPr>
+          <a:xfrm>
+            <a:off x="478765" y="631402"/>
+            <a:ext cx="1585519" cy="771787"/>
+          </a:xfrm>
+          <a:prstGeom prst="roundRect">
+            <a:avLst/>
+          </a:prstGeom>
+        </p:spPr>
+        <p:style>
+          <a:lnRef idx="2">
+            <a:schemeClr val="accent1">
+              <a:shade val="15000"/>
+            </a:schemeClr>
+          </a:lnRef>
+          <a:fillRef idx="1">
+            <a:schemeClr val="accent1"/>
+          </a:fillRef>
+          <a:effectRef idx="0">
+            <a:schemeClr val="accent1"/>
+          </a:effectRef>
+          <a:fontRef idx="minor">
+            <a:schemeClr val="lt1"/>
+          </a:fontRef>
+        </p:style>
+        <p:txBody>
+          <a:bodyPr rtlCol="0" anchor="ctr"/>
+          <a:lstStyle/>
+          <a:p>
+            <a:pPr algn="ctr"/>
+            <a:r>
+              <a:rPr lang="es-CL" dirty="0"/>
+              <a:t>batería</a:t>
+            </a:r>
+            <a:endParaRPr lang="en-US" dirty="0"/>
+          </a:p>
+        </p:txBody>
+      </p:sp>
+      <p:sp>
+        <p:nvSpPr>
+          <p:cNvPr id="22" name="Rectangle: Rounded Corners 21">
+            <a:extLst>
+              <a:ext uri="{FF2B5EF4-FFF2-40B4-BE49-F238E27FC236}">
+                <a16:creationId xmlns:a16="http://schemas.microsoft.com/office/drawing/2014/main" id="{303E9BB9-BB8C-5056-54EE-65EEC51CA02A}"/>
+              </a:ext>
+            </a:extLst>
+          </p:cNvPr>
+          <p:cNvSpPr/>
+          <p:nvPr/>
+        </p:nvSpPr>
+        <p:spPr>
+          <a:xfrm>
+            <a:off x="2501311" y="631401"/>
+            <a:ext cx="1585519" cy="771787"/>
+          </a:xfrm>
+          <a:prstGeom prst="roundRect">
+            <a:avLst/>
+          </a:prstGeom>
+        </p:spPr>
+        <p:style>
+          <a:lnRef idx="2">
+            <a:schemeClr val="accent1">
+              <a:shade val="15000"/>
+            </a:schemeClr>
+          </a:lnRef>
+          <a:fillRef idx="1">
+            <a:schemeClr val="accent1"/>
+          </a:fillRef>
+          <a:effectRef idx="0">
+            <a:schemeClr val="accent1"/>
+          </a:effectRef>
+          <a:fontRef idx="minor">
+            <a:schemeClr val="lt1"/>
+          </a:fontRef>
+        </p:style>
+        <p:txBody>
+          <a:bodyPr rtlCol="0" anchor="ctr"/>
+          <a:lstStyle/>
+          <a:p>
+            <a:pPr algn="ctr"/>
+            <a:r>
+              <a:rPr lang="es-CL" dirty="0"/>
+              <a:t>Regulador*</a:t>
+            </a:r>
+            <a:endParaRPr lang="en-US" dirty="0"/>
+          </a:p>
+        </p:txBody>
+      </p:sp>
+      <p:sp>
+        <p:nvSpPr>
+          <p:cNvPr id="24" name="Rectangle: Rounded Corners 23">
+            <a:extLst>
+              <a:ext uri="{FF2B5EF4-FFF2-40B4-BE49-F238E27FC236}">
+                <a16:creationId xmlns:a16="http://schemas.microsoft.com/office/drawing/2014/main" id="{ACC3D264-BCE4-EB95-EBAA-DA3A2DB99025}"/>
+              </a:ext>
+            </a:extLst>
+          </p:cNvPr>
+          <p:cNvSpPr/>
+          <p:nvPr/>
+        </p:nvSpPr>
+        <p:spPr>
+          <a:xfrm>
+            <a:off x="4613133" y="631401"/>
+            <a:ext cx="1585519" cy="771787"/>
+          </a:xfrm>
+          <a:prstGeom prst="roundRect">
+            <a:avLst/>
+          </a:prstGeom>
+        </p:spPr>
+        <p:style>
+          <a:lnRef idx="2">
+            <a:schemeClr val="accent1">
+              <a:shade val="15000"/>
+            </a:schemeClr>
+          </a:lnRef>
+          <a:fillRef idx="1">
+            <a:schemeClr val="accent1"/>
+          </a:fillRef>
+          <a:effectRef idx="0">
+            <a:schemeClr val="accent1"/>
+          </a:effectRef>
+          <a:fontRef idx="minor">
+            <a:schemeClr val="lt1"/>
+          </a:fontRef>
+        </p:style>
+        <p:txBody>
+          <a:bodyPr rtlCol="0" anchor="ctr"/>
+          <a:lstStyle/>
+          <a:p>
+            <a:pPr algn="ctr"/>
+            <a:r>
+              <a:rPr lang="es-CL" dirty="0"/>
+              <a:t>Tierra virtual</a:t>
+            </a:r>
+            <a:endParaRPr lang="en-US" dirty="0"/>
+          </a:p>
+        </p:txBody>
+      </p:sp>
+      <p:sp>
+        <p:nvSpPr>
+          <p:cNvPr id="25" name="Rectangle: Rounded Corners 24">
+            <a:extLst>
+              <a:ext uri="{FF2B5EF4-FFF2-40B4-BE49-F238E27FC236}">
+                <a16:creationId xmlns:a16="http://schemas.microsoft.com/office/drawing/2014/main" id="{316A8E46-F668-5276-68F4-447692D95ADE}"/>
+              </a:ext>
+            </a:extLst>
+          </p:cNvPr>
+          <p:cNvSpPr/>
+          <p:nvPr/>
+        </p:nvSpPr>
+        <p:spPr>
+          <a:xfrm>
+            <a:off x="5998014" y="553506"/>
+            <a:ext cx="401275" cy="283833"/>
+          </a:xfrm>
+          <a:prstGeom prst="roundRect">
+            <a:avLst/>
+          </a:prstGeom>
+        </p:spPr>
+        <p:style>
+          <a:lnRef idx="2">
+            <a:schemeClr val="accent6">
+              <a:shade val="15000"/>
+            </a:schemeClr>
+          </a:lnRef>
+          <a:fillRef idx="1">
+            <a:schemeClr val="accent6"/>
+          </a:fillRef>
+          <a:effectRef idx="0">
+            <a:schemeClr val="accent6"/>
+          </a:effectRef>
+          <a:fontRef idx="minor">
+            <a:schemeClr val="lt1"/>
+          </a:fontRef>
+        </p:style>
+        <p:txBody>
+          <a:bodyPr rtlCol="0" anchor="ctr"/>
+          <a:lstStyle/>
+          <a:p>
+            <a:pPr algn="ctr"/>
+            <a:r>
+              <a:rPr lang="es-CL" sz="1400" dirty="0"/>
+              <a:t>T2</a:t>
+            </a:r>
+            <a:endParaRPr lang="en-US" sz="1400" dirty="0"/>
+          </a:p>
+        </p:txBody>
+      </p:sp>
+      <p:sp>
+        <p:nvSpPr>
+          <p:cNvPr id="26" name="Rectangle: Rounded Corners 25">
+            <a:extLst>
+              <a:ext uri="{FF2B5EF4-FFF2-40B4-BE49-F238E27FC236}">
+                <a16:creationId xmlns:a16="http://schemas.microsoft.com/office/drawing/2014/main" id="{0286FDBB-7D99-A39C-1FD9-C28B71DF5499}"/>
+              </a:ext>
+            </a:extLst>
+          </p:cNvPr>
+          <p:cNvSpPr/>
+          <p:nvPr/>
+        </p:nvSpPr>
+        <p:spPr>
+          <a:xfrm>
+            <a:off x="3785873" y="489484"/>
+            <a:ext cx="401275" cy="283833"/>
+          </a:xfrm>
+          <a:prstGeom prst="roundRect">
+            <a:avLst/>
+          </a:prstGeom>
+        </p:spPr>
+        <p:style>
+          <a:lnRef idx="2">
+            <a:schemeClr val="dk1">
+              <a:shade val="15000"/>
+            </a:schemeClr>
+          </a:lnRef>
+          <a:fillRef idx="1">
+            <a:schemeClr val="dk1"/>
+          </a:fillRef>
+          <a:effectRef idx="0">
+            <a:schemeClr val="dk1"/>
+          </a:effectRef>
+          <a:fontRef idx="minor">
+            <a:schemeClr val="lt1"/>
+          </a:fontRef>
+        </p:style>
+        <p:txBody>
+          <a:bodyPr rtlCol="0" anchor="ctr"/>
+          <a:lstStyle/>
+          <a:p>
+            <a:pPr algn="ctr"/>
+            <a:r>
+              <a:rPr lang="es-CL" sz="1400" dirty="0"/>
+              <a:t>T7</a:t>
+            </a:r>
+            <a:endParaRPr lang="en-US" sz="1400" dirty="0"/>
+          </a:p>
+        </p:txBody>
+      </p:sp>
+      <p:sp>
+        <p:nvSpPr>
+          <p:cNvPr id="27" name="Rectangle: Rounded Corners 26">
+            <a:extLst>
+              <a:ext uri="{FF2B5EF4-FFF2-40B4-BE49-F238E27FC236}">
+                <a16:creationId xmlns:a16="http://schemas.microsoft.com/office/drawing/2014/main" id="{1A11F713-E141-E5E9-6B65-5D591DBE6516}"/>
+              </a:ext>
+            </a:extLst>
+          </p:cNvPr>
+          <p:cNvSpPr/>
+          <p:nvPr/>
+        </p:nvSpPr>
+        <p:spPr>
+          <a:xfrm>
+            <a:off x="6991410" y="631400"/>
+            <a:ext cx="1585519" cy="771787"/>
+          </a:xfrm>
+          <a:prstGeom prst="roundRect">
+            <a:avLst/>
+          </a:prstGeom>
+        </p:spPr>
+        <p:style>
+          <a:lnRef idx="2">
+            <a:schemeClr val="accent1">
+              <a:shade val="15000"/>
+            </a:schemeClr>
+          </a:lnRef>
+          <a:fillRef idx="1">
+            <a:schemeClr val="accent1"/>
+          </a:fillRef>
+          <a:effectRef idx="0">
+            <a:schemeClr val="accent1"/>
+          </a:effectRef>
+          <a:fontRef idx="minor">
+            <a:schemeClr val="lt1"/>
+          </a:fontRef>
+        </p:style>
+        <p:txBody>
+          <a:bodyPr rtlCol="0" anchor="ctr"/>
+          <a:lstStyle/>
+          <a:p>
+            <a:pPr algn="ctr"/>
+            <a:r>
+              <a:rPr lang="es-CL" dirty="0"/>
+              <a:t>Luz encendido 1</a:t>
+            </a:r>
+            <a:endParaRPr lang="en-US" dirty="0"/>
+          </a:p>
+        </p:txBody>
+      </p:sp>
+      <p:sp>
+        <p:nvSpPr>
+          <p:cNvPr id="28" name="Rectangle: Rounded Corners 27">
+            <a:extLst>
+              <a:ext uri="{FF2B5EF4-FFF2-40B4-BE49-F238E27FC236}">
+                <a16:creationId xmlns:a16="http://schemas.microsoft.com/office/drawing/2014/main" id="{EA04D2F9-78CA-AA2F-76CF-386EB6FEFC96}"/>
+              </a:ext>
+            </a:extLst>
+          </p:cNvPr>
+          <p:cNvSpPr/>
+          <p:nvPr/>
+        </p:nvSpPr>
+        <p:spPr>
+          <a:xfrm>
+            <a:off x="8376291" y="553506"/>
+            <a:ext cx="401275" cy="283833"/>
+          </a:xfrm>
+          <a:prstGeom prst="roundRect">
+            <a:avLst/>
+          </a:prstGeom>
+          <a:solidFill>
+            <a:srgbClr val="FF0000"/>
+          </a:solidFill>
         </p:spPr>
         <p:style>
           <a:lnRef idx="2">
@@ -5196,7 +4274,7 @@
             <a:pPr algn="ctr"/>
             <a:r>
               <a:rPr lang="es-CL" sz="1400" dirty="0"/>
-              <a:t>T1</a:t>
+              <a:t>T5</a:t>
             </a:r>
             <a:endParaRPr lang="en-US" sz="1400" dirty="0"/>
           </a:p>
@@ -5204,10 +4282,10 @@
       </p:sp>
       <p:sp>
         <p:nvSpPr>
-          <p:cNvPr id="122" name="Rectangle: Rounded Corners 121">
-            <a:extLst>
-              <a:ext uri="{FF2B5EF4-FFF2-40B4-BE49-F238E27FC236}">
-                <a16:creationId xmlns:a16="http://schemas.microsoft.com/office/drawing/2014/main" id="{6EDFD18E-66BD-3BD9-4DB3-5101E8110049}"/>
+          <p:cNvPr id="29" name="Rectangle: Rounded Corners 28">
+            <a:extLst>
+              <a:ext uri="{FF2B5EF4-FFF2-40B4-BE49-F238E27FC236}">
+                <a16:creationId xmlns:a16="http://schemas.microsoft.com/office/drawing/2014/main" id="{1E7FAB57-3C93-EE7F-12CC-2CE2ACFE26A3}"/>
               </a:ext>
             </a:extLst>
           </p:cNvPr>
@@ -5216,8 +4294,8 @@
         </p:nvSpPr>
         <p:spPr>
           <a:xfrm>
-            <a:off x="6442591" y="2120098"/>
-            <a:ext cx="401275" cy="283833"/>
+            <a:off x="386634" y="5384038"/>
+            <a:ext cx="1585519" cy="771787"/>
           </a:xfrm>
           <a:prstGeom prst="roundRect">
             <a:avLst/>
@@ -5225,15 +4303,15 @@
         </p:spPr>
         <p:style>
           <a:lnRef idx="2">
-            <a:schemeClr val="accent6">
+            <a:schemeClr val="accent1">
               <a:shade val="15000"/>
             </a:schemeClr>
           </a:lnRef>
           <a:fillRef idx="1">
-            <a:schemeClr val="accent6"/>
+            <a:schemeClr val="accent1"/>
           </a:fillRef>
           <a:effectRef idx="0">
-            <a:schemeClr val="accent6"/>
+            <a:schemeClr val="accent1"/>
           </a:effectRef>
           <a:fontRef idx="minor">
             <a:schemeClr val="lt1"/>
@@ -5245,19 +4323,19 @@
           <a:p>
             <a:pPr algn="ctr"/>
             <a:r>
-              <a:rPr lang="es-CL" sz="1400" dirty="0"/>
-              <a:t>T2</a:t>
-            </a:r>
-            <a:endParaRPr lang="en-US" sz="1400" dirty="0"/>
-          </a:p>
-        </p:txBody>
-      </p:sp>
-      <p:sp>
-        <p:nvSpPr>
-          <p:cNvPr id="123" name="Rectangle: Rounded Corners 122">
-            <a:extLst>
-              <a:ext uri="{FF2B5EF4-FFF2-40B4-BE49-F238E27FC236}">
-                <a16:creationId xmlns:a16="http://schemas.microsoft.com/office/drawing/2014/main" id="{63283D64-E185-CB86-A22B-59FCD6C8A38F}"/>
+              <a:rPr lang="es-CL" dirty="0"/>
+              <a:t>Luz encendido 2</a:t>
+            </a:r>
+            <a:endParaRPr lang="en-US" dirty="0"/>
+          </a:p>
+        </p:txBody>
+      </p:sp>
+      <p:sp>
+        <p:nvSpPr>
+          <p:cNvPr id="30" name="Rectangle: Rounded Corners 29">
+            <a:extLst>
+              <a:ext uri="{FF2B5EF4-FFF2-40B4-BE49-F238E27FC236}">
+                <a16:creationId xmlns:a16="http://schemas.microsoft.com/office/drawing/2014/main" id="{58CE8E52-21D4-6855-433C-0D0B0E2EA050}"/>
               </a:ext>
             </a:extLst>
           </p:cNvPr>
@@ -5266,24 +4344,27 @@
         </p:nvSpPr>
         <p:spPr>
           <a:xfrm>
-            <a:off x="6396652" y="4233817"/>
+            <a:off x="1771515" y="5306144"/>
             <a:ext cx="401275" cy="283833"/>
           </a:xfrm>
           <a:prstGeom prst="roundRect">
             <a:avLst/>
           </a:prstGeom>
+          <a:solidFill>
+            <a:srgbClr val="FF0000"/>
+          </a:solidFill>
         </p:spPr>
         <p:style>
           <a:lnRef idx="2">
-            <a:schemeClr val="accent6">
+            <a:schemeClr val="accent2">
               <a:shade val="15000"/>
             </a:schemeClr>
           </a:lnRef>
           <a:fillRef idx="1">
-            <a:schemeClr val="accent6"/>
+            <a:schemeClr val="accent2"/>
           </a:fillRef>
           <a:effectRef idx="0">
-            <a:schemeClr val="accent6"/>
+            <a:schemeClr val="accent2"/>
           </a:effectRef>
           <a:fontRef idx="minor">
             <a:schemeClr val="lt1"/>
@@ -5296,7 +4377,7 @@
             <a:pPr algn="ctr"/>
             <a:r>
               <a:rPr lang="es-CL" sz="1400" dirty="0"/>
-              <a:t>T2</a:t>
+              <a:t>T5</a:t>
             </a:r>
             <a:endParaRPr lang="en-US" sz="1400" dirty="0"/>
           </a:p>
@@ -5304,10 +4385,10 @@
       </p:sp>
       <p:sp>
         <p:nvSpPr>
-          <p:cNvPr id="124" name="Rectangle: Rounded Corners 123">
-            <a:extLst>
-              <a:ext uri="{FF2B5EF4-FFF2-40B4-BE49-F238E27FC236}">
-                <a16:creationId xmlns:a16="http://schemas.microsoft.com/office/drawing/2014/main" id="{3182ABD7-6C85-56C3-2402-B9261CB095BD}"/>
+          <p:cNvPr id="31" name="Rectangle: Rounded Corners 30">
+            <a:extLst>
+              <a:ext uri="{FF2B5EF4-FFF2-40B4-BE49-F238E27FC236}">
+                <a16:creationId xmlns:a16="http://schemas.microsoft.com/office/drawing/2014/main" id="{7B2E9C9A-F312-8791-62C1-247F4BC60435}"/>
               </a:ext>
             </a:extLst>
           </p:cNvPr>
@@ -5316,8 +4397,8 @@
         </p:nvSpPr>
         <p:spPr>
           <a:xfrm>
-            <a:off x="3960344" y="3821717"/>
-            <a:ext cx="401275" cy="283833"/>
+            <a:off x="2397141" y="3808584"/>
+            <a:ext cx="1585519" cy="771787"/>
           </a:xfrm>
           <a:prstGeom prst="roundRect">
             <a:avLst/>
@@ -5325,15 +4406,15 @@
         </p:spPr>
         <p:style>
           <a:lnRef idx="2">
-            <a:schemeClr val="accent6">
+            <a:schemeClr val="accent1">
               <a:shade val="15000"/>
             </a:schemeClr>
           </a:lnRef>
           <a:fillRef idx="1">
-            <a:schemeClr val="accent6"/>
+            <a:schemeClr val="accent1"/>
           </a:fillRef>
           <a:effectRef idx="0">
-            <a:schemeClr val="accent6"/>
+            <a:schemeClr val="accent1"/>
           </a:effectRef>
           <a:fontRef idx="minor">
             <a:schemeClr val="lt1"/>
@@ -5345,19 +4426,19 @@
           <a:p>
             <a:pPr algn="ctr"/>
             <a:r>
-              <a:rPr lang="es-CL" sz="1400" dirty="0"/>
-              <a:t>T2</a:t>
-            </a:r>
-            <a:endParaRPr lang="en-US" sz="1400" dirty="0"/>
-          </a:p>
-        </p:txBody>
-      </p:sp>
-      <p:sp>
-        <p:nvSpPr>
-          <p:cNvPr id="125" name="Rectangle: Rounded Corners 124">
-            <a:extLst>
-              <a:ext uri="{FF2B5EF4-FFF2-40B4-BE49-F238E27FC236}">
-                <a16:creationId xmlns:a16="http://schemas.microsoft.com/office/drawing/2014/main" id="{84305F12-21B5-A7A1-E56D-316B64F8B0DC}"/>
+              <a:rPr lang="es-CL" dirty="0"/>
+              <a:t>Generador de pulso</a:t>
+            </a:r>
+            <a:endParaRPr lang="en-US" dirty="0"/>
+          </a:p>
+        </p:txBody>
+      </p:sp>
+      <p:sp>
+        <p:nvSpPr>
+          <p:cNvPr id="32" name="Rectangle: Rounded Corners 31">
+            <a:extLst>
+              <a:ext uri="{FF2B5EF4-FFF2-40B4-BE49-F238E27FC236}">
+                <a16:creationId xmlns:a16="http://schemas.microsoft.com/office/drawing/2014/main" id="{27D835A2-6D8F-742A-DCA0-12326A5D0F65}"/>
               </a:ext>
             </a:extLst>
           </p:cNvPr>
@@ -5366,7 +4447,7 @@
         </p:nvSpPr>
         <p:spPr>
           <a:xfrm>
-            <a:off x="1967544" y="2377988"/>
+            <a:off x="3780807" y="3733688"/>
             <a:ext cx="401275" cy="283833"/>
           </a:xfrm>
           <a:prstGeom prst="roundRect">
@@ -5428,10 +4509,10 @@
       </p:sp>
       <p:sp>
         <p:nvSpPr>
-          <p:cNvPr id="127" name="Rectangle: Rounded Corners 126">
-            <a:extLst>
-              <a:ext uri="{FF2B5EF4-FFF2-40B4-BE49-F238E27FC236}">
-                <a16:creationId xmlns:a16="http://schemas.microsoft.com/office/drawing/2014/main" id="{D2F222E5-4425-269E-39AE-C96EC5FD43C6}"/>
+          <p:cNvPr id="33" name="Rectangle: Rounded Corners 32">
+            <a:extLst>
+              <a:ext uri="{FF2B5EF4-FFF2-40B4-BE49-F238E27FC236}">
+                <a16:creationId xmlns:a16="http://schemas.microsoft.com/office/drawing/2014/main" id="{43CB77D9-D19A-C62C-C80D-99A57312F0B0}"/>
               </a:ext>
             </a:extLst>
           </p:cNvPr>
@@ -5440,7 +4521,1263 @@
         </p:nvSpPr>
         <p:spPr>
           <a:xfrm>
-            <a:off x="4032718" y="4156579"/>
+            <a:off x="6474527" y="3811683"/>
+            <a:ext cx="1585519" cy="771787"/>
+          </a:xfrm>
+          <a:prstGeom prst="roundRect">
+            <a:avLst/>
+          </a:prstGeom>
+        </p:spPr>
+        <p:style>
+          <a:lnRef idx="2">
+            <a:schemeClr val="accent1">
+              <a:shade val="15000"/>
+            </a:schemeClr>
+          </a:lnRef>
+          <a:fillRef idx="1">
+            <a:schemeClr val="accent1"/>
+          </a:fillRef>
+          <a:effectRef idx="0">
+            <a:schemeClr val="accent1"/>
+          </a:effectRef>
+          <a:fontRef idx="minor">
+            <a:schemeClr val="lt1"/>
+          </a:fontRef>
+        </p:style>
+        <p:txBody>
+          <a:bodyPr rtlCol="0" anchor="ctr"/>
+          <a:lstStyle/>
+          <a:p>
+            <a:pPr algn="ctr"/>
+            <a:r>
+              <a:rPr lang="es-CL" dirty="0"/>
+              <a:t>Multivibrador monoestable</a:t>
+            </a:r>
+            <a:r>
+              <a:rPr lang="es-CL" sz="1600" dirty="0"/>
+              <a:t>*</a:t>
+            </a:r>
+            <a:endParaRPr lang="en-US" dirty="0"/>
+          </a:p>
+        </p:txBody>
+      </p:sp>
+      <p:sp>
+        <p:nvSpPr>
+          <p:cNvPr id="35" name="Rectangle: Rounded Corners 34">
+            <a:extLst>
+              <a:ext uri="{FF2B5EF4-FFF2-40B4-BE49-F238E27FC236}">
+                <a16:creationId xmlns:a16="http://schemas.microsoft.com/office/drawing/2014/main" id="{0A5E6DB4-FC1F-4875-19AA-8454C94557E3}"/>
+              </a:ext>
+            </a:extLst>
+          </p:cNvPr>
+          <p:cNvSpPr/>
+          <p:nvPr/>
+        </p:nvSpPr>
+        <p:spPr>
+          <a:xfrm>
+            <a:off x="7720359" y="3669765"/>
+            <a:ext cx="401275" cy="283833"/>
+          </a:xfrm>
+          <a:prstGeom prst="roundRect">
+            <a:avLst/>
+          </a:prstGeom>
+          <a:solidFill>
+            <a:schemeClr val="bg1"/>
+          </a:solidFill>
+        </p:spPr>
+        <p:style>
+          <a:lnRef idx="2">
+            <a:schemeClr val="accent2">
+              <a:shade val="15000"/>
+            </a:schemeClr>
+          </a:lnRef>
+          <a:fillRef idx="1">
+            <a:schemeClr val="accent2"/>
+          </a:fillRef>
+          <a:effectRef idx="0">
+            <a:schemeClr val="accent2"/>
+          </a:effectRef>
+          <a:fontRef idx="minor">
+            <a:schemeClr val="lt1"/>
+          </a:fontRef>
+        </p:style>
+        <p:txBody>
+          <a:bodyPr rtlCol="0" anchor="ctr"/>
+          <a:lstStyle/>
+          <a:p>
+            <a:pPr algn="ctr"/>
+            <a:r>
+              <a:rPr lang="es-CL" sz="1400" dirty="0">
+                <a:solidFill>
+                  <a:schemeClr val="tx1"/>
+                </a:solidFill>
+              </a:rPr>
+              <a:t>T8</a:t>
+            </a:r>
+            <a:endParaRPr lang="en-US" sz="1400" dirty="0">
+              <a:solidFill>
+                <a:schemeClr val="tx1"/>
+              </a:solidFill>
+            </a:endParaRPr>
+          </a:p>
+        </p:txBody>
+      </p:sp>
+      <p:sp>
+        <p:nvSpPr>
+          <p:cNvPr id="36" name="Rectangle: Rounded Corners 35">
+            <a:extLst>
+              <a:ext uri="{FF2B5EF4-FFF2-40B4-BE49-F238E27FC236}">
+                <a16:creationId xmlns:a16="http://schemas.microsoft.com/office/drawing/2014/main" id="{37DB4407-5CB5-C41B-6CFD-63AFF4FE0B74}"/>
+              </a:ext>
+            </a:extLst>
+          </p:cNvPr>
+          <p:cNvSpPr/>
+          <p:nvPr/>
+        </p:nvSpPr>
+        <p:spPr>
+          <a:xfrm>
+            <a:off x="4374145" y="3869257"/>
+            <a:ext cx="1585519" cy="771787"/>
+          </a:xfrm>
+          <a:prstGeom prst="roundRect">
+            <a:avLst/>
+          </a:prstGeom>
+        </p:spPr>
+        <p:style>
+          <a:lnRef idx="2">
+            <a:schemeClr val="accent1">
+              <a:shade val="15000"/>
+            </a:schemeClr>
+          </a:lnRef>
+          <a:fillRef idx="1">
+            <a:schemeClr val="accent1"/>
+          </a:fillRef>
+          <a:effectRef idx="0">
+            <a:schemeClr val="accent1"/>
+          </a:effectRef>
+          <a:fontRef idx="minor">
+            <a:schemeClr val="lt1"/>
+          </a:fontRef>
+        </p:style>
+        <p:txBody>
+          <a:bodyPr rtlCol="0" anchor="ctr"/>
+          <a:lstStyle/>
+          <a:p>
+            <a:pPr algn="ctr"/>
+            <a:r>
+              <a:rPr lang="es-CL" dirty="0"/>
+              <a:t>Gatillo*</a:t>
+            </a:r>
+            <a:endParaRPr lang="en-US" dirty="0"/>
+          </a:p>
+        </p:txBody>
+      </p:sp>
+      <p:sp>
+        <p:nvSpPr>
+          <p:cNvPr id="39" name="Rectangle: Rounded Corners 38">
+            <a:extLst>
+              <a:ext uri="{FF2B5EF4-FFF2-40B4-BE49-F238E27FC236}">
+                <a16:creationId xmlns:a16="http://schemas.microsoft.com/office/drawing/2014/main" id="{899AC407-ACDF-BD75-B2E4-BA7EFA0C2E7A}"/>
+              </a:ext>
+            </a:extLst>
+          </p:cNvPr>
+          <p:cNvSpPr/>
+          <p:nvPr/>
+        </p:nvSpPr>
+        <p:spPr>
+          <a:xfrm>
+            <a:off x="5743356" y="3751797"/>
+            <a:ext cx="401275" cy="283833"/>
+          </a:xfrm>
+          <a:prstGeom prst="roundRect">
+            <a:avLst/>
+          </a:prstGeom>
+          <a:solidFill>
+            <a:srgbClr val="7030A0"/>
+          </a:solidFill>
+        </p:spPr>
+        <p:style>
+          <a:lnRef idx="2">
+            <a:schemeClr val="accent2">
+              <a:shade val="15000"/>
+            </a:schemeClr>
+          </a:lnRef>
+          <a:fillRef idx="1">
+            <a:schemeClr val="accent2"/>
+          </a:fillRef>
+          <a:effectRef idx="0">
+            <a:schemeClr val="accent2"/>
+          </a:effectRef>
+          <a:fontRef idx="minor">
+            <a:schemeClr val="lt1"/>
+          </a:fontRef>
+        </p:style>
+        <p:txBody>
+          <a:bodyPr rtlCol="0" anchor="ctr"/>
+          <a:lstStyle/>
+          <a:p>
+            <a:pPr algn="ctr"/>
+            <a:r>
+              <a:rPr lang="es-CL" sz="1400" dirty="0"/>
+              <a:t>T6</a:t>
+            </a:r>
+            <a:endParaRPr lang="en-US" sz="1400" dirty="0"/>
+          </a:p>
+        </p:txBody>
+      </p:sp>
+      <p:sp>
+        <p:nvSpPr>
+          <p:cNvPr id="43" name="Rectangle: Rounded Corners 42">
+            <a:extLst>
+              <a:ext uri="{FF2B5EF4-FFF2-40B4-BE49-F238E27FC236}">
+                <a16:creationId xmlns:a16="http://schemas.microsoft.com/office/drawing/2014/main" id="{713CB9BC-FCDC-4AD3-EDC1-53E2BA36F115}"/>
+              </a:ext>
+            </a:extLst>
+          </p:cNvPr>
+          <p:cNvSpPr/>
+          <p:nvPr/>
+        </p:nvSpPr>
+        <p:spPr>
+          <a:xfrm>
+            <a:off x="8762606" y="3893714"/>
+            <a:ext cx="1585519" cy="771787"/>
+          </a:xfrm>
+          <a:prstGeom prst="roundRect">
+            <a:avLst/>
+          </a:prstGeom>
+        </p:spPr>
+        <p:style>
+          <a:lnRef idx="2">
+            <a:schemeClr val="accent1">
+              <a:shade val="15000"/>
+            </a:schemeClr>
+          </a:lnRef>
+          <a:fillRef idx="1">
+            <a:schemeClr val="accent1"/>
+          </a:fillRef>
+          <a:effectRef idx="0">
+            <a:schemeClr val="accent1"/>
+          </a:effectRef>
+          <a:fontRef idx="minor">
+            <a:schemeClr val="lt1"/>
+          </a:fontRef>
+        </p:style>
+        <p:txBody>
+          <a:bodyPr rtlCol="0" anchor="ctr"/>
+          <a:lstStyle/>
+          <a:p>
+            <a:pPr algn="ctr"/>
+            <a:r>
+              <a:rPr lang="es-CL" dirty="0"/>
+              <a:t>Filtro 2</a:t>
+            </a:r>
+            <a:endParaRPr lang="en-US" dirty="0"/>
+          </a:p>
+        </p:txBody>
+      </p:sp>
+      <p:sp>
+        <p:nvSpPr>
+          <p:cNvPr id="45" name="Rectangle: Rounded Corners 44">
+            <a:extLst>
+              <a:ext uri="{FF2B5EF4-FFF2-40B4-BE49-F238E27FC236}">
+                <a16:creationId xmlns:a16="http://schemas.microsoft.com/office/drawing/2014/main" id="{C3C7289F-DDEF-BCB0-8C49-68DE923E5EAD}"/>
+              </a:ext>
+            </a:extLst>
+          </p:cNvPr>
+          <p:cNvSpPr/>
+          <p:nvPr/>
+        </p:nvSpPr>
+        <p:spPr>
+          <a:xfrm>
+            <a:off x="9176274" y="5306144"/>
+            <a:ext cx="1585519" cy="771787"/>
+          </a:xfrm>
+          <a:prstGeom prst="roundRect">
+            <a:avLst/>
+          </a:prstGeom>
+        </p:spPr>
+        <p:style>
+          <a:lnRef idx="2">
+            <a:schemeClr val="accent1">
+              <a:shade val="15000"/>
+            </a:schemeClr>
+          </a:lnRef>
+          <a:fillRef idx="1">
+            <a:schemeClr val="accent1"/>
+          </a:fillRef>
+          <a:effectRef idx="0">
+            <a:schemeClr val="accent1"/>
+          </a:effectRef>
+          <a:fontRef idx="minor">
+            <a:schemeClr val="lt1"/>
+          </a:fontRef>
+        </p:style>
+        <p:txBody>
+          <a:bodyPr rtlCol="0" anchor="ctr"/>
+          <a:lstStyle/>
+          <a:p>
+            <a:pPr algn="ctr"/>
+            <a:r>
+              <a:rPr lang="es-CL" dirty="0"/>
+              <a:t>Indicador de pulso</a:t>
+            </a:r>
+            <a:endParaRPr lang="en-US" dirty="0"/>
+          </a:p>
+        </p:txBody>
+      </p:sp>
+      <p:sp>
+        <p:nvSpPr>
+          <p:cNvPr id="46" name="Rectangle: Rounded Corners 45">
+            <a:extLst>
+              <a:ext uri="{FF2B5EF4-FFF2-40B4-BE49-F238E27FC236}">
+                <a16:creationId xmlns:a16="http://schemas.microsoft.com/office/drawing/2014/main" id="{C6FA60A8-AA44-D90F-B94E-5BC046886A2A}"/>
+              </a:ext>
+            </a:extLst>
+          </p:cNvPr>
+          <p:cNvSpPr/>
+          <p:nvPr/>
+        </p:nvSpPr>
+        <p:spPr>
+          <a:xfrm>
+            <a:off x="10561155" y="5228250"/>
+            <a:ext cx="401275" cy="283833"/>
+          </a:xfrm>
+          <a:prstGeom prst="roundRect">
+            <a:avLst/>
+          </a:prstGeom>
+          <a:solidFill>
+            <a:srgbClr val="FF0000"/>
+          </a:solidFill>
+        </p:spPr>
+        <p:style>
+          <a:lnRef idx="2">
+            <a:schemeClr val="accent2">
+              <a:shade val="15000"/>
+            </a:schemeClr>
+          </a:lnRef>
+          <a:fillRef idx="1">
+            <a:schemeClr val="accent2"/>
+          </a:fillRef>
+          <a:effectRef idx="0">
+            <a:schemeClr val="accent2"/>
+          </a:effectRef>
+          <a:fontRef idx="minor">
+            <a:schemeClr val="lt1"/>
+          </a:fontRef>
+        </p:style>
+        <p:txBody>
+          <a:bodyPr rtlCol="0" anchor="ctr"/>
+          <a:lstStyle/>
+          <a:p>
+            <a:pPr algn="ctr"/>
+            <a:r>
+              <a:rPr lang="es-CL" sz="1400" dirty="0"/>
+              <a:t>T5</a:t>
+            </a:r>
+            <a:endParaRPr lang="en-US" sz="1400" dirty="0"/>
+          </a:p>
+        </p:txBody>
+      </p:sp>
+      <p:sp>
+        <p:nvSpPr>
+          <p:cNvPr id="47" name="Rectangle: Rounded Corners 46">
+            <a:extLst>
+              <a:ext uri="{FF2B5EF4-FFF2-40B4-BE49-F238E27FC236}">
+                <a16:creationId xmlns:a16="http://schemas.microsoft.com/office/drawing/2014/main" id="{177376A7-58C6-ECB3-0971-09E63FFB3288}"/>
+              </a:ext>
+            </a:extLst>
+          </p:cNvPr>
+          <p:cNvSpPr/>
+          <p:nvPr/>
+        </p:nvSpPr>
+        <p:spPr>
+          <a:xfrm>
+            <a:off x="7012118" y="5306144"/>
+            <a:ext cx="1585519" cy="771787"/>
+          </a:xfrm>
+          <a:prstGeom prst="roundRect">
+            <a:avLst/>
+          </a:prstGeom>
+        </p:spPr>
+        <p:style>
+          <a:lnRef idx="2">
+            <a:schemeClr val="accent1">
+              <a:shade val="15000"/>
+            </a:schemeClr>
+          </a:lnRef>
+          <a:fillRef idx="1">
+            <a:schemeClr val="accent1"/>
+          </a:fillRef>
+          <a:effectRef idx="0">
+            <a:schemeClr val="accent1"/>
+          </a:effectRef>
+          <a:fontRef idx="minor">
+            <a:schemeClr val="lt1"/>
+          </a:fontRef>
+        </p:style>
+        <p:txBody>
+          <a:bodyPr rtlCol="0" anchor="ctr"/>
+          <a:lstStyle/>
+          <a:p>
+            <a:pPr algn="ctr"/>
+            <a:r>
+              <a:rPr lang="es-CL" dirty="0"/>
+              <a:t>Driver*</a:t>
+            </a:r>
+            <a:endParaRPr lang="en-US" dirty="0"/>
+          </a:p>
+        </p:txBody>
+      </p:sp>
+      <p:sp>
+        <p:nvSpPr>
+          <p:cNvPr id="48" name="Rectangle: Rounded Corners 47">
+            <a:extLst>
+              <a:ext uri="{FF2B5EF4-FFF2-40B4-BE49-F238E27FC236}">
+                <a16:creationId xmlns:a16="http://schemas.microsoft.com/office/drawing/2014/main" id="{19F4B2FE-CE31-5208-4799-104527E594FF}"/>
+              </a:ext>
+            </a:extLst>
+          </p:cNvPr>
+          <p:cNvSpPr/>
+          <p:nvPr/>
+        </p:nvSpPr>
+        <p:spPr>
+          <a:xfrm>
+            <a:off x="8381329" y="5188684"/>
+            <a:ext cx="401275" cy="283833"/>
+          </a:xfrm>
+          <a:prstGeom prst="roundRect">
+            <a:avLst/>
+          </a:prstGeom>
+          <a:solidFill>
+            <a:srgbClr val="7030A0"/>
+          </a:solidFill>
+        </p:spPr>
+        <p:style>
+          <a:lnRef idx="2">
+            <a:schemeClr val="accent2">
+              <a:shade val="15000"/>
+            </a:schemeClr>
+          </a:lnRef>
+          <a:fillRef idx="1">
+            <a:schemeClr val="accent2"/>
+          </a:fillRef>
+          <a:effectRef idx="0">
+            <a:schemeClr val="accent2"/>
+          </a:effectRef>
+          <a:fontRef idx="minor">
+            <a:schemeClr val="lt1"/>
+          </a:fontRef>
+        </p:style>
+        <p:txBody>
+          <a:bodyPr rtlCol="0" anchor="ctr"/>
+          <a:lstStyle/>
+          <a:p>
+            <a:pPr algn="ctr"/>
+            <a:r>
+              <a:rPr lang="es-CL" sz="1400" dirty="0"/>
+              <a:t>T6</a:t>
+            </a:r>
+            <a:endParaRPr lang="en-US" sz="1400" dirty="0"/>
+          </a:p>
+        </p:txBody>
+      </p:sp>
+      <p:sp>
+        <p:nvSpPr>
+          <p:cNvPr id="50" name="Rectangle: Beveled 49">
+            <a:extLst>
+              <a:ext uri="{FF2B5EF4-FFF2-40B4-BE49-F238E27FC236}">
+                <a16:creationId xmlns:a16="http://schemas.microsoft.com/office/drawing/2014/main" id="{9052F626-9CB7-CDC7-A1C5-6266D49CD7AA}"/>
+              </a:ext>
+            </a:extLst>
+          </p:cNvPr>
+          <p:cNvSpPr/>
+          <p:nvPr/>
+        </p:nvSpPr>
+        <p:spPr>
+          <a:xfrm>
+            <a:off x="10761793" y="4007261"/>
+            <a:ext cx="1299219" cy="562850"/>
+          </a:xfrm>
+          <a:prstGeom prst="bevel">
+            <a:avLst/>
+          </a:prstGeom>
+        </p:spPr>
+        <p:style>
+          <a:lnRef idx="2">
+            <a:schemeClr val="accent1">
+              <a:shade val="15000"/>
+            </a:schemeClr>
+          </a:lnRef>
+          <a:fillRef idx="1">
+            <a:schemeClr val="accent1"/>
+          </a:fillRef>
+          <a:effectRef idx="0">
+            <a:schemeClr val="accent1"/>
+          </a:effectRef>
+          <a:fontRef idx="minor">
+            <a:schemeClr val="lt1"/>
+          </a:fontRef>
+        </p:style>
+        <p:txBody>
+          <a:bodyPr rtlCol="0" anchor="ctr"/>
+          <a:lstStyle/>
+          <a:p>
+            <a:pPr algn="ctr"/>
+            <a:r>
+              <a:rPr lang="en-US" dirty="0"/>
+              <a:t>display</a:t>
+            </a:r>
+          </a:p>
+        </p:txBody>
+      </p:sp>
+      <p:cxnSp>
+        <p:nvCxnSpPr>
+          <p:cNvPr id="52" name="Straight Arrow Connector 51">
+            <a:extLst>
+              <a:ext uri="{FF2B5EF4-FFF2-40B4-BE49-F238E27FC236}">
+                <a16:creationId xmlns:a16="http://schemas.microsoft.com/office/drawing/2014/main" id="{33887707-1F88-71EB-8350-C1BA9C7FF998}"/>
+              </a:ext>
+            </a:extLst>
+          </p:cNvPr>
+          <p:cNvCxnSpPr>
+            <a:stCxn id="20" idx="3"/>
+            <a:endCxn id="22" idx="1"/>
+          </p:cNvCxnSpPr>
+          <p:nvPr/>
+        </p:nvCxnSpPr>
+        <p:spPr>
+          <a:xfrm flipV="1">
+            <a:off x="2064284" y="1017295"/>
+            <a:ext cx="437027" cy="1"/>
+          </a:xfrm>
+          <a:prstGeom prst="straightConnector1">
+            <a:avLst/>
+          </a:prstGeom>
+          <a:ln>
+            <a:tailEnd type="triangle"/>
+          </a:ln>
+        </p:spPr>
+        <p:style>
+          <a:lnRef idx="1">
+            <a:schemeClr val="accent1"/>
+          </a:lnRef>
+          <a:fillRef idx="0">
+            <a:schemeClr val="accent1"/>
+          </a:fillRef>
+          <a:effectRef idx="0">
+            <a:schemeClr val="accent1"/>
+          </a:effectRef>
+          <a:fontRef idx="minor">
+            <a:schemeClr val="tx1"/>
+          </a:fontRef>
+        </p:style>
+      </p:cxnSp>
+      <p:cxnSp>
+        <p:nvCxnSpPr>
+          <p:cNvPr id="54" name="Straight Arrow Connector 53">
+            <a:extLst>
+              <a:ext uri="{FF2B5EF4-FFF2-40B4-BE49-F238E27FC236}">
+                <a16:creationId xmlns:a16="http://schemas.microsoft.com/office/drawing/2014/main" id="{102A8F7C-8151-7F2F-BB1A-0B9FC5E5B649}"/>
+              </a:ext>
+            </a:extLst>
+          </p:cNvPr>
+          <p:cNvCxnSpPr>
+            <a:stCxn id="22" idx="3"/>
+            <a:endCxn id="24" idx="1"/>
+          </p:cNvCxnSpPr>
+          <p:nvPr/>
+        </p:nvCxnSpPr>
+        <p:spPr>
+          <a:xfrm>
+            <a:off x="4086830" y="1017295"/>
+            <a:ext cx="526303" cy="0"/>
+          </a:xfrm>
+          <a:prstGeom prst="straightConnector1">
+            <a:avLst/>
+          </a:prstGeom>
+          <a:ln>
+            <a:tailEnd type="triangle"/>
+          </a:ln>
+        </p:spPr>
+        <p:style>
+          <a:lnRef idx="1">
+            <a:schemeClr val="accent1"/>
+          </a:lnRef>
+          <a:fillRef idx="0">
+            <a:schemeClr val="accent1"/>
+          </a:fillRef>
+          <a:effectRef idx="0">
+            <a:schemeClr val="accent1"/>
+          </a:effectRef>
+          <a:fontRef idx="minor">
+            <a:schemeClr val="tx1"/>
+          </a:fontRef>
+        </p:style>
+      </p:cxnSp>
+      <p:cxnSp>
+        <p:nvCxnSpPr>
+          <p:cNvPr id="58" name="Straight Arrow Connector 57">
+            <a:extLst>
+              <a:ext uri="{FF2B5EF4-FFF2-40B4-BE49-F238E27FC236}">
+                <a16:creationId xmlns:a16="http://schemas.microsoft.com/office/drawing/2014/main" id="{D8E2C7C4-D7C6-C282-2BF3-A511563B2D3B}"/>
+              </a:ext>
+            </a:extLst>
+          </p:cNvPr>
+          <p:cNvCxnSpPr>
+            <a:stCxn id="4" idx="3"/>
+            <a:endCxn id="6" idx="1"/>
+          </p:cNvCxnSpPr>
+          <p:nvPr/>
+        </p:nvCxnSpPr>
+        <p:spPr>
+          <a:xfrm>
+            <a:off x="1919549" y="2667033"/>
+            <a:ext cx="581763" cy="6750"/>
+          </a:xfrm>
+          <a:prstGeom prst="straightConnector1">
+            <a:avLst/>
+          </a:prstGeom>
+          <a:ln>
+            <a:tailEnd type="triangle"/>
+          </a:ln>
+        </p:spPr>
+        <p:style>
+          <a:lnRef idx="1">
+            <a:schemeClr val="accent1"/>
+          </a:lnRef>
+          <a:fillRef idx="0">
+            <a:schemeClr val="accent1"/>
+          </a:fillRef>
+          <a:effectRef idx="0">
+            <a:schemeClr val="accent1"/>
+          </a:effectRef>
+          <a:fontRef idx="minor">
+            <a:schemeClr val="tx1"/>
+          </a:fontRef>
+        </p:style>
+      </p:cxnSp>
+      <p:cxnSp>
+        <p:nvCxnSpPr>
+          <p:cNvPr id="65" name="Straight Arrow Connector 64">
+            <a:extLst>
+              <a:ext uri="{FF2B5EF4-FFF2-40B4-BE49-F238E27FC236}">
+                <a16:creationId xmlns:a16="http://schemas.microsoft.com/office/drawing/2014/main" id="{04A67265-28E3-9117-01B2-966C2F0EE7EC}"/>
+              </a:ext>
+            </a:extLst>
+          </p:cNvPr>
+          <p:cNvCxnSpPr>
+            <a:stCxn id="6" idx="3"/>
+            <a:endCxn id="8" idx="1"/>
+          </p:cNvCxnSpPr>
+          <p:nvPr/>
+        </p:nvCxnSpPr>
+        <p:spPr>
+          <a:xfrm>
+            <a:off x="4086831" y="2673783"/>
+            <a:ext cx="592121" cy="0"/>
+          </a:xfrm>
+          <a:prstGeom prst="straightConnector1">
+            <a:avLst/>
+          </a:prstGeom>
+          <a:ln>
+            <a:tailEnd type="triangle"/>
+          </a:ln>
+        </p:spPr>
+        <p:style>
+          <a:lnRef idx="1">
+            <a:schemeClr val="accent1"/>
+          </a:lnRef>
+          <a:fillRef idx="0">
+            <a:schemeClr val="accent1"/>
+          </a:fillRef>
+          <a:effectRef idx="0">
+            <a:schemeClr val="accent1"/>
+          </a:effectRef>
+          <a:fontRef idx="minor">
+            <a:schemeClr val="tx1"/>
+          </a:fontRef>
+        </p:style>
+      </p:cxnSp>
+      <p:cxnSp>
+        <p:nvCxnSpPr>
+          <p:cNvPr id="70" name="Straight Arrow Connector 69">
+            <a:extLst>
+              <a:ext uri="{FF2B5EF4-FFF2-40B4-BE49-F238E27FC236}">
+                <a16:creationId xmlns:a16="http://schemas.microsoft.com/office/drawing/2014/main" id="{C01726BA-422E-279A-69CF-B4E447A97AE0}"/>
+              </a:ext>
+            </a:extLst>
+          </p:cNvPr>
+          <p:cNvCxnSpPr>
+            <a:stCxn id="8" idx="3"/>
+            <a:endCxn id="10" idx="1"/>
+          </p:cNvCxnSpPr>
+          <p:nvPr/>
+        </p:nvCxnSpPr>
+        <p:spPr>
+          <a:xfrm>
+            <a:off x="6264471" y="2673783"/>
+            <a:ext cx="790273" cy="0"/>
+          </a:xfrm>
+          <a:prstGeom prst="straightConnector1">
+            <a:avLst/>
+          </a:prstGeom>
+          <a:ln>
+            <a:tailEnd type="triangle"/>
+          </a:ln>
+        </p:spPr>
+        <p:style>
+          <a:lnRef idx="1">
+            <a:schemeClr val="accent1"/>
+          </a:lnRef>
+          <a:fillRef idx="0">
+            <a:schemeClr val="accent1"/>
+          </a:fillRef>
+          <a:effectRef idx="0">
+            <a:schemeClr val="accent1"/>
+          </a:effectRef>
+          <a:fontRef idx="minor">
+            <a:schemeClr val="tx1"/>
+          </a:fontRef>
+        </p:style>
+      </p:cxnSp>
+      <p:cxnSp>
+        <p:nvCxnSpPr>
+          <p:cNvPr id="74" name="Straight Arrow Connector 73">
+            <a:extLst>
+              <a:ext uri="{FF2B5EF4-FFF2-40B4-BE49-F238E27FC236}">
+                <a16:creationId xmlns:a16="http://schemas.microsoft.com/office/drawing/2014/main" id="{AB15680B-71F1-C2A6-3505-0D69A13B23A9}"/>
+              </a:ext>
+            </a:extLst>
+          </p:cNvPr>
+          <p:cNvCxnSpPr>
+            <a:stCxn id="10" idx="3"/>
+            <a:endCxn id="11" idx="1"/>
+          </p:cNvCxnSpPr>
+          <p:nvPr/>
+        </p:nvCxnSpPr>
+        <p:spPr>
+          <a:xfrm>
+            <a:off x="8640263" y="2673783"/>
+            <a:ext cx="631263" cy="0"/>
+          </a:xfrm>
+          <a:prstGeom prst="straightConnector1">
+            <a:avLst/>
+          </a:prstGeom>
+          <a:ln>
+            <a:tailEnd type="triangle"/>
+          </a:ln>
+        </p:spPr>
+        <p:style>
+          <a:lnRef idx="1">
+            <a:schemeClr val="accent1"/>
+          </a:lnRef>
+          <a:fillRef idx="0">
+            <a:schemeClr val="accent1"/>
+          </a:fillRef>
+          <a:effectRef idx="0">
+            <a:schemeClr val="accent1"/>
+          </a:effectRef>
+          <a:fontRef idx="minor">
+            <a:schemeClr val="tx1"/>
+          </a:fontRef>
+        </p:style>
+      </p:cxnSp>
+      <p:cxnSp>
+        <p:nvCxnSpPr>
+          <p:cNvPr id="78" name="Connector: Elbow 77">
+            <a:extLst>
+              <a:ext uri="{FF2B5EF4-FFF2-40B4-BE49-F238E27FC236}">
+                <a16:creationId xmlns:a16="http://schemas.microsoft.com/office/drawing/2014/main" id="{EFFACA3D-E864-13DD-8B8E-3E78B75A3AF3}"/>
+              </a:ext>
+            </a:extLst>
+          </p:cNvPr>
+          <p:cNvCxnSpPr>
+            <a:stCxn id="10" idx="2"/>
+            <a:endCxn id="14" idx="0"/>
+          </p:cNvCxnSpPr>
+          <p:nvPr/>
+        </p:nvCxnSpPr>
+        <p:spPr>
+          <a:xfrm rot="5400000">
+            <a:off x="4107343" y="64913"/>
+            <a:ext cx="745399" cy="6734925"/>
+          </a:xfrm>
+          <a:prstGeom prst="bentConnector3">
+            <a:avLst/>
+          </a:prstGeom>
+          <a:ln>
+            <a:tailEnd type="triangle"/>
+          </a:ln>
+        </p:spPr>
+        <p:style>
+          <a:lnRef idx="1">
+            <a:schemeClr val="accent1"/>
+          </a:lnRef>
+          <a:fillRef idx="0">
+            <a:schemeClr val="accent1"/>
+          </a:fillRef>
+          <a:effectRef idx="0">
+            <a:schemeClr val="accent1"/>
+          </a:effectRef>
+          <a:fontRef idx="minor">
+            <a:schemeClr val="tx1"/>
+          </a:fontRef>
+        </p:style>
+      </p:cxnSp>
+      <p:cxnSp>
+        <p:nvCxnSpPr>
+          <p:cNvPr id="81" name="Straight Arrow Connector 80">
+            <a:extLst>
+              <a:ext uri="{FF2B5EF4-FFF2-40B4-BE49-F238E27FC236}">
+                <a16:creationId xmlns:a16="http://schemas.microsoft.com/office/drawing/2014/main" id="{D8A89719-D02A-0AE4-4196-952E17D2B7C5}"/>
+              </a:ext>
+            </a:extLst>
+          </p:cNvPr>
+          <p:cNvCxnSpPr>
+            <a:stCxn id="14" idx="3"/>
+            <a:endCxn id="31" idx="1"/>
+          </p:cNvCxnSpPr>
+          <p:nvPr/>
+        </p:nvCxnSpPr>
+        <p:spPr>
+          <a:xfrm>
+            <a:off x="1905338" y="4190969"/>
+            <a:ext cx="491803" cy="3509"/>
+          </a:xfrm>
+          <a:prstGeom prst="straightConnector1">
+            <a:avLst/>
+          </a:prstGeom>
+          <a:ln>
+            <a:tailEnd type="triangle"/>
+          </a:ln>
+        </p:spPr>
+        <p:style>
+          <a:lnRef idx="1">
+            <a:schemeClr val="accent1"/>
+          </a:lnRef>
+          <a:fillRef idx="0">
+            <a:schemeClr val="accent1"/>
+          </a:fillRef>
+          <a:effectRef idx="0">
+            <a:schemeClr val="accent1"/>
+          </a:effectRef>
+          <a:fontRef idx="minor">
+            <a:schemeClr val="tx1"/>
+          </a:fontRef>
+        </p:style>
+      </p:cxnSp>
+      <p:cxnSp>
+        <p:nvCxnSpPr>
+          <p:cNvPr id="83" name="Straight Arrow Connector 82">
+            <a:extLst>
+              <a:ext uri="{FF2B5EF4-FFF2-40B4-BE49-F238E27FC236}">
+                <a16:creationId xmlns:a16="http://schemas.microsoft.com/office/drawing/2014/main" id="{598CEBC4-8AA1-8190-EEA1-59E402D4C8F2}"/>
+              </a:ext>
+            </a:extLst>
+          </p:cNvPr>
+          <p:cNvCxnSpPr>
+            <a:stCxn id="31" idx="3"/>
+            <a:endCxn id="36" idx="1"/>
+          </p:cNvCxnSpPr>
+          <p:nvPr/>
+        </p:nvCxnSpPr>
+        <p:spPr>
+          <a:xfrm>
+            <a:off x="3982660" y="4194478"/>
+            <a:ext cx="391485" cy="60673"/>
+          </a:xfrm>
+          <a:prstGeom prst="straightConnector1">
+            <a:avLst/>
+          </a:prstGeom>
+          <a:ln>
+            <a:tailEnd type="triangle"/>
+          </a:ln>
+        </p:spPr>
+        <p:style>
+          <a:lnRef idx="1">
+            <a:schemeClr val="accent1"/>
+          </a:lnRef>
+          <a:fillRef idx="0">
+            <a:schemeClr val="accent1"/>
+          </a:fillRef>
+          <a:effectRef idx="0">
+            <a:schemeClr val="accent1"/>
+          </a:effectRef>
+          <a:fontRef idx="minor">
+            <a:schemeClr val="tx1"/>
+          </a:fontRef>
+        </p:style>
+      </p:cxnSp>
+      <p:cxnSp>
+        <p:nvCxnSpPr>
+          <p:cNvPr id="86" name="Straight Arrow Connector 85">
+            <a:extLst>
+              <a:ext uri="{FF2B5EF4-FFF2-40B4-BE49-F238E27FC236}">
+                <a16:creationId xmlns:a16="http://schemas.microsoft.com/office/drawing/2014/main" id="{8EE68B85-C286-F5BD-8DF3-4B963B206D4C}"/>
+              </a:ext>
+            </a:extLst>
+          </p:cNvPr>
+          <p:cNvCxnSpPr>
+            <a:stCxn id="36" idx="3"/>
+            <a:endCxn id="33" idx="1"/>
+          </p:cNvCxnSpPr>
+          <p:nvPr/>
+        </p:nvCxnSpPr>
+        <p:spPr>
+          <a:xfrm flipV="1">
+            <a:off x="5959664" y="4197577"/>
+            <a:ext cx="514863" cy="57574"/>
+          </a:xfrm>
+          <a:prstGeom prst="straightConnector1">
+            <a:avLst/>
+          </a:prstGeom>
+          <a:ln>
+            <a:tailEnd type="triangle"/>
+          </a:ln>
+        </p:spPr>
+        <p:style>
+          <a:lnRef idx="1">
+            <a:schemeClr val="accent1"/>
+          </a:lnRef>
+          <a:fillRef idx="0">
+            <a:schemeClr val="accent1"/>
+          </a:fillRef>
+          <a:effectRef idx="0">
+            <a:schemeClr val="accent1"/>
+          </a:effectRef>
+          <a:fontRef idx="minor">
+            <a:schemeClr val="tx1"/>
+          </a:fontRef>
+        </p:style>
+      </p:cxnSp>
+      <p:cxnSp>
+        <p:nvCxnSpPr>
+          <p:cNvPr id="88" name="Straight Arrow Connector 87">
+            <a:extLst>
+              <a:ext uri="{FF2B5EF4-FFF2-40B4-BE49-F238E27FC236}">
+                <a16:creationId xmlns:a16="http://schemas.microsoft.com/office/drawing/2014/main" id="{C344DD65-9614-3EC2-1FBF-0A8B97C299EF}"/>
+              </a:ext>
+            </a:extLst>
+          </p:cNvPr>
+          <p:cNvCxnSpPr>
+            <a:stCxn id="33" idx="3"/>
+            <a:endCxn id="43" idx="1"/>
+          </p:cNvCxnSpPr>
+          <p:nvPr/>
+        </p:nvCxnSpPr>
+        <p:spPr>
+          <a:xfrm>
+            <a:off x="8060046" y="4197577"/>
+            <a:ext cx="702560" cy="82031"/>
+          </a:xfrm>
+          <a:prstGeom prst="straightConnector1">
+            <a:avLst/>
+          </a:prstGeom>
+          <a:ln>
+            <a:tailEnd type="triangle"/>
+          </a:ln>
+        </p:spPr>
+        <p:style>
+          <a:lnRef idx="1">
+            <a:schemeClr val="accent1"/>
+          </a:lnRef>
+          <a:fillRef idx="0">
+            <a:schemeClr val="accent1"/>
+          </a:fillRef>
+          <a:effectRef idx="0">
+            <a:schemeClr val="accent1"/>
+          </a:effectRef>
+          <a:fontRef idx="minor">
+            <a:schemeClr val="tx1"/>
+          </a:fontRef>
+        </p:style>
+      </p:cxnSp>
+      <p:cxnSp>
+        <p:nvCxnSpPr>
+          <p:cNvPr id="90" name="Straight Arrow Connector 89">
+            <a:extLst>
+              <a:ext uri="{FF2B5EF4-FFF2-40B4-BE49-F238E27FC236}">
+                <a16:creationId xmlns:a16="http://schemas.microsoft.com/office/drawing/2014/main" id="{928B4B2F-AA97-8A52-AF9C-E01ACF077C57}"/>
+              </a:ext>
+            </a:extLst>
+          </p:cNvPr>
+          <p:cNvCxnSpPr>
+            <a:stCxn id="43" idx="3"/>
+            <a:endCxn id="50" idx="4"/>
+          </p:cNvCxnSpPr>
+          <p:nvPr/>
+        </p:nvCxnSpPr>
+        <p:spPr>
+          <a:xfrm>
+            <a:off x="10348125" y="4279608"/>
+            <a:ext cx="413668" cy="9078"/>
+          </a:xfrm>
+          <a:prstGeom prst="straightConnector1">
+            <a:avLst/>
+          </a:prstGeom>
+          <a:ln>
+            <a:tailEnd type="triangle"/>
+          </a:ln>
+        </p:spPr>
+        <p:style>
+          <a:lnRef idx="1">
+            <a:schemeClr val="accent1"/>
+          </a:lnRef>
+          <a:fillRef idx="0">
+            <a:schemeClr val="accent1"/>
+          </a:fillRef>
+          <a:effectRef idx="0">
+            <a:schemeClr val="accent1"/>
+          </a:effectRef>
+          <a:fontRef idx="minor">
+            <a:schemeClr val="tx1"/>
+          </a:fontRef>
+        </p:style>
+      </p:cxnSp>
+      <p:cxnSp>
+        <p:nvCxnSpPr>
+          <p:cNvPr id="92" name="Straight Arrow Connector 91">
+            <a:extLst>
+              <a:ext uri="{FF2B5EF4-FFF2-40B4-BE49-F238E27FC236}">
+                <a16:creationId xmlns:a16="http://schemas.microsoft.com/office/drawing/2014/main" id="{79EB56CB-B817-C3A7-F49C-E49335A8AC1F}"/>
+              </a:ext>
+            </a:extLst>
+          </p:cNvPr>
+          <p:cNvCxnSpPr>
+            <a:stCxn id="33" idx="2"/>
+            <a:endCxn id="47" idx="0"/>
+          </p:cNvCxnSpPr>
+          <p:nvPr/>
+        </p:nvCxnSpPr>
+        <p:spPr>
+          <a:xfrm>
+            <a:off x="7267287" y="4583470"/>
+            <a:ext cx="537591" cy="722674"/>
+          </a:xfrm>
+          <a:prstGeom prst="straightConnector1">
+            <a:avLst/>
+          </a:prstGeom>
+          <a:ln>
+            <a:tailEnd type="triangle"/>
+          </a:ln>
+        </p:spPr>
+        <p:style>
+          <a:lnRef idx="1">
+            <a:schemeClr val="accent1"/>
+          </a:lnRef>
+          <a:fillRef idx="0">
+            <a:schemeClr val="accent1"/>
+          </a:fillRef>
+          <a:effectRef idx="0">
+            <a:schemeClr val="accent1"/>
+          </a:effectRef>
+          <a:fontRef idx="minor">
+            <a:schemeClr val="tx1"/>
+          </a:fontRef>
+        </p:style>
+      </p:cxnSp>
+      <p:cxnSp>
+        <p:nvCxnSpPr>
+          <p:cNvPr id="95" name="Straight Arrow Connector 94">
+            <a:extLst>
+              <a:ext uri="{FF2B5EF4-FFF2-40B4-BE49-F238E27FC236}">
+                <a16:creationId xmlns:a16="http://schemas.microsoft.com/office/drawing/2014/main" id="{88E8B1B4-96D5-C8D4-A9A4-4E70B4407320}"/>
+              </a:ext>
+            </a:extLst>
+          </p:cNvPr>
+          <p:cNvCxnSpPr>
+            <a:stCxn id="47" idx="3"/>
+            <a:endCxn id="45" idx="1"/>
+          </p:cNvCxnSpPr>
+          <p:nvPr/>
+        </p:nvCxnSpPr>
+        <p:spPr>
+          <a:xfrm>
+            <a:off x="8597637" y="5692038"/>
+            <a:ext cx="578637" cy="0"/>
+          </a:xfrm>
+          <a:prstGeom prst="straightConnector1">
+            <a:avLst/>
+          </a:prstGeom>
+          <a:ln>
+            <a:tailEnd type="triangle"/>
+          </a:ln>
+        </p:spPr>
+        <p:style>
+          <a:lnRef idx="1">
+            <a:schemeClr val="accent1"/>
+          </a:lnRef>
+          <a:fillRef idx="0">
+            <a:schemeClr val="accent1"/>
+          </a:fillRef>
+          <a:effectRef idx="0">
+            <a:schemeClr val="accent1"/>
+          </a:effectRef>
+          <a:fontRef idx="minor">
+            <a:schemeClr val="tx1"/>
+          </a:fontRef>
+        </p:style>
+      </p:cxnSp>
+      <p:cxnSp>
+        <p:nvCxnSpPr>
+          <p:cNvPr id="98" name="Straight Arrow Connector 97">
+            <a:extLst>
+              <a:ext uri="{FF2B5EF4-FFF2-40B4-BE49-F238E27FC236}">
+                <a16:creationId xmlns:a16="http://schemas.microsoft.com/office/drawing/2014/main" id="{5C39DEFC-F70D-5BD7-0B0D-C69E9119A062}"/>
+              </a:ext>
+            </a:extLst>
+          </p:cNvPr>
+          <p:cNvCxnSpPr>
+            <a:stCxn id="11" idx="3"/>
+            <a:endCxn id="19" idx="0"/>
+          </p:cNvCxnSpPr>
+          <p:nvPr/>
+        </p:nvCxnSpPr>
+        <p:spPr>
+          <a:xfrm>
+            <a:off x="10857045" y="2673783"/>
+            <a:ext cx="529243" cy="8167"/>
+          </a:xfrm>
+          <a:prstGeom prst="straightConnector1">
+            <a:avLst/>
+          </a:prstGeom>
+          <a:ln>
+            <a:tailEnd type="triangle"/>
+          </a:ln>
+        </p:spPr>
+        <p:style>
+          <a:lnRef idx="1">
+            <a:schemeClr val="accent1"/>
+          </a:lnRef>
+          <a:fillRef idx="0">
+            <a:schemeClr val="accent1"/>
+          </a:fillRef>
+          <a:effectRef idx="0">
+            <a:schemeClr val="accent1"/>
+          </a:effectRef>
+          <a:fontRef idx="minor">
+            <a:schemeClr val="tx1"/>
+          </a:fontRef>
+        </p:style>
+      </p:cxnSp>
+      <p:sp>
+        <p:nvSpPr>
+          <p:cNvPr id="99" name="Rectangle: Rounded Corners 98">
+            <a:extLst>
+              <a:ext uri="{FF2B5EF4-FFF2-40B4-BE49-F238E27FC236}">
+                <a16:creationId xmlns:a16="http://schemas.microsoft.com/office/drawing/2014/main" id="{848EDA26-7438-F986-2FA0-BE6C2ADA496B}"/>
+              </a:ext>
+            </a:extLst>
+          </p:cNvPr>
+          <p:cNvSpPr/>
+          <p:nvPr/>
+        </p:nvSpPr>
+        <p:spPr>
+          <a:xfrm>
+            <a:off x="1623911" y="3669765"/>
+            <a:ext cx="401275" cy="283833"/>
+          </a:xfrm>
+          <a:prstGeom prst="roundRect">
+            <a:avLst/>
+          </a:prstGeom>
+          <a:solidFill>
+            <a:srgbClr val="FF0000"/>
+          </a:solidFill>
+        </p:spPr>
+        <p:style>
+          <a:lnRef idx="2">
+            <a:schemeClr val="accent2">
+              <a:shade val="15000"/>
+            </a:schemeClr>
+          </a:lnRef>
+          <a:fillRef idx="1">
+            <a:schemeClr val="accent2"/>
+          </a:fillRef>
+          <a:effectRef idx="0">
+            <a:schemeClr val="accent2"/>
+          </a:effectRef>
+          <a:fontRef idx="minor">
+            <a:schemeClr val="lt1"/>
+          </a:fontRef>
+        </p:style>
+        <p:txBody>
+          <a:bodyPr rtlCol="0" anchor="ctr"/>
+          <a:lstStyle/>
+          <a:p>
+            <a:pPr algn="ctr"/>
+            <a:r>
+              <a:rPr lang="es-CL" sz="1400" dirty="0"/>
+              <a:t>T5</a:t>
+            </a:r>
+            <a:endParaRPr lang="en-US" sz="1400" dirty="0"/>
+          </a:p>
+        </p:txBody>
+      </p:sp>
+      <p:sp>
+        <p:nvSpPr>
+          <p:cNvPr id="101" name="Rectangle: Rounded Corners 100">
+            <a:extLst>
+              <a:ext uri="{FF2B5EF4-FFF2-40B4-BE49-F238E27FC236}">
+                <a16:creationId xmlns:a16="http://schemas.microsoft.com/office/drawing/2014/main" id="{482719C1-F580-2F7E-014E-670ED7BA6667}"/>
+              </a:ext>
+            </a:extLst>
+          </p:cNvPr>
+          <p:cNvSpPr/>
+          <p:nvPr/>
+        </p:nvSpPr>
+        <p:spPr>
+          <a:xfrm>
+            <a:off x="8309760" y="2139221"/>
+            <a:ext cx="401275" cy="283833"/>
+          </a:xfrm>
+          <a:prstGeom prst="roundRect">
+            <a:avLst/>
+          </a:prstGeom>
+        </p:spPr>
+        <p:style>
+          <a:lnRef idx="2">
+            <a:schemeClr val="accent2">
+              <a:shade val="15000"/>
+            </a:schemeClr>
+          </a:lnRef>
+          <a:fillRef idx="1">
+            <a:schemeClr val="accent2"/>
+          </a:fillRef>
+          <a:effectRef idx="0">
+            <a:schemeClr val="accent2"/>
+          </a:effectRef>
+          <a:fontRef idx="minor">
+            <a:schemeClr val="lt1"/>
+          </a:fontRef>
+        </p:style>
+        <p:txBody>
+          <a:bodyPr rtlCol="0" anchor="ctr"/>
+          <a:lstStyle/>
+          <a:p>
+            <a:pPr algn="ctr"/>
+            <a:r>
+              <a:rPr lang="es-CL" sz="1400" dirty="0"/>
+              <a:t>T1</a:t>
+            </a:r>
+            <a:endParaRPr lang="en-US" sz="1400" dirty="0"/>
+          </a:p>
+        </p:txBody>
+      </p:sp>
+      <p:sp>
+        <p:nvSpPr>
+          <p:cNvPr id="102" name="Rectangle: Rounded Corners 101">
+            <a:extLst>
+              <a:ext uri="{FF2B5EF4-FFF2-40B4-BE49-F238E27FC236}">
+                <a16:creationId xmlns:a16="http://schemas.microsoft.com/office/drawing/2014/main" id="{02E8029B-3C67-6B56-5459-13AE87606506}"/>
+              </a:ext>
+            </a:extLst>
+          </p:cNvPr>
+          <p:cNvSpPr/>
+          <p:nvPr/>
+        </p:nvSpPr>
+        <p:spPr>
+          <a:xfrm>
+            <a:off x="10064285" y="3802828"/>
             <a:ext cx="401275" cy="283833"/>
           </a:xfrm>
           <a:prstGeom prst="roundRect">
@@ -5502,10 +5839,10 @@
       </p:sp>
       <p:sp>
         <p:nvSpPr>
-          <p:cNvPr id="132" name="Rectangle: Rounded Corners 131">
-            <a:extLst>
-              <a:ext uri="{FF2B5EF4-FFF2-40B4-BE49-F238E27FC236}">
-                <a16:creationId xmlns:a16="http://schemas.microsoft.com/office/drawing/2014/main" id="{32EC7503-F431-4F8C-412F-DD567DA730F5}"/>
+          <p:cNvPr id="104" name="Rectangle: Rounded Corners 103">
+            <a:extLst>
+              <a:ext uri="{FF2B5EF4-FFF2-40B4-BE49-F238E27FC236}">
+                <a16:creationId xmlns:a16="http://schemas.microsoft.com/office/drawing/2014/main" id="{17924FF3-D608-47B5-C137-90D13770817A}"/>
               </a:ext>
             </a:extLst>
           </p:cNvPr>
@@ -5514,99 +5851,7 @@
         </p:nvSpPr>
         <p:spPr>
           <a:xfrm>
-            <a:off x="2647836" y="5403590"/>
-            <a:ext cx="1585519" cy="771787"/>
-          </a:xfrm>
-          <a:prstGeom prst="roundRect">
-            <a:avLst/>
-          </a:prstGeom>
-        </p:spPr>
-        <p:style>
-          <a:lnRef idx="2">
-            <a:schemeClr val="accent1">
-              <a:shade val="15000"/>
-            </a:schemeClr>
-          </a:lnRef>
-          <a:fillRef idx="1">
-            <a:schemeClr val="accent1"/>
-          </a:fillRef>
-          <a:effectRef idx="0">
-            <a:schemeClr val="accent1"/>
-          </a:effectRef>
-          <a:fontRef idx="minor">
-            <a:schemeClr val="lt1"/>
-          </a:fontRef>
-        </p:style>
-        <p:txBody>
-          <a:bodyPr rtlCol="0" anchor="ctr"/>
-          <a:lstStyle/>
-          <a:p>
-            <a:pPr algn="ctr"/>
-            <a:r>
-              <a:rPr lang="es-CL" dirty="0"/>
-              <a:t>Buffer</a:t>
-            </a:r>
-            <a:endParaRPr lang="en-US" dirty="0"/>
-          </a:p>
-        </p:txBody>
-      </p:sp>
-      <p:cxnSp>
-        <p:nvCxnSpPr>
-          <p:cNvPr id="137" name="Straight Arrow Connector 136">
-            <a:extLst>
-              <a:ext uri="{FF2B5EF4-FFF2-40B4-BE49-F238E27FC236}">
-                <a16:creationId xmlns:a16="http://schemas.microsoft.com/office/drawing/2014/main" id="{7BA17900-F722-E2C0-9AEE-F28D3C3BECFC}"/>
-              </a:ext>
-            </a:extLst>
-          </p:cNvPr>
-          <p:cNvCxnSpPr>
-            <a:stCxn id="132" idx="3"/>
-            <a:endCxn id="62" idx="1"/>
-          </p:cNvCxnSpPr>
-          <p:nvPr/>
-        </p:nvCxnSpPr>
-        <p:spPr>
-          <a:xfrm>
-            <a:off x="4233355" y="5789484"/>
-            <a:ext cx="307696" cy="0"/>
-          </a:xfrm>
-          <a:prstGeom prst="straightConnector1">
-            <a:avLst/>
-          </a:prstGeom>
-          <a:ln>
-            <a:tailEnd type="triangle"/>
-          </a:ln>
-        </p:spPr>
-        <p:style>
-          <a:lnRef idx="1">
-            <a:schemeClr val="accent1"/>
-          </a:lnRef>
-          <a:fillRef idx="0">
-            <a:schemeClr val="accent1"/>
-          </a:fillRef>
-          <a:effectRef idx="0">
-            <a:schemeClr val="accent1"/>
-          </a:effectRef>
-          <a:fontRef idx="minor">
-            <a:schemeClr val="tx1"/>
-          </a:fontRef>
-        </p:style>
-      </p:cxnSp>
-      <p:sp>
-        <p:nvSpPr>
-          <p:cNvPr id="138" name="Rectangle: Rounded Corners 137">
-            <a:extLst>
-              <a:ext uri="{FF2B5EF4-FFF2-40B4-BE49-F238E27FC236}">
-                <a16:creationId xmlns:a16="http://schemas.microsoft.com/office/drawing/2014/main" id="{E830D7A5-EA4D-75BC-F982-8F1B889FE2AC}"/>
-              </a:ext>
-            </a:extLst>
-          </p:cNvPr>
-          <p:cNvSpPr/>
-          <p:nvPr/>
-        </p:nvSpPr>
-        <p:spPr>
-          <a:xfrm>
-            <a:off x="5814608" y="5261673"/>
+            <a:off x="10519753" y="2129298"/>
             <a:ext cx="401275" cy="283833"/>
           </a:xfrm>
           <a:prstGeom prst="roundRect">
@@ -5645,12 +5890,127 @@
           </a:p>
         </p:txBody>
       </p:sp>
-      <p:sp>
-        <p:nvSpPr>
-          <p:cNvPr id="140" name="Rectangle: Rounded Corners 139">
-            <a:extLst>
-              <a:ext uri="{FF2B5EF4-FFF2-40B4-BE49-F238E27FC236}">
-                <a16:creationId xmlns:a16="http://schemas.microsoft.com/office/drawing/2014/main" id="{CFF9741C-00A7-8A0A-AC25-FFED2FD70C93}"/>
+      <p:cxnSp>
+        <p:nvCxnSpPr>
+          <p:cNvPr id="108" name="Straight Connector 107">
+            <a:extLst>
+              <a:ext uri="{FF2B5EF4-FFF2-40B4-BE49-F238E27FC236}">
+                <a16:creationId xmlns:a16="http://schemas.microsoft.com/office/drawing/2014/main" id="{BCE83E19-7A96-ECA5-FBD8-2A07BAFA416E}"/>
+              </a:ext>
+            </a:extLst>
+          </p:cNvPr>
+          <p:cNvCxnSpPr/>
+          <p:nvPr/>
+        </p:nvCxnSpPr>
+        <p:spPr>
+          <a:xfrm>
+            <a:off x="90684" y="3264635"/>
+            <a:ext cx="11970328" cy="0"/>
+          </a:xfrm>
+          <a:prstGeom prst="line">
+            <a:avLst/>
+          </a:prstGeom>
+          <a:ln w="19050" cap="flat" cmpd="sng" algn="ctr">
+            <a:solidFill>
+              <a:schemeClr val="dk1"/>
+            </a:solidFill>
+            <a:prstDash val="dash"/>
+            <a:round/>
+            <a:headEnd type="none" w="med" len="med"/>
+            <a:tailEnd type="none" w="med" len="med"/>
+          </a:ln>
+        </p:spPr>
+        <p:style>
+          <a:lnRef idx="0">
+            <a:scrgbClr r="0" g="0" b="0"/>
+          </a:lnRef>
+          <a:fillRef idx="0">
+            <a:scrgbClr r="0" g="0" b="0"/>
+          </a:fillRef>
+          <a:effectRef idx="0">
+            <a:scrgbClr r="0" g="0" b="0"/>
+          </a:effectRef>
+          <a:fontRef idx="minor">
+            <a:schemeClr val="tx1"/>
+          </a:fontRef>
+        </p:style>
+      </p:cxnSp>
+      <p:sp>
+        <p:nvSpPr>
+          <p:cNvPr id="110" name="TextBox 109">
+            <a:extLst>
+              <a:ext uri="{FF2B5EF4-FFF2-40B4-BE49-F238E27FC236}">
+                <a16:creationId xmlns:a16="http://schemas.microsoft.com/office/drawing/2014/main" id="{131A2928-AA6E-09F0-AE7F-CB4E0DE12E36}"/>
+              </a:ext>
+            </a:extLst>
+          </p:cNvPr>
+          <p:cNvSpPr txBox="1"/>
+          <p:nvPr/>
+        </p:nvSpPr>
+        <p:spPr>
+          <a:xfrm>
+            <a:off x="10064285" y="773317"/>
+            <a:ext cx="958852" cy="369332"/>
+          </a:xfrm>
+          <a:prstGeom prst="rect">
+            <a:avLst/>
+          </a:prstGeom>
+          <a:noFill/>
+        </p:spPr>
+        <p:txBody>
+          <a:bodyPr wrap="none" rtlCol="0">
+            <a:spAutoFit/>
+          </a:bodyPr>
+          <a:lstStyle/>
+          <a:p>
+            <a:r>
+              <a:rPr lang="en-US" dirty="0"/>
+              <a:t>PLACA 1</a:t>
+            </a:r>
+          </a:p>
+        </p:txBody>
+      </p:sp>
+      <p:sp>
+        <p:nvSpPr>
+          <p:cNvPr id="112" name="TextBox 111">
+            <a:extLst>
+              <a:ext uri="{FF2B5EF4-FFF2-40B4-BE49-F238E27FC236}">
+                <a16:creationId xmlns:a16="http://schemas.microsoft.com/office/drawing/2014/main" id="{0E3484ED-906E-6940-DB2B-D8EDA0B50B2D}"/>
+              </a:ext>
+            </a:extLst>
+          </p:cNvPr>
+          <p:cNvSpPr txBox="1"/>
+          <p:nvPr/>
+        </p:nvSpPr>
+        <p:spPr>
+          <a:xfrm>
+            <a:off x="4086830" y="5962493"/>
+            <a:ext cx="958852" cy="369332"/>
+          </a:xfrm>
+          <a:prstGeom prst="rect">
+            <a:avLst/>
+          </a:prstGeom>
+          <a:noFill/>
+        </p:spPr>
+        <p:txBody>
+          <a:bodyPr wrap="none" rtlCol="0">
+            <a:spAutoFit/>
+          </a:bodyPr>
+          <a:lstStyle/>
+          <a:p>
+            <a:r>
+              <a:rPr lang="en-US" dirty="0"/>
+              <a:t>PLACA 2</a:t>
+            </a:r>
+          </a:p>
+        </p:txBody>
+      </p:sp>
+      <p:sp>
+        <p:nvSpPr>
+          <p:cNvPr id="115" name="Rectangle: Rounded Corners 114">
+            <a:extLst>
+              <a:ext uri="{FF2B5EF4-FFF2-40B4-BE49-F238E27FC236}">
+                <a16:creationId xmlns:a16="http://schemas.microsoft.com/office/drawing/2014/main" id="{1FD20DC2-D23C-444C-1446-3ECE976D35D5}"/>
               </a:ext>
             </a:extLst>
           </p:cNvPr>
@@ -5659,7 +6019,7 @@
         </p:nvSpPr>
         <p:spPr>
           <a:xfrm>
-            <a:off x="9370228" y="381333"/>
+            <a:off x="11764677" y="3855487"/>
             <a:ext cx="401275" cy="283833"/>
           </a:xfrm>
           <a:prstGeom prst="roundRect">
@@ -5700,10 +6060,10 @@
       </p:sp>
       <p:sp>
         <p:nvSpPr>
-          <p:cNvPr id="141" name="Rectangle: Rounded Corners 140">
-            <a:extLst>
-              <a:ext uri="{FF2B5EF4-FFF2-40B4-BE49-F238E27FC236}">
-                <a16:creationId xmlns:a16="http://schemas.microsoft.com/office/drawing/2014/main" id="{2865BB1E-2391-6167-3883-8DAF844D3F30}"/>
+          <p:cNvPr id="117" name="Rectangle: Rounded Corners 116">
+            <a:extLst>
+              <a:ext uri="{FF2B5EF4-FFF2-40B4-BE49-F238E27FC236}">
+                <a16:creationId xmlns:a16="http://schemas.microsoft.com/office/drawing/2014/main" id="{0196D20E-1BAF-08FD-62C1-C75CCD425091}"/>
               </a:ext>
             </a:extLst>
           </p:cNvPr>
@@ -5712,219 +6072,7 @@
         </p:nvSpPr>
         <p:spPr>
           <a:xfrm>
-            <a:off x="3945429" y="5280709"/>
-            <a:ext cx="401275" cy="283833"/>
-          </a:xfrm>
-          <a:prstGeom prst="roundRect">
-            <a:avLst/>
-          </a:prstGeom>
-          <a:solidFill>
-            <a:srgbClr val="FF0000"/>
-          </a:solidFill>
-        </p:spPr>
-        <p:style>
-          <a:lnRef idx="2">
-            <a:schemeClr val="accent2">
-              <a:shade val="15000"/>
-            </a:schemeClr>
-          </a:lnRef>
-          <a:fillRef idx="1">
-            <a:schemeClr val="accent2"/>
-          </a:fillRef>
-          <a:effectRef idx="0">
-            <a:schemeClr val="accent2"/>
-          </a:effectRef>
-          <a:fontRef idx="minor">
-            <a:schemeClr val="lt1"/>
-          </a:fontRef>
-        </p:style>
-        <p:txBody>
-          <a:bodyPr rtlCol="0" anchor="ctr"/>
-          <a:lstStyle/>
-          <a:p>
-            <a:pPr algn="ctr"/>
-            <a:r>
-              <a:rPr lang="es-CL" sz="1400" dirty="0"/>
-              <a:t>T5</a:t>
-            </a:r>
-            <a:endParaRPr lang="en-US" sz="1400" dirty="0"/>
-          </a:p>
-        </p:txBody>
-      </p:sp>
-      <p:sp>
-        <p:nvSpPr>
-          <p:cNvPr id="142" name="Rectangle: Rounded Corners 141">
-            <a:extLst>
-              <a:ext uri="{FF2B5EF4-FFF2-40B4-BE49-F238E27FC236}">
-                <a16:creationId xmlns:a16="http://schemas.microsoft.com/office/drawing/2014/main" id="{F7F7E31C-C6FB-1F22-066E-1A41AB178315}"/>
-              </a:ext>
-            </a:extLst>
-          </p:cNvPr>
-          <p:cNvSpPr/>
-          <p:nvPr/>
-        </p:nvSpPr>
-        <p:spPr>
-          <a:xfrm>
-            <a:off x="11492735" y="5922286"/>
-            <a:ext cx="401275" cy="283833"/>
-          </a:xfrm>
-          <a:prstGeom prst="roundRect">
-            <a:avLst/>
-          </a:prstGeom>
-          <a:solidFill>
-            <a:srgbClr val="FF0000"/>
-          </a:solidFill>
-        </p:spPr>
-        <p:style>
-          <a:lnRef idx="2">
-            <a:schemeClr val="accent2">
-              <a:shade val="15000"/>
-            </a:schemeClr>
-          </a:lnRef>
-          <a:fillRef idx="1">
-            <a:schemeClr val="accent2"/>
-          </a:fillRef>
-          <a:effectRef idx="0">
-            <a:schemeClr val="accent2"/>
-          </a:effectRef>
-          <a:fontRef idx="minor">
-            <a:schemeClr val="lt1"/>
-          </a:fontRef>
-        </p:style>
-        <p:txBody>
-          <a:bodyPr rtlCol="0" anchor="ctr"/>
-          <a:lstStyle/>
-          <a:p>
-            <a:pPr algn="ctr"/>
-            <a:r>
-              <a:rPr lang="es-CL" sz="1400" dirty="0"/>
-              <a:t>T5</a:t>
-            </a:r>
-            <a:endParaRPr lang="en-US" sz="1400" dirty="0"/>
-          </a:p>
-        </p:txBody>
-      </p:sp>
-      <p:sp>
-        <p:nvSpPr>
-          <p:cNvPr id="143" name="Rectangle: Rounded Corners 142">
-            <a:extLst>
-              <a:ext uri="{FF2B5EF4-FFF2-40B4-BE49-F238E27FC236}">
-                <a16:creationId xmlns:a16="http://schemas.microsoft.com/office/drawing/2014/main" id="{0B239166-06F3-649F-B951-F237827868C0}"/>
-              </a:ext>
-            </a:extLst>
-          </p:cNvPr>
-          <p:cNvSpPr/>
-          <p:nvPr/>
-        </p:nvSpPr>
-        <p:spPr>
-          <a:xfrm>
-            <a:off x="3892749" y="339027"/>
-            <a:ext cx="401275" cy="283833"/>
-          </a:xfrm>
-          <a:prstGeom prst="roundRect">
-            <a:avLst/>
-          </a:prstGeom>
-          <a:solidFill>
-            <a:srgbClr val="7030A0"/>
-          </a:solidFill>
-        </p:spPr>
-        <p:style>
-          <a:lnRef idx="2">
-            <a:schemeClr val="accent2">
-              <a:shade val="15000"/>
-            </a:schemeClr>
-          </a:lnRef>
-          <a:fillRef idx="1">
-            <a:schemeClr val="accent2"/>
-          </a:fillRef>
-          <a:effectRef idx="0">
-            <a:schemeClr val="accent2"/>
-          </a:effectRef>
-          <a:fontRef idx="minor">
-            <a:schemeClr val="lt1"/>
-          </a:fontRef>
-        </p:style>
-        <p:txBody>
-          <a:bodyPr rtlCol="0" anchor="ctr"/>
-          <a:lstStyle/>
-          <a:p>
-            <a:pPr algn="ctr"/>
-            <a:r>
-              <a:rPr lang="es-CL" sz="1400" dirty="0"/>
-              <a:t>T6</a:t>
-            </a:r>
-            <a:endParaRPr lang="en-US" sz="1400" dirty="0"/>
-          </a:p>
-        </p:txBody>
-      </p:sp>
-      <p:sp>
-        <p:nvSpPr>
-          <p:cNvPr id="145" name="Rectangle: Rounded Corners 144">
-            <a:extLst>
-              <a:ext uri="{FF2B5EF4-FFF2-40B4-BE49-F238E27FC236}">
-                <a16:creationId xmlns:a16="http://schemas.microsoft.com/office/drawing/2014/main" id="{9242F27C-48A6-D03C-8EC2-24C827216021}"/>
-              </a:ext>
-            </a:extLst>
-          </p:cNvPr>
-          <p:cNvSpPr/>
-          <p:nvPr/>
-        </p:nvSpPr>
-        <p:spPr>
-          <a:xfrm>
-            <a:off x="1838112" y="3760055"/>
-            <a:ext cx="401275" cy="283833"/>
-          </a:xfrm>
-          <a:prstGeom prst="roundRect">
-            <a:avLst/>
-          </a:prstGeom>
-          <a:solidFill>
-            <a:srgbClr val="FF0000"/>
-          </a:solidFill>
-        </p:spPr>
-        <p:style>
-          <a:lnRef idx="2">
-            <a:schemeClr val="accent2">
-              <a:shade val="15000"/>
-            </a:schemeClr>
-          </a:lnRef>
-          <a:fillRef idx="1">
-            <a:schemeClr val="accent2"/>
-          </a:fillRef>
-          <a:effectRef idx="0">
-            <a:schemeClr val="accent2"/>
-          </a:effectRef>
-          <a:fontRef idx="minor">
-            <a:schemeClr val="lt1"/>
-          </a:fontRef>
-        </p:style>
-        <p:txBody>
-          <a:bodyPr rtlCol="0" anchor="ctr"/>
-          <a:lstStyle/>
-          <a:p>
-            <a:pPr algn="ctr"/>
-            <a:r>
-              <a:rPr lang="es-CL" sz="1400" dirty="0"/>
-              <a:t>T5</a:t>
-            </a:r>
-            <a:endParaRPr lang="en-US" sz="1400" dirty="0"/>
-          </a:p>
-        </p:txBody>
-      </p:sp>
-      <p:sp>
-        <p:nvSpPr>
-          <p:cNvPr id="146" name="Rectangle: Rounded Corners 145">
-            <a:extLst>
-              <a:ext uri="{FF2B5EF4-FFF2-40B4-BE49-F238E27FC236}">
-                <a16:creationId xmlns:a16="http://schemas.microsoft.com/office/drawing/2014/main" id="{2956C9FA-C0BB-D3DA-708E-F5FE44AEE238}"/>
-              </a:ext>
-            </a:extLst>
-          </p:cNvPr>
-          <p:cNvSpPr/>
-          <p:nvPr/>
-        </p:nvSpPr>
-        <p:spPr>
-          <a:xfrm>
-            <a:off x="7513091" y="282279"/>
+            <a:off x="1803975" y="520587"/>
             <a:ext cx="401275" cy="283833"/>
           </a:xfrm>
           <a:prstGeom prst="roundRect">
@@ -5960,351 +6108,10 @@
           </a:p>
         </p:txBody>
       </p:sp>
-      <p:sp>
-        <p:nvSpPr>
-          <p:cNvPr id="147" name="Rectangle: Rounded Corners 146">
-            <a:extLst>
-              <a:ext uri="{FF2B5EF4-FFF2-40B4-BE49-F238E27FC236}">
-                <a16:creationId xmlns:a16="http://schemas.microsoft.com/office/drawing/2014/main" id="{9CEF86B8-3D50-75A9-F74C-CE262C6E9E41}"/>
-              </a:ext>
-            </a:extLst>
-          </p:cNvPr>
-          <p:cNvSpPr/>
-          <p:nvPr/>
-        </p:nvSpPr>
-        <p:spPr>
-          <a:xfrm>
-            <a:off x="5766233" y="302943"/>
-            <a:ext cx="401275" cy="283833"/>
-          </a:xfrm>
-          <a:prstGeom prst="roundRect">
-            <a:avLst/>
-          </a:prstGeom>
-          <a:solidFill>
-            <a:srgbClr val="7030A0"/>
-          </a:solidFill>
-        </p:spPr>
-        <p:style>
-          <a:lnRef idx="2">
-            <a:schemeClr val="accent2">
-              <a:shade val="15000"/>
-            </a:schemeClr>
-          </a:lnRef>
-          <a:fillRef idx="1">
-            <a:schemeClr val="accent2"/>
-          </a:fillRef>
-          <a:effectRef idx="0">
-            <a:schemeClr val="accent2"/>
-          </a:effectRef>
-          <a:fontRef idx="minor">
-            <a:schemeClr val="lt1"/>
-          </a:fontRef>
-        </p:style>
-        <p:txBody>
-          <a:bodyPr rtlCol="0" anchor="ctr"/>
-          <a:lstStyle/>
-          <a:p>
-            <a:pPr algn="ctr"/>
-            <a:r>
-              <a:rPr lang="es-CL" sz="1400" dirty="0"/>
-              <a:t>T6</a:t>
-            </a:r>
-            <a:endParaRPr lang="en-US" sz="1400" dirty="0"/>
-          </a:p>
-        </p:txBody>
-      </p:sp>
-      <p:sp>
-        <p:nvSpPr>
-          <p:cNvPr id="148" name="Rectangle: Rounded Corners 147">
-            <a:extLst>
-              <a:ext uri="{FF2B5EF4-FFF2-40B4-BE49-F238E27FC236}">
-                <a16:creationId xmlns:a16="http://schemas.microsoft.com/office/drawing/2014/main" id="{C023F817-0475-929A-C99F-CB60586765CC}"/>
-              </a:ext>
-            </a:extLst>
-          </p:cNvPr>
-          <p:cNvSpPr/>
-          <p:nvPr/>
-        </p:nvSpPr>
-        <p:spPr>
-          <a:xfrm>
-            <a:off x="6283442" y="2789046"/>
-            <a:ext cx="401275" cy="283833"/>
-          </a:xfrm>
-          <a:prstGeom prst="roundRect">
-            <a:avLst/>
-          </a:prstGeom>
-        </p:spPr>
-        <p:style>
-          <a:lnRef idx="2">
-            <a:schemeClr val="dk1">
-              <a:shade val="15000"/>
-            </a:schemeClr>
-          </a:lnRef>
-          <a:fillRef idx="1">
-            <a:schemeClr val="dk1"/>
-          </a:fillRef>
-          <a:effectRef idx="0">
-            <a:schemeClr val="dk1"/>
-          </a:effectRef>
-          <a:fontRef idx="minor">
-            <a:schemeClr val="lt1"/>
-          </a:fontRef>
-        </p:style>
-        <p:txBody>
-          <a:bodyPr rtlCol="0" anchor="ctr"/>
-          <a:lstStyle/>
-          <a:p>
-            <a:pPr algn="ctr"/>
-            <a:r>
-              <a:rPr lang="es-CL" sz="1400" dirty="0"/>
-              <a:t>T7</a:t>
-            </a:r>
-            <a:endParaRPr lang="en-US" sz="1400" dirty="0"/>
-          </a:p>
-        </p:txBody>
-      </p:sp>
-      <p:sp>
-        <p:nvSpPr>
-          <p:cNvPr id="149" name="Rectangle: Rounded Corners 148">
-            <a:extLst>
-              <a:ext uri="{FF2B5EF4-FFF2-40B4-BE49-F238E27FC236}">
-                <a16:creationId xmlns:a16="http://schemas.microsoft.com/office/drawing/2014/main" id="{C9582C88-83FA-83F3-1276-E85F1BD20BC6}"/>
-              </a:ext>
-            </a:extLst>
-          </p:cNvPr>
-          <p:cNvSpPr/>
-          <p:nvPr/>
-        </p:nvSpPr>
-        <p:spPr>
-          <a:xfrm>
-            <a:off x="3753700" y="2377987"/>
-            <a:ext cx="401275" cy="283833"/>
-          </a:xfrm>
-          <a:prstGeom prst="roundRect">
-            <a:avLst/>
-          </a:prstGeom>
-          <a:solidFill>
-            <a:schemeClr val="bg1"/>
-          </a:solidFill>
-        </p:spPr>
-        <p:style>
-          <a:lnRef idx="2">
-            <a:schemeClr val="accent2">
-              <a:shade val="15000"/>
-            </a:schemeClr>
-          </a:lnRef>
-          <a:fillRef idx="1">
-            <a:schemeClr val="accent2"/>
-          </a:fillRef>
-          <a:effectRef idx="0">
-            <a:schemeClr val="accent2"/>
-          </a:effectRef>
-          <a:fontRef idx="minor">
-            <a:schemeClr val="lt1"/>
-          </a:fontRef>
-        </p:style>
-        <p:txBody>
-          <a:bodyPr rtlCol="0" anchor="ctr"/>
-          <a:lstStyle/>
-          <a:p>
-            <a:pPr algn="ctr"/>
-            <a:r>
-              <a:rPr lang="es-CL" sz="1400" dirty="0">
-                <a:solidFill>
-                  <a:schemeClr val="tx1"/>
-                </a:solidFill>
-              </a:rPr>
-              <a:t>T8</a:t>
-            </a:r>
-            <a:endParaRPr lang="en-US" sz="1400" dirty="0">
-              <a:solidFill>
-                <a:schemeClr val="tx1"/>
-              </a:solidFill>
-            </a:endParaRPr>
-          </a:p>
-        </p:txBody>
-      </p:sp>
-      <p:sp>
-        <p:nvSpPr>
-          <p:cNvPr id="150" name="Rectangle: Rounded Corners 149">
-            <a:extLst>
-              <a:ext uri="{FF2B5EF4-FFF2-40B4-BE49-F238E27FC236}">
-                <a16:creationId xmlns:a16="http://schemas.microsoft.com/office/drawing/2014/main" id="{C650D6F6-0FD3-12CC-E649-57DEC7EFCA0E}"/>
-              </a:ext>
-            </a:extLst>
-          </p:cNvPr>
-          <p:cNvSpPr/>
-          <p:nvPr/>
-        </p:nvSpPr>
-        <p:spPr>
-          <a:xfrm>
-            <a:off x="11492735" y="4906162"/>
-            <a:ext cx="401275" cy="283833"/>
-          </a:xfrm>
-          <a:prstGeom prst="roundRect">
-            <a:avLst/>
-          </a:prstGeom>
-        </p:spPr>
-        <p:style>
-          <a:lnRef idx="2">
-            <a:schemeClr val="accent3">
-              <a:shade val="15000"/>
-            </a:schemeClr>
-          </a:lnRef>
-          <a:fillRef idx="1">
-            <a:schemeClr val="accent3"/>
-          </a:fillRef>
-          <a:effectRef idx="0">
-            <a:schemeClr val="accent3"/>
-          </a:effectRef>
-          <a:fontRef idx="minor">
-            <a:schemeClr val="lt1"/>
-          </a:fontRef>
-        </p:style>
-        <p:txBody>
-          <a:bodyPr rtlCol="0" anchor="ctr"/>
-          <a:lstStyle/>
-          <a:p>
-            <a:pPr algn="ctr"/>
-            <a:r>
-              <a:rPr lang="es-CL" sz="1400" dirty="0"/>
-              <a:t>T9</a:t>
-            </a:r>
-            <a:endParaRPr lang="en-US" sz="1400" dirty="0"/>
-          </a:p>
-        </p:txBody>
-      </p:sp>
-      <p:sp>
-        <p:nvSpPr>
-          <p:cNvPr id="155" name="Rectangle: Rounded Corners 154">
-            <a:extLst>
-              <a:ext uri="{FF2B5EF4-FFF2-40B4-BE49-F238E27FC236}">
-                <a16:creationId xmlns:a16="http://schemas.microsoft.com/office/drawing/2014/main" id="{56D97E4A-944A-85B6-2640-9E28AAB263D0}"/>
-              </a:ext>
-            </a:extLst>
-          </p:cNvPr>
-          <p:cNvSpPr/>
-          <p:nvPr/>
-        </p:nvSpPr>
-        <p:spPr>
-          <a:xfrm>
-            <a:off x="7100099" y="5237651"/>
-            <a:ext cx="401275" cy="283833"/>
-          </a:xfrm>
-          <a:prstGeom prst="roundRect">
-            <a:avLst/>
-          </a:prstGeom>
-        </p:spPr>
-        <p:style>
-          <a:lnRef idx="2">
-            <a:schemeClr val="accent4">
-              <a:shade val="15000"/>
-            </a:schemeClr>
-          </a:lnRef>
-          <a:fillRef idx="1">
-            <a:schemeClr val="accent4"/>
-          </a:fillRef>
-          <a:effectRef idx="0">
-            <a:schemeClr val="accent4"/>
-          </a:effectRef>
-          <a:fontRef idx="minor">
-            <a:schemeClr val="lt1"/>
-          </a:fontRef>
-        </p:style>
-        <p:txBody>
-          <a:bodyPr rtlCol="0" anchor="ctr"/>
-          <a:lstStyle/>
-          <a:p>
-            <a:pPr algn="ctr"/>
-            <a:r>
-              <a:rPr lang="es-CL" sz="1400" dirty="0">
-                <a:ln w="0"/>
-                <a:solidFill>
-                  <a:schemeClr val="tx1"/>
-                </a:solidFill>
-                <a:effectLst>
-                  <a:outerShdw blurRad="38100" dist="19050" dir="2700000" algn="tl" rotWithShape="0">
-                    <a:schemeClr val="dk1">
-                      <a:alpha val="40000"/>
-                    </a:schemeClr>
-                  </a:outerShdw>
-                </a:effectLst>
-              </a:rPr>
-              <a:t>T3</a:t>
-            </a:r>
-            <a:endParaRPr lang="en-US" sz="1400" dirty="0">
-              <a:ln w="0"/>
-              <a:solidFill>
-                <a:schemeClr val="tx1"/>
-              </a:solidFill>
-              <a:effectLst>
-                <a:outerShdw blurRad="38100" dist="19050" dir="2700000" algn="tl" rotWithShape="0">
-                  <a:schemeClr val="dk1">
-                    <a:alpha val="40000"/>
-                  </a:schemeClr>
-                </a:outerShdw>
-              </a:effectLst>
-            </a:endParaRPr>
-          </a:p>
-        </p:txBody>
-      </p:sp>
-      <p:sp>
-        <p:nvSpPr>
-          <p:cNvPr id="156" name="Rectangle: Rounded Corners 155">
-            <a:extLst>
-              <a:ext uri="{FF2B5EF4-FFF2-40B4-BE49-F238E27FC236}">
-                <a16:creationId xmlns:a16="http://schemas.microsoft.com/office/drawing/2014/main" id="{F50A921E-7BC1-100C-76B3-C79FA6A8C9CA}"/>
-              </a:ext>
-            </a:extLst>
-          </p:cNvPr>
-          <p:cNvSpPr/>
-          <p:nvPr/>
-        </p:nvSpPr>
-        <p:spPr>
-          <a:xfrm>
-            <a:off x="7617046" y="5237650"/>
-            <a:ext cx="401275" cy="283833"/>
-          </a:xfrm>
-          <a:prstGeom prst="roundRect">
-            <a:avLst/>
-          </a:prstGeom>
-          <a:solidFill>
-            <a:srgbClr val="7030A0"/>
-          </a:solidFill>
-        </p:spPr>
-        <p:style>
-          <a:lnRef idx="2">
-            <a:schemeClr val="accent2">
-              <a:shade val="15000"/>
-            </a:schemeClr>
-          </a:lnRef>
-          <a:fillRef idx="1">
-            <a:schemeClr val="accent2"/>
-          </a:fillRef>
-          <a:effectRef idx="0">
-            <a:schemeClr val="accent2"/>
-          </a:effectRef>
-          <a:fontRef idx="minor">
-            <a:schemeClr val="lt1"/>
-          </a:fontRef>
-        </p:style>
-        <p:txBody>
-          <a:bodyPr rtlCol="0" anchor="ctr"/>
-          <a:lstStyle/>
-          <a:p>
-            <a:pPr algn="ctr"/>
-            <a:r>
-              <a:rPr lang="es-CL" sz="1400" dirty="0"/>
-              <a:t>T6</a:t>
-            </a:r>
-            <a:endParaRPr lang="en-US" sz="1400" dirty="0"/>
-          </a:p>
-        </p:txBody>
-      </p:sp>
     </p:spTree>
     <p:extLst>
       <p:ext uri="{BB962C8B-B14F-4D97-AF65-F5344CB8AC3E}">
-        <p14:creationId xmlns:p14="http://schemas.microsoft.com/office/powerpoint/2010/main" val="284287464"/>
+        <p14:creationId xmlns:p14="http://schemas.microsoft.com/office/powerpoint/2010/main" val="907432913"/>
       </p:ext>
     </p:extLst>
   </p:cSld>

</xml_diff>

<commit_message>
initial changes on T2 for 02/2025
</commit_message>
<xml_diff>
--- a/img/TX.pptx
+++ b/img/TX.pptx
@@ -259,7 +259,7 @@
           <a:p>
             <a:fld id="{6BD44EFA-B01F-4EEC-BDEE-1E8697900FDD}" type="datetimeFigureOut">
               <a:rPr lang="en-US" smtClean="0"/>
-              <a:t>8/17/2025</a:t>
+              <a:t>8/20/2025</a:t>
             </a:fld>
             <a:endParaRPr lang="en-US"/>
           </a:p>
@@ -457,7 +457,7 @@
           <a:p>
             <a:fld id="{6BD44EFA-B01F-4EEC-BDEE-1E8697900FDD}" type="datetimeFigureOut">
               <a:rPr lang="en-US" smtClean="0"/>
-              <a:t>8/17/2025</a:t>
+              <a:t>8/20/2025</a:t>
             </a:fld>
             <a:endParaRPr lang="en-US"/>
           </a:p>
@@ -665,7 +665,7 @@
           <a:p>
             <a:fld id="{6BD44EFA-B01F-4EEC-BDEE-1E8697900FDD}" type="datetimeFigureOut">
               <a:rPr lang="en-US" smtClean="0"/>
-              <a:t>8/17/2025</a:t>
+              <a:t>8/20/2025</a:t>
             </a:fld>
             <a:endParaRPr lang="en-US"/>
           </a:p>
@@ -863,7 +863,7 @@
           <a:p>
             <a:fld id="{6BD44EFA-B01F-4EEC-BDEE-1E8697900FDD}" type="datetimeFigureOut">
               <a:rPr lang="en-US" smtClean="0"/>
-              <a:t>8/17/2025</a:t>
+              <a:t>8/20/2025</a:t>
             </a:fld>
             <a:endParaRPr lang="en-US"/>
           </a:p>
@@ -1138,7 +1138,7 @@
           <a:p>
             <a:fld id="{6BD44EFA-B01F-4EEC-BDEE-1E8697900FDD}" type="datetimeFigureOut">
               <a:rPr lang="en-US" smtClean="0"/>
-              <a:t>8/17/2025</a:t>
+              <a:t>8/20/2025</a:t>
             </a:fld>
             <a:endParaRPr lang="en-US"/>
           </a:p>
@@ -1403,7 +1403,7 @@
           <a:p>
             <a:fld id="{6BD44EFA-B01F-4EEC-BDEE-1E8697900FDD}" type="datetimeFigureOut">
               <a:rPr lang="en-US" smtClean="0"/>
-              <a:t>8/17/2025</a:t>
+              <a:t>8/20/2025</a:t>
             </a:fld>
             <a:endParaRPr lang="en-US"/>
           </a:p>
@@ -1815,7 +1815,7 @@
           <a:p>
             <a:fld id="{6BD44EFA-B01F-4EEC-BDEE-1E8697900FDD}" type="datetimeFigureOut">
               <a:rPr lang="en-US" smtClean="0"/>
-              <a:t>8/17/2025</a:t>
+              <a:t>8/20/2025</a:t>
             </a:fld>
             <a:endParaRPr lang="en-US"/>
           </a:p>
@@ -1956,7 +1956,7 @@
           <a:p>
             <a:fld id="{6BD44EFA-B01F-4EEC-BDEE-1E8697900FDD}" type="datetimeFigureOut">
               <a:rPr lang="en-US" smtClean="0"/>
-              <a:t>8/17/2025</a:t>
+              <a:t>8/20/2025</a:t>
             </a:fld>
             <a:endParaRPr lang="en-US"/>
           </a:p>
@@ -2069,7 +2069,7 @@
           <a:p>
             <a:fld id="{6BD44EFA-B01F-4EEC-BDEE-1E8697900FDD}" type="datetimeFigureOut">
               <a:rPr lang="en-US" smtClean="0"/>
-              <a:t>8/17/2025</a:t>
+              <a:t>8/20/2025</a:t>
             </a:fld>
             <a:endParaRPr lang="en-US"/>
           </a:p>
@@ -2380,7 +2380,7 @@
           <a:p>
             <a:fld id="{6BD44EFA-B01F-4EEC-BDEE-1E8697900FDD}" type="datetimeFigureOut">
               <a:rPr lang="en-US" smtClean="0"/>
-              <a:t>8/17/2025</a:t>
+              <a:t>8/20/2025</a:t>
             </a:fld>
             <a:endParaRPr lang="en-US"/>
           </a:p>
@@ -2668,7 +2668,7 @@
           <a:p>
             <a:fld id="{6BD44EFA-B01F-4EEC-BDEE-1E8697900FDD}" type="datetimeFigureOut">
               <a:rPr lang="en-US" smtClean="0"/>
-              <a:t>8/17/2025</a:t>
+              <a:t>8/20/2025</a:t>
             </a:fld>
             <a:endParaRPr lang="en-US"/>
           </a:p>
@@ -2909,7 +2909,7 @@
           <a:p>
             <a:fld id="{6BD44EFA-B01F-4EEC-BDEE-1E8697900FDD}" type="datetimeFigureOut">
               <a:rPr lang="en-US" smtClean="0"/>
-              <a:t>8/17/2025</a:t>
+              <a:t>8/20/2025</a:t>
             </a:fld>
             <a:endParaRPr lang="en-US"/>
           </a:p>
@@ -6108,6 +6108,80 @@
           </a:p>
         </p:txBody>
       </p:sp>
+      <p:sp>
+        <p:nvSpPr>
+          <p:cNvPr id="2" name="Rectangle: Rounded Corners 1">
+            <a:extLst>
+              <a:ext uri="{FF2B5EF4-FFF2-40B4-BE49-F238E27FC236}">
+                <a16:creationId xmlns:a16="http://schemas.microsoft.com/office/drawing/2014/main" id="{5D8493F2-CCC5-7CF8-2810-A32A53F5E76E}"/>
+              </a:ext>
+            </a:extLst>
+          </p:cNvPr>
+          <p:cNvSpPr/>
+          <p:nvPr/>
+        </p:nvSpPr>
+        <p:spPr>
+          <a:xfrm>
+            <a:off x="1257144" y="2135713"/>
+            <a:ext cx="401275" cy="283833"/>
+          </a:xfrm>
+          <a:prstGeom prst="roundRect">
+            <a:avLst/>
+          </a:prstGeom>
+        </p:spPr>
+        <p:style>
+          <a:lnRef idx="2">
+            <a:schemeClr val="accent4">
+              <a:shade val="15000"/>
+            </a:schemeClr>
+          </a:lnRef>
+          <a:fillRef idx="1">
+            <a:schemeClr val="accent4"/>
+          </a:fillRef>
+          <a:effectRef idx="0">
+            <a:schemeClr val="accent4"/>
+          </a:effectRef>
+          <a:fontRef idx="minor">
+            <a:schemeClr val="lt1"/>
+          </a:fontRef>
+        </p:style>
+        <p:txBody>
+          <a:bodyPr rtlCol="0" anchor="ctr"/>
+          <a:lstStyle/>
+          <a:p>
+            <a:pPr algn="ctr"/>
+            <a:r>
+              <a:rPr lang="es-CL" sz="1400" dirty="0">
+                <a:ln w="0"/>
+                <a:solidFill>
+                  <a:schemeClr val="tx1"/>
+                </a:solidFill>
+                <a:effectLst>
+                  <a:outerShdw blurRad="38100" dist="19050" dir="2700000" algn="tl" rotWithShape="0">
+                    <a:schemeClr val="dk1">
+                      <a:alpha val="40000"/>
+                    </a:schemeClr>
+                  </a:outerShdw>
+                </a:effectLst>
+              </a:rPr>
+              <a:t>T3</a:t>
+            </a:r>
+            <a:endParaRPr lang="en-US" sz="1400" dirty="0">
+              <a:ln w="0"/>
+              <a:solidFill>
+                <a:schemeClr val="tx1"/>
+              </a:solidFill>
+              <a:effectLst>
+                <a:outerShdw blurRad="38100" dist="19050" dir="2700000" algn="tl" rotWithShape="0">
+                  <a:schemeClr val="dk1">
+                    <a:alpha val="40000"/>
+                  </a:schemeClr>
+                </a:outerShdw>
+              </a:effectLst>
+            </a:endParaRPr>
+          </a:p>
+        </p:txBody>
+      </p:sp>
     </p:spTree>
     <p:extLst>
       <p:ext uri="{BB962C8B-B14F-4D97-AF65-F5344CB8AC3E}">

</xml_diff>